<commit_message>
add new course material
</commit_message>
<xml_diff>
--- a/前端课程.pptx
+++ b/前端课程.pptx
@@ -7527,16 +7527,31 @@
           </a:p>
           <a:p>
             <a:r>
+              <a:rPr lang="en-US" dirty="0">
+                <a:hlinkClick r:id="rId3"/>
+              </a:rPr>
+              <a:t>https://css-tricks.com/snippets/css/a-guide-to-flexbox</a:t>
+            </a:r>
+            <a:r>
+              <a:rPr lang="en-US" dirty="0" smtClean="0">
+                <a:hlinkClick r:id="rId3"/>
+              </a:rPr>
+              <a:t>/</a:t>
+            </a:r>
+            <a:endParaRPr lang="en-US" dirty="0" smtClean="0"/>
+          </a:p>
+          <a:p>
+            <a:r>
               <a:rPr lang="en-US" dirty="0"/>
               <a:t>https://</a:t>
             </a:r>
             <a:r>
               <a:rPr lang="en-US" dirty="0" err="1"/>
-              <a:t>css-tricks.com</a:t>
+              <a:t>getbootstrap.com</a:t>
             </a:r>
             <a:r>
               <a:rPr lang="en-US" dirty="0"/>
-              <a:t>/snippets/</a:t>
+              <a:t>/docs/3.3/</a:t>
             </a:r>
             <a:r>
               <a:rPr lang="en-US" dirty="0" err="1"/>
@@ -7544,15 +7559,7 @@
             </a:r>
             <a:r>
               <a:rPr lang="en-US" dirty="0"/>
-              <a:t>/a-guide-to-</a:t>
-            </a:r>
-            <a:r>
-              <a:rPr lang="en-US" dirty="0" err="1"/>
-              <a:t>flexbox</a:t>
-            </a:r>
-            <a:r>
-              <a:rPr lang="en-US" dirty="0"/>
-              <a:t>/</a:t>
+              <a:t>/#grid</a:t>
             </a:r>
           </a:p>
         </p:txBody>
@@ -7567,6 +7574,13 @@
   <p:clrMapOvr>
     <a:masterClrMapping/>
   </p:clrMapOvr>
+  <p:timing>
+    <p:tnLst>
+      <p:par>
+        <p:cTn id="1" dur="indefinite" restart="never" nodeType="tmRoot"/>
+      </p:par>
+    </p:tnLst>
+  </p:timing>
 </p:sld>
 </file>
 
@@ -7647,6 +7661,13 @@
   <p:clrMapOvr>
     <a:masterClrMapping/>
   </p:clrMapOvr>
+  <p:timing>
+    <p:tnLst>
+      <p:par>
+        <p:cTn id="1" dur="indefinite" restart="never" nodeType="tmRoot"/>
+      </p:par>
+    </p:tnLst>
+  </p:timing>
 </p:sld>
 </file>
 
@@ -7748,7 +7769,7 @@
         <p:spPr>
           <a:xfrm>
             <a:off x="1751011" y="3683000"/>
-            <a:ext cx="6605589" cy="1200329"/>
+            <a:ext cx="6605589" cy="1754326"/>
           </a:xfrm>
           <a:prstGeom prst="rect">
             <a:avLst/>
@@ -7762,11 +7783,21 @@
           <a:lstStyle/>
           <a:p>
             <a:r>
-              <a:rPr lang="en-US" dirty="0" err="1"/>
+              <a:rPr lang="zh-CN" altLang="en-US" dirty="0" smtClean="0"/>
+              <a:t>打开命令行</a:t>
+            </a:r>
+            <a:endParaRPr lang="en-US" altLang="zh-CN" dirty="0" smtClean="0"/>
+          </a:p>
+          <a:p>
+            <a:endParaRPr lang="en-US" dirty="0" smtClean="0"/>
+          </a:p>
+          <a:p>
+            <a:r>
+              <a:rPr lang="en-US" dirty="0" err="1" smtClean="0"/>
               <a:t>npm</a:t>
             </a:r>
             <a:r>
-              <a:rPr lang="en-US" dirty="0"/>
+              <a:rPr lang="en-US" dirty="0" smtClean="0"/>
               <a:t> </a:t>
             </a:r>
             <a:r>

</xml_diff>

<commit_message>
add session 4 powerpoint
</commit_message>
<xml_diff>
--- a/前端课程.pptx
+++ b/前端课程.pptx
@@ -5,7 +5,7 @@
     <p:sldMasterId id="2147483648" r:id="rId1"/>
   </p:sldMasterIdLst>
   <p:notesMasterIdLst>
-    <p:notesMasterId r:id="rId23"/>
+    <p:notesMasterId r:id="rId32"/>
   </p:notesMasterIdLst>
   <p:sldIdLst>
     <p:sldId id="272" r:id="rId2"/>
@@ -28,7 +28,16 @@
     <p:sldId id="274" r:id="rId19"/>
     <p:sldId id="273" r:id="rId20"/>
     <p:sldId id="276" r:id="rId21"/>
-    <p:sldId id="277" r:id="rId22"/>
+    <p:sldId id="282" r:id="rId22"/>
+    <p:sldId id="284" r:id="rId23"/>
+    <p:sldId id="285" r:id="rId24"/>
+    <p:sldId id="286" r:id="rId25"/>
+    <p:sldId id="288" r:id="rId26"/>
+    <p:sldId id="277" r:id="rId27"/>
+    <p:sldId id="279" r:id="rId28"/>
+    <p:sldId id="278" r:id="rId29"/>
+    <p:sldId id="281" r:id="rId30"/>
+    <p:sldId id="287" r:id="rId31"/>
   </p:sldIdLst>
   <p:sldSz cx="12192000" cy="6858000"/>
   <p:notesSz cx="6858000" cy="9144000"/>
@@ -152,7 +161,16 @@
             <p14:sldId id="274"/>
             <p14:sldId id="273"/>
             <p14:sldId id="276"/>
+            <p14:sldId id="282"/>
+            <p14:sldId id="284"/>
+            <p14:sldId id="285"/>
+            <p14:sldId id="286"/>
+            <p14:sldId id="288"/>
             <p14:sldId id="277"/>
+            <p14:sldId id="279"/>
+            <p14:sldId id="278"/>
+            <p14:sldId id="281"/>
+            <p14:sldId id="287"/>
           </p14:sldIdLst>
         </p14:section>
         <p14:section name="Untitled Section" id="{0F453BDA-0411-3C4B-9C87-D2233F808088}">
@@ -249,7 +267,7 @@
           <a:p>
             <a:fld id="{A75DC609-2A5E-994A-AEB9-E13728C46CDD}" type="datetimeFigureOut">
               <a:rPr lang="en-US" smtClean="0"/>
-              <a:t>2/10/18</a:t>
+              <a:t>2/17/18</a:t>
             </a:fld>
             <a:endParaRPr lang="en-US"/>
           </a:p>
@@ -561,12 +579,6 @@
           <a:bodyPr/>
           <a:lstStyle/>
           <a:p>
-            <a:r>
-              <a:rPr lang="en-US" dirty="0" smtClean="0"/>
-              <a:t>http://es6.ruanyifeng.com/</a:t>
-            </a:r>
-          </a:p>
-          <a:p>
             <a:endParaRPr lang="en-US" dirty="0"/>
           </a:p>
         </p:txBody>
@@ -588,7 +600,7 @@
           <a:p>
             <a:fld id="{3A8071CD-55D8-0E40-9E87-5F5ADA6DF007}" type="slidenum">
               <a:rPr lang="en-US" smtClean="0"/>
-              <a:t>10</a:t>
+              <a:t>1</a:t>
             </a:fld>
             <a:endParaRPr lang="en-US"/>
           </a:p>
@@ -597,7 +609,668 @@
     </p:spTree>
     <p:extLst>
       <p:ext uri="{BB962C8B-B14F-4D97-AF65-F5344CB8AC3E}">
-        <p14:creationId xmlns:p14="http://schemas.microsoft.com/office/powerpoint/2010/main" val="786318014"/>
+        <p14:creationId xmlns:p14="http://schemas.microsoft.com/office/powerpoint/2010/main" val="1320129658"/>
+      </p:ext>
+    </p:extLst>
+  </p:cSld>
+  <p:clrMapOvr>
+    <a:masterClrMapping/>
+  </p:clrMapOvr>
+</p:notes>
+</file>
+
+<file path=ppt/notesSlides/notesSlide10.xml><?xml version="1.0" encoding="utf-8"?>
+<p:notes xmlns:a="http://schemas.openxmlformats.org/drawingml/2006/main" xmlns:r="http://schemas.openxmlformats.org/officeDocument/2006/relationships" xmlns:p="http://schemas.openxmlformats.org/presentationml/2006/main">
+  <p:cSld>
+    <p:spTree>
+      <p:nvGrpSpPr>
+        <p:cNvPr id="1" name=""/>
+        <p:cNvGrpSpPr/>
+        <p:nvPr/>
+      </p:nvGrpSpPr>
+      <p:grpSpPr>
+        <a:xfrm>
+          <a:off x="0" y="0"/>
+          <a:ext cx="0" cy="0"/>
+          <a:chOff x="0" y="0"/>
+          <a:chExt cx="0" cy="0"/>
+        </a:xfrm>
+      </p:grpSpPr>
+      <p:sp>
+        <p:nvSpPr>
+          <p:cNvPr id="2" name="Slide Image Placeholder 1"/>
+          <p:cNvSpPr>
+            <a:spLocks noGrp="1" noRot="1" noChangeAspect="1"/>
+          </p:cNvSpPr>
+          <p:nvPr>
+            <p:ph type="sldImg"/>
+          </p:nvPr>
+        </p:nvSpPr>
+        <p:spPr/>
+      </p:sp>
+      <p:sp>
+        <p:nvSpPr>
+          <p:cNvPr id="3" name="Notes Placeholder 2"/>
+          <p:cNvSpPr>
+            <a:spLocks noGrp="1"/>
+          </p:cNvSpPr>
+          <p:nvPr>
+            <p:ph type="body" idx="1"/>
+          </p:nvPr>
+        </p:nvSpPr>
+        <p:spPr/>
+        <p:txBody>
+          <a:bodyPr/>
+          <a:lstStyle/>
+          <a:p>
+            <a:endParaRPr lang="en-US" dirty="0"/>
+          </a:p>
+        </p:txBody>
+      </p:sp>
+      <p:sp>
+        <p:nvSpPr>
+          <p:cNvPr id="4" name="Slide Number Placeholder 3"/>
+          <p:cNvSpPr>
+            <a:spLocks noGrp="1"/>
+          </p:cNvSpPr>
+          <p:nvPr>
+            <p:ph type="sldNum" sz="quarter" idx="10"/>
+          </p:nvPr>
+        </p:nvSpPr>
+        <p:spPr/>
+        <p:txBody>
+          <a:bodyPr/>
+          <a:lstStyle/>
+          <a:p>
+            <a:fld id="{3A8071CD-55D8-0E40-9E87-5F5ADA6DF007}" type="slidenum">
+              <a:rPr lang="en-US" smtClean="0"/>
+              <a:t>23</a:t>
+            </a:fld>
+            <a:endParaRPr lang="en-US"/>
+          </a:p>
+        </p:txBody>
+      </p:sp>
+    </p:spTree>
+    <p:extLst>
+      <p:ext uri="{BB962C8B-B14F-4D97-AF65-F5344CB8AC3E}">
+        <p14:creationId xmlns:p14="http://schemas.microsoft.com/office/powerpoint/2010/main" val="1991582309"/>
+      </p:ext>
+    </p:extLst>
+  </p:cSld>
+  <p:clrMapOvr>
+    <a:masterClrMapping/>
+  </p:clrMapOvr>
+</p:notes>
+</file>
+
+<file path=ppt/notesSlides/notesSlide11.xml><?xml version="1.0" encoding="utf-8"?>
+<p:notes xmlns:a="http://schemas.openxmlformats.org/drawingml/2006/main" xmlns:r="http://schemas.openxmlformats.org/officeDocument/2006/relationships" xmlns:p="http://schemas.openxmlformats.org/presentationml/2006/main">
+  <p:cSld>
+    <p:spTree>
+      <p:nvGrpSpPr>
+        <p:cNvPr id="1" name=""/>
+        <p:cNvGrpSpPr/>
+        <p:nvPr/>
+      </p:nvGrpSpPr>
+      <p:grpSpPr>
+        <a:xfrm>
+          <a:off x="0" y="0"/>
+          <a:ext cx="0" cy="0"/>
+          <a:chOff x="0" y="0"/>
+          <a:chExt cx="0" cy="0"/>
+        </a:xfrm>
+      </p:grpSpPr>
+      <p:sp>
+        <p:nvSpPr>
+          <p:cNvPr id="2" name="Slide Image Placeholder 1"/>
+          <p:cNvSpPr>
+            <a:spLocks noGrp="1" noRot="1" noChangeAspect="1"/>
+          </p:cNvSpPr>
+          <p:nvPr>
+            <p:ph type="sldImg"/>
+          </p:nvPr>
+        </p:nvSpPr>
+        <p:spPr/>
+      </p:sp>
+      <p:sp>
+        <p:nvSpPr>
+          <p:cNvPr id="3" name="Notes Placeholder 2"/>
+          <p:cNvSpPr>
+            <a:spLocks noGrp="1"/>
+          </p:cNvSpPr>
+          <p:nvPr>
+            <p:ph type="body" idx="1"/>
+          </p:nvPr>
+        </p:nvSpPr>
+        <p:spPr/>
+        <p:txBody>
+          <a:bodyPr/>
+          <a:lstStyle/>
+          <a:p>
+            <a:r>
+              <a:rPr lang="en-US" dirty="0" smtClean="0"/>
+              <a:t>https://</a:t>
+            </a:r>
+            <a:r>
+              <a:rPr lang="en-US" dirty="0" err="1" smtClean="0"/>
+              <a:t>gtusername.gitbooks.io</a:t>
+            </a:r>
+            <a:r>
+              <a:rPr lang="en-US" dirty="0" smtClean="0"/>
+              <a:t>/study-notes/content/</a:t>
+            </a:r>
+            <a:r>
+              <a:rPr lang="en-US" dirty="0" err="1" smtClean="0"/>
+              <a:t>dva</a:t>
+            </a:r>
+            <a:r>
+              <a:rPr lang="en-US" smtClean="0"/>
+              <a:t>/dva%E7%9F%A5%E8%AF%86%E5%9C%B0%E5%9B%BE.html</a:t>
+            </a:r>
+            <a:endParaRPr lang="en-US" dirty="0"/>
+          </a:p>
+        </p:txBody>
+      </p:sp>
+      <p:sp>
+        <p:nvSpPr>
+          <p:cNvPr id="4" name="Slide Number Placeholder 3"/>
+          <p:cNvSpPr>
+            <a:spLocks noGrp="1"/>
+          </p:cNvSpPr>
+          <p:nvPr>
+            <p:ph type="sldNum" sz="quarter" idx="10"/>
+          </p:nvPr>
+        </p:nvSpPr>
+        <p:spPr/>
+        <p:txBody>
+          <a:bodyPr/>
+          <a:lstStyle/>
+          <a:p>
+            <a:fld id="{3A8071CD-55D8-0E40-9E87-5F5ADA6DF007}" type="slidenum">
+              <a:rPr lang="en-US" smtClean="0"/>
+              <a:t>24</a:t>
+            </a:fld>
+            <a:endParaRPr lang="en-US"/>
+          </a:p>
+        </p:txBody>
+      </p:sp>
+    </p:spTree>
+    <p:extLst>
+      <p:ext uri="{BB962C8B-B14F-4D97-AF65-F5344CB8AC3E}">
+        <p14:creationId xmlns:p14="http://schemas.microsoft.com/office/powerpoint/2010/main" val="1700764222"/>
+      </p:ext>
+    </p:extLst>
+  </p:cSld>
+  <p:clrMapOvr>
+    <a:masterClrMapping/>
+  </p:clrMapOvr>
+</p:notes>
+</file>
+
+<file path=ppt/notesSlides/notesSlide12.xml><?xml version="1.0" encoding="utf-8"?>
+<p:notes xmlns:a="http://schemas.openxmlformats.org/drawingml/2006/main" xmlns:r="http://schemas.openxmlformats.org/officeDocument/2006/relationships" xmlns:p="http://schemas.openxmlformats.org/presentationml/2006/main">
+  <p:cSld>
+    <p:spTree>
+      <p:nvGrpSpPr>
+        <p:cNvPr id="1" name=""/>
+        <p:cNvGrpSpPr/>
+        <p:nvPr/>
+      </p:nvGrpSpPr>
+      <p:grpSpPr>
+        <a:xfrm>
+          <a:off x="0" y="0"/>
+          <a:ext cx="0" cy="0"/>
+          <a:chOff x="0" y="0"/>
+          <a:chExt cx="0" cy="0"/>
+        </a:xfrm>
+      </p:grpSpPr>
+      <p:sp>
+        <p:nvSpPr>
+          <p:cNvPr id="2" name="Slide Image Placeholder 1"/>
+          <p:cNvSpPr>
+            <a:spLocks noGrp="1" noRot="1" noChangeAspect="1"/>
+          </p:cNvSpPr>
+          <p:nvPr>
+            <p:ph type="sldImg"/>
+          </p:nvPr>
+        </p:nvSpPr>
+        <p:spPr/>
+      </p:sp>
+      <p:sp>
+        <p:nvSpPr>
+          <p:cNvPr id="3" name="Notes Placeholder 2"/>
+          <p:cNvSpPr>
+            <a:spLocks noGrp="1"/>
+          </p:cNvSpPr>
+          <p:nvPr>
+            <p:ph type="body" idx="1"/>
+          </p:nvPr>
+        </p:nvSpPr>
+        <p:spPr/>
+        <p:txBody>
+          <a:bodyPr/>
+          <a:lstStyle/>
+          <a:p>
+            <a:r>
+              <a:rPr lang="en-US" dirty="0" smtClean="0"/>
+              <a:t>https://</a:t>
+            </a:r>
+            <a:r>
+              <a:rPr lang="en-US" dirty="0" err="1" smtClean="0"/>
+              <a:t>toddmotto.com</a:t>
+            </a:r>
+            <a:r>
+              <a:rPr lang="en-US" smtClean="0"/>
+              <a:t>/walkthrough-to-migrate-an-angular-1-component-to-angular-2/#</a:t>
+            </a:r>
+            <a:r>
+              <a:rPr lang="en-US" dirty="0" err="1" smtClean="0"/>
+              <a:t>angularjs</a:t>
+            </a:r>
+            <a:r>
+              <a:rPr lang="en-US" dirty="0" smtClean="0"/>
+              <a:t>-</a:t>
+            </a:r>
+            <a:r>
+              <a:rPr lang="en-US" dirty="0" err="1" smtClean="0"/>
+              <a:t>todo</a:t>
+            </a:r>
+            <a:r>
+              <a:rPr lang="en-US" dirty="0" smtClean="0"/>
+              <a:t>-app</a:t>
+            </a:r>
+            <a:endParaRPr lang="en-US" dirty="0"/>
+          </a:p>
+        </p:txBody>
+      </p:sp>
+      <p:sp>
+        <p:nvSpPr>
+          <p:cNvPr id="4" name="Slide Number Placeholder 3"/>
+          <p:cNvSpPr>
+            <a:spLocks noGrp="1"/>
+          </p:cNvSpPr>
+          <p:nvPr>
+            <p:ph type="sldNum" sz="quarter" idx="10"/>
+          </p:nvPr>
+        </p:nvSpPr>
+        <p:spPr/>
+        <p:txBody>
+          <a:bodyPr/>
+          <a:lstStyle/>
+          <a:p>
+            <a:fld id="{3A8071CD-55D8-0E40-9E87-5F5ADA6DF007}" type="slidenum">
+              <a:rPr lang="en-US" smtClean="0"/>
+              <a:t>26</a:t>
+            </a:fld>
+            <a:endParaRPr lang="en-US"/>
+          </a:p>
+        </p:txBody>
+      </p:sp>
+    </p:spTree>
+    <p:extLst>
+      <p:ext uri="{BB962C8B-B14F-4D97-AF65-F5344CB8AC3E}">
+        <p14:creationId xmlns:p14="http://schemas.microsoft.com/office/powerpoint/2010/main" val="871259949"/>
+      </p:ext>
+    </p:extLst>
+  </p:cSld>
+  <p:clrMapOvr>
+    <a:masterClrMapping/>
+  </p:clrMapOvr>
+</p:notes>
+</file>
+
+<file path=ppt/notesSlides/notesSlide13.xml><?xml version="1.0" encoding="utf-8"?>
+<p:notes xmlns:a="http://schemas.openxmlformats.org/drawingml/2006/main" xmlns:r="http://schemas.openxmlformats.org/officeDocument/2006/relationships" xmlns:p="http://schemas.openxmlformats.org/presentationml/2006/main">
+  <p:cSld>
+    <p:spTree>
+      <p:nvGrpSpPr>
+        <p:cNvPr id="1" name=""/>
+        <p:cNvGrpSpPr/>
+        <p:nvPr/>
+      </p:nvGrpSpPr>
+      <p:grpSpPr>
+        <a:xfrm>
+          <a:off x="0" y="0"/>
+          <a:ext cx="0" cy="0"/>
+          <a:chOff x="0" y="0"/>
+          <a:chExt cx="0" cy="0"/>
+        </a:xfrm>
+      </p:grpSpPr>
+      <p:sp>
+        <p:nvSpPr>
+          <p:cNvPr id="2" name="Slide Image Placeholder 1"/>
+          <p:cNvSpPr>
+            <a:spLocks noGrp="1" noRot="1" noChangeAspect="1"/>
+          </p:cNvSpPr>
+          <p:nvPr>
+            <p:ph type="sldImg"/>
+          </p:nvPr>
+        </p:nvSpPr>
+        <p:spPr/>
+      </p:sp>
+      <p:sp>
+        <p:nvSpPr>
+          <p:cNvPr id="3" name="Notes Placeholder 2"/>
+          <p:cNvSpPr>
+            <a:spLocks noGrp="1"/>
+          </p:cNvSpPr>
+          <p:nvPr>
+            <p:ph type="body" idx="1"/>
+          </p:nvPr>
+        </p:nvSpPr>
+        <p:spPr/>
+        <p:txBody>
+          <a:bodyPr/>
+          <a:lstStyle/>
+          <a:p>
+            <a:pPr marL="228600" indent="-228600">
+              <a:buAutoNum type="arabicPeriod"/>
+            </a:pPr>
+            <a:r>
+              <a:rPr lang="en-US" altLang="zh-CN" dirty="0" smtClean="0"/>
+              <a:t>https://</a:t>
+            </a:r>
+            <a:r>
+              <a:rPr lang="en-US" altLang="zh-CN" dirty="0" err="1" smtClean="0"/>
+              <a:t>www.jianshu.com</a:t>
+            </a:r>
+            <a:r>
+              <a:rPr lang="en-US" altLang="zh-CN" dirty="0" smtClean="0"/>
+              <a:t>/p/9d89e6ee5e0c</a:t>
+            </a:r>
+          </a:p>
+          <a:p>
+            <a:pPr marL="228600" indent="-228600">
+              <a:buAutoNum type="arabicPeriod"/>
+            </a:pPr>
+            <a:r>
+              <a:rPr lang="en-US" dirty="0" smtClean="0"/>
+              <a:t>http://</a:t>
+            </a:r>
+            <a:r>
+              <a:rPr lang="en-US" dirty="0" err="1" smtClean="0"/>
+              <a:t>www.runoob.com</a:t>
+            </a:r>
+            <a:r>
+              <a:rPr lang="en-US" dirty="0" smtClean="0"/>
+              <a:t>/</a:t>
+            </a:r>
+            <a:r>
+              <a:rPr lang="en-US" dirty="0" err="1" smtClean="0"/>
+              <a:t>angularjs</a:t>
+            </a:r>
+            <a:r>
+              <a:rPr lang="en-US" dirty="0" smtClean="0"/>
+              <a:t>/</a:t>
+            </a:r>
+            <a:r>
+              <a:rPr lang="en-US" dirty="0" err="1" smtClean="0"/>
+              <a:t>angularjs-filters.html</a:t>
+            </a:r>
+            <a:endParaRPr lang="en-US" dirty="0" smtClean="0"/>
+          </a:p>
+          <a:p>
+            <a:pPr marL="228600" indent="-228600">
+              <a:buAutoNum type="arabicPeriod"/>
+            </a:pPr>
+            <a:r>
+              <a:rPr lang="en-US" dirty="0" smtClean="0"/>
+              <a:t>https://</a:t>
+            </a:r>
+            <a:r>
+              <a:rPr lang="en-US" dirty="0" err="1" smtClean="0"/>
+              <a:t>segmentfault.com</a:t>
+            </a:r>
+            <a:r>
+              <a:rPr lang="en-US" dirty="0" smtClean="0"/>
+              <a:t>/a/1190000003096933</a:t>
+            </a:r>
+            <a:endParaRPr lang="en-US" dirty="0"/>
+          </a:p>
+        </p:txBody>
+      </p:sp>
+      <p:sp>
+        <p:nvSpPr>
+          <p:cNvPr id="4" name="Slide Number Placeholder 3"/>
+          <p:cNvSpPr>
+            <a:spLocks noGrp="1"/>
+          </p:cNvSpPr>
+          <p:nvPr>
+            <p:ph type="sldNum" sz="quarter" idx="10"/>
+          </p:nvPr>
+        </p:nvSpPr>
+        <p:spPr/>
+        <p:txBody>
+          <a:bodyPr/>
+          <a:lstStyle/>
+          <a:p>
+            <a:fld id="{3A8071CD-55D8-0E40-9E87-5F5ADA6DF007}" type="slidenum">
+              <a:rPr lang="en-US" smtClean="0"/>
+              <a:t>28</a:t>
+            </a:fld>
+            <a:endParaRPr lang="en-US"/>
+          </a:p>
+        </p:txBody>
+      </p:sp>
+    </p:spTree>
+    <p:extLst>
+      <p:ext uri="{BB962C8B-B14F-4D97-AF65-F5344CB8AC3E}">
+        <p14:creationId xmlns:p14="http://schemas.microsoft.com/office/powerpoint/2010/main" val="242802037"/>
+      </p:ext>
+    </p:extLst>
+  </p:cSld>
+  <p:clrMapOvr>
+    <a:masterClrMapping/>
+  </p:clrMapOvr>
+</p:notes>
+</file>
+
+<file path=ppt/notesSlides/notesSlide14.xml><?xml version="1.0" encoding="utf-8"?>
+<p:notes xmlns:a="http://schemas.openxmlformats.org/drawingml/2006/main" xmlns:r="http://schemas.openxmlformats.org/officeDocument/2006/relationships" xmlns:p="http://schemas.openxmlformats.org/presentationml/2006/main">
+  <p:cSld>
+    <p:spTree>
+      <p:nvGrpSpPr>
+        <p:cNvPr id="1" name=""/>
+        <p:cNvGrpSpPr/>
+        <p:nvPr/>
+      </p:nvGrpSpPr>
+      <p:grpSpPr>
+        <a:xfrm>
+          <a:off x="0" y="0"/>
+          <a:ext cx="0" cy="0"/>
+          <a:chOff x="0" y="0"/>
+          <a:chExt cx="0" cy="0"/>
+        </a:xfrm>
+      </p:grpSpPr>
+      <p:sp>
+        <p:nvSpPr>
+          <p:cNvPr id="2" name="Slide Image Placeholder 1"/>
+          <p:cNvSpPr>
+            <a:spLocks noGrp="1" noRot="1" noChangeAspect="1"/>
+          </p:cNvSpPr>
+          <p:nvPr>
+            <p:ph type="sldImg"/>
+          </p:nvPr>
+        </p:nvSpPr>
+        <p:spPr/>
+      </p:sp>
+      <p:sp>
+        <p:nvSpPr>
+          <p:cNvPr id="3" name="Notes Placeholder 2"/>
+          <p:cNvSpPr>
+            <a:spLocks noGrp="1"/>
+          </p:cNvSpPr>
+          <p:nvPr>
+            <p:ph type="body" idx="1"/>
+          </p:nvPr>
+        </p:nvSpPr>
+        <p:spPr/>
+        <p:txBody>
+          <a:bodyPr/>
+          <a:lstStyle/>
+          <a:p>
+            <a:r>
+              <a:rPr lang="en-US" dirty="0" smtClean="0"/>
+              <a:t>https://</a:t>
+            </a:r>
+            <a:r>
+              <a:rPr lang="en-US" dirty="0" err="1" smtClean="0"/>
+              <a:t>reactjs.org</a:t>
+            </a:r>
+            <a:r>
+              <a:rPr lang="en-US" dirty="0" smtClean="0"/>
+              <a:t>/tutorial/</a:t>
+            </a:r>
+            <a:r>
+              <a:rPr lang="en-US" dirty="0" err="1" smtClean="0"/>
+              <a:t>tutorial.html</a:t>
+            </a:r>
+            <a:endParaRPr lang="en-US" dirty="0" smtClean="0"/>
+          </a:p>
+          <a:p>
+            <a:r>
+              <a:rPr lang="en-US" dirty="0" smtClean="0"/>
+              <a:t>https://</a:t>
+            </a:r>
+            <a:r>
+              <a:rPr lang="en-US" dirty="0" err="1" smtClean="0"/>
+              <a:t>discountry.github.io</a:t>
+            </a:r>
+            <a:r>
+              <a:rPr lang="en-US" dirty="0" smtClean="0"/>
+              <a:t>/react/tutorial/</a:t>
+            </a:r>
+            <a:r>
+              <a:rPr lang="en-US" smtClean="0"/>
+              <a:t>tutorial.html</a:t>
+            </a:r>
+            <a:endParaRPr lang="en-US"/>
+          </a:p>
+        </p:txBody>
+      </p:sp>
+      <p:sp>
+        <p:nvSpPr>
+          <p:cNvPr id="4" name="Slide Number Placeholder 3"/>
+          <p:cNvSpPr>
+            <a:spLocks noGrp="1"/>
+          </p:cNvSpPr>
+          <p:nvPr>
+            <p:ph type="sldNum" sz="quarter" idx="10"/>
+          </p:nvPr>
+        </p:nvSpPr>
+        <p:spPr/>
+        <p:txBody>
+          <a:bodyPr/>
+          <a:lstStyle/>
+          <a:p>
+            <a:fld id="{3A8071CD-55D8-0E40-9E87-5F5ADA6DF007}" type="slidenum">
+              <a:rPr lang="en-US" smtClean="0"/>
+              <a:t>29</a:t>
+            </a:fld>
+            <a:endParaRPr lang="en-US"/>
+          </a:p>
+        </p:txBody>
+      </p:sp>
+    </p:spTree>
+    <p:extLst>
+      <p:ext uri="{BB962C8B-B14F-4D97-AF65-F5344CB8AC3E}">
+        <p14:creationId xmlns:p14="http://schemas.microsoft.com/office/powerpoint/2010/main" val="244750481"/>
+      </p:ext>
+    </p:extLst>
+  </p:cSld>
+  <p:clrMapOvr>
+    <a:masterClrMapping/>
+  </p:clrMapOvr>
+</p:notes>
+</file>
+
+<file path=ppt/notesSlides/notesSlide15.xml><?xml version="1.0" encoding="utf-8"?>
+<p:notes xmlns:a="http://schemas.openxmlformats.org/drawingml/2006/main" xmlns:r="http://schemas.openxmlformats.org/officeDocument/2006/relationships" xmlns:p="http://schemas.openxmlformats.org/presentationml/2006/main">
+  <p:cSld>
+    <p:spTree>
+      <p:nvGrpSpPr>
+        <p:cNvPr id="1" name=""/>
+        <p:cNvGrpSpPr/>
+        <p:nvPr/>
+      </p:nvGrpSpPr>
+      <p:grpSpPr>
+        <a:xfrm>
+          <a:off x="0" y="0"/>
+          <a:ext cx="0" cy="0"/>
+          <a:chOff x="0" y="0"/>
+          <a:chExt cx="0" cy="0"/>
+        </a:xfrm>
+      </p:grpSpPr>
+      <p:sp>
+        <p:nvSpPr>
+          <p:cNvPr id="2" name="Slide Image Placeholder 1"/>
+          <p:cNvSpPr>
+            <a:spLocks noGrp="1" noRot="1" noChangeAspect="1"/>
+          </p:cNvSpPr>
+          <p:nvPr>
+            <p:ph type="sldImg"/>
+          </p:nvPr>
+        </p:nvSpPr>
+        <p:spPr/>
+      </p:sp>
+      <p:sp>
+        <p:nvSpPr>
+          <p:cNvPr id="3" name="Notes Placeholder 2"/>
+          <p:cNvSpPr>
+            <a:spLocks noGrp="1"/>
+          </p:cNvSpPr>
+          <p:nvPr>
+            <p:ph type="body" idx="1"/>
+          </p:nvPr>
+        </p:nvSpPr>
+        <p:spPr/>
+        <p:txBody>
+          <a:bodyPr/>
+          <a:lstStyle/>
+          <a:p>
+            <a:r>
+              <a:rPr lang="en-US" dirty="0" smtClean="0"/>
+              <a:t>https://</a:t>
+            </a:r>
+            <a:r>
+              <a:rPr lang="en-US" dirty="0" err="1" smtClean="0"/>
+              <a:t>material.angularjs.org</a:t>
+            </a:r>
+            <a:r>
+              <a:rPr lang="en-US" dirty="0" smtClean="0"/>
+              <a:t>/latest/</a:t>
+            </a:r>
+            <a:endParaRPr lang="en-US" dirty="0"/>
+          </a:p>
+        </p:txBody>
+      </p:sp>
+      <p:sp>
+        <p:nvSpPr>
+          <p:cNvPr id="4" name="Slide Number Placeholder 3"/>
+          <p:cNvSpPr>
+            <a:spLocks noGrp="1"/>
+          </p:cNvSpPr>
+          <p:nvPr>
+            <p:ph type="sldNum" sz="quarter" idx="10"/>
+          </p:nvPr>
+        </p:nvSpPr>
+        <p:spPr/>
+        <p:txBody>
+          <a:bodyPr/>
+          <a:lstStyle/>
+          <a:p>
+            <a:fld id="{3A8071CD-55D8-0E40-9E87-5F5ADA6DF007}" type="slidenum">
+              <a:rPr lang="en-US" smtClean="0"/>
+              <a:t>30</a:t>
+            </a:fld>
+            <a:endParaRPr lang="en-US"/>
+          </a:p>
+        </p:txBody>
+      </p:sp>
+    </p:spTree>
+    <p:extLst>
+      <p:ext uri="{BB962C8B-B14F-4D97-AF65-F5344CB8AC3E}">
+        <p14:creationId xmlns:p14="http://schemas.microsoft.com/office/powerpoint/2010/main" val="1680812851"/>
       </p:ext>
     </p:extLst>
   </p:cSld>
@@ -653,16 +1326,10 @@
           <a:p>
             <a:r>
               <a:rPr lang="en-US" dirty="0" smtClean="0"/>
-              <a:t>https://</a:t>
-            </a:r>
-            <a:r>
-              <a:rPr lang="en-US" dirty="0" err="1" smtClean="0"/>
-              <a:t>www.jianshu.com</a:t>
-            </a:r>
-            <a:r>
-              <a:rPr lang="en-US" dirty="0" smtClean="0"/>
-              <a:t>/p/65fa501e4683</a:t>
-            </a:r>
+              <a:t>http://es6.ruanyifeng.com/</a:t>
+            </a:r>
+          </a:p>
+          <a:p>
             <a:endParaRPr lang="en-US" dirty="0"/>
           </a:p>
         </p:txBody>
@@ -684,7 +1351,7 @@
           <a:p>
             <a:fld id="{3A8071CD-55D8-0E40-9E87-5F5ADA6DF007}" type="slidenum">
               <a:rPr lang="en-US" smtClean="0"/>
-              <a:t>12</a:t>
+              <a:t>10</a:t>
             </a:fld>
             <a:endParaRPr lang="en-US"/>
           </a:p>
@@ -693,7 +1360,7 @@
     </p:spTree>
     <p:extLst>
       <p:ext uri="{BB962C8B-B14F-4D97-AF65-F5344CB8AC3E}">
-        <p14:creationId xmlns:p14="http://schemas.microsoft.com/office/powerpoint/2010/main" val="319367657"/>
+        <p14:creationId xmlns:p14="http://schemas.microsoft.com/office/powerpoint/2010/main" val="786318014"/>
       </p:ext>
     </p:extLst>
   </p:cSld>
@@ -757,19 +1424,7 @@
             </a:r>
             <a:r>
               <a:rPr lang="en-US" dirty="0" smtClean="0"/>
-              <a:t>/p/10a7959033f8  https://www.w3schools.com/</a:t>
-            </a:r>
-            <a:r>
-              <a:rPr lang="en-US" dirty="0" err="1" smtClean="0"/>
-              <a:t>css</a:t>
-            </a:r>
-            <a:r>
-              <a:rPr lang="en-US" dirty="0" smtClean="0"/>
-              <a:t>/</a:t>
-            </a:r>
-            <a:r>
-              <a:rPr lang="en-US" dirty="0" err="1" smtClean="0"/>
-              <a:t>css_positioning.asp</a:t>
+              <a:t>/p/65fa501e4683</a:t>
             </a:r>
             <a:endParaRPr lang="en-US" dirty="0"/>
           </a:p>
@@ -792,7 +1447,7 @@
           <a:p>
             <a:fld id="{3A8071CD-55D8-0E40-9E87-5F5ADA6DF007}" type="slidenum">
               <a:rPr lang="en-US" smtClean="0"/>
-              <a:t>13</a:t>
+              <a:t>12</a:t>
             </a:fld>
             <a:endParaRPr lang="en-US"/>
           </a:p>
@@ -801,7 +1456,7 @@
     </p:spTree>
     <p:extLst>
       <p:ext uri="{BB962C8B-B14F-4D97-AF65-F5344CB8AC3E}">
-        <p14:creationId xmlns:p14="http://schemas.microsoft.com/office/powerpoint/2010/main" val="1050577346"/>
+        <p14:creationId xmlns:p14="http://schemas.microsoft.com/office/powerpoint/2010/main" val="319367657"/>
       </p:ext>
     </p:extLst>
   </p:cSld>
@@ -857,7 +1512,27 @@
           <a:p>
             <a:r>
               <a:rPr lang="en-US" dirty="0" smtClean="0"/>
-              <a:t>http://es6.ruanyifeng.com/</a:t>
+              <a:t>https://</a:t>
+            </a:r>
+            <a:r>
+              <a:rPr lang="en-US" dirty="0" err="1" smtClean="0"/>
+              <a:t>www.jianshu.com</a:t>
+            </a:r>
+            <a:r>
+              <a:rPr lang="en-US" dirty="0" smtClean="0"/>
+              <a:t>/p/10a7959033f8  https://www.w3schools.com/</a:t>
+            </a:r>
+            <a:r>
+              <a:rPr lang="en-US" dirty="0" err="1" smtClean="0"/>
+              <a:t>css</a:t>
+            </a:r>
+            <a:r>
+              <a:rPr lang="en-US" dirty="0" smtClean="0"/>
+              <a:t>/</a:t>
+            </a:r>
+            <a:r>
+              <a:rPr lang="en-US" dirty="0" err="1" smtClean="0"/>
+              <a:t>css_positioning.asp</a:t>
             </a:r>
             <a:endParaRPr lang="en-US" dirty="0"/>
           </a:p>
@@ -880,7 +1555,7 @@
           <a:p>
             <a:fld id="{3A8071CD-55D8-0E40-9E87-5F5ADA6DF007}" type="slidenum">
               <a:rPr lang="en-US" smtClean="0"/>
-              <a:t>14</a:t>
+              <a:t>13</a:t>
             </a:fld>
             <a:endParaRPr lang="en-US"/>
           </a:p>
@@ -889,7 +1564,7 @@
     </p:spTree>
     <p:extLst>
       <p:ext uri="{BB962C8B-B14F-4D97-AF65-F5344CB8AC3E}">
-        <p14:creationId xmlns:p14="http://schemas.microsoft.com/office/powerpoint/2010/main" val="442908588"/>
+        <p14:creationId xmlns:p14="http://schemas.microsoft.com/office/powerpoint/2010/main" val="1050577346"/>
       </p:ext>
     </p:extLst>
   </p:cSld>
@@ -943,66 +1618,10 @@
           <a:bodyPr/>
           <a:lstStyle/>
           <a:p>
-            <a:pPr marL="0" marR="0" indent="0" algn="l" defTabSz="914400" rtl="0" eaLnBrk="1" fontAlgn="auto" latinLnBrk="0" hangingPunct="1">
-              <a:lnSpc>
-                <a:spcPct val="100000"/>
-              </a:lnSpc>
-              <a:spcBef>
-                <a:spcPts val="0"/>
-              </a:spcBef>
-              <a:spcAft>
-                <a:spcPts val="0"/>
-              </a:spcAft>
-              <a:buClrTx/>
-              <a:buSzTx/>
-              <a:buFontTx/>
-              <a:buNone/>
-              <a:tabLst/>
-              <a:defRPr/>
-            </a:pPr>
             <a:r>
               <a:rPr lang="en-US" dirty="0" smtClean="0"/>
-              <a:t>http://</a:t>
-            </a:r>
-            <a:r>
-              <a:rPr lang="en-US" dirty="0" err="1" smtClean="0"/>
-              <a:t>www.ruanyifeng.com</a:t>
-            </a:r>
-            <a:r>
-              <a:rPr lang="en-US" dirty="0" smtClean="0"/>
-              <a:t>/blog/2015/03/</a:t>
-            </a:r>
-            <a:r>
-              <a:rPr lang="en-US" dirty="0" err="1" smtClean="0"/>
-              <a:t>react.html</a:t>
-            </a:r>
-            <a:r>
-              <a:rPr lang="en-US" dirty="0" smtClean="0"/>
-              <a:t> https://</a:t>
-            </a:r>
-            <a:r>
-              <a:rPr lang="en-US" dirty="0" err="1" smtClean="0"/>
-              <a:t>github.com</a:t>
-            </a:r>
-            <a:r>
-              <a:rPr lang="en-US" dirty="0" smtClean="0"/>
-              <a:t>/</a:t>
-            </a:r>
-            <a:r>
-              <a:rPr lang="en-US" dirty="0" err="1" smtClean="0"/>
-              <a:t>dvajs</a:t>
-            </a:r>
-            <a:r>
-              <a:rPr lang="en-US" dirty="0" smtClean="0"/>
-              <a:t>/</a:t>
-            </a:r>
-            <a:r>
-              <a:rPr lang="en-US" dirty="0" err="1" smtClean="0"/>
-              <a:t>dva-knowledgemap</a:t>
-            </a:r>
-            <a:endParaRPr lang="en-US" dirty="0" smtClean="0"/>
-          </a:p>
-          <a:p>
+              <a:t>http://es6.ruanyifeng.com/</a:t>
+            </a:r>
             <a:endParaRPr lang="en-US" dirty="0"/>
           </a:p>
         </p:txBody>
@@ -1024,7 +1643,7 @@
           <a:p>
             <a:fld id="{3A8071CD-55D8-0E40-9E87-5F5ADA6DF007}" type="slidenum">
               <a:rPr lang="en-US" smtClean="0"/>
-              <a:t>16</a:t>
+              <a:t>14</a:t>
             </a:fld>
             <a:endParaRPr lang="en-US"/>
           </a:p>
@@ -1033,7 +1652,7 @@
     </p:spTree>
     <p:extLst>
       <p:ext uri="{BB962C8B-B14F-4D97-AF65-F5344CB8AC3E}">
-        <p14:creationId xmlns:p14="http://schemas.microsoft.com/office/powerpoint/2010/main" val="202348755"/>
+        <p14:creationId xmlns:p14="http://schemas.microsoft.com/office/powerpoint/2010/main" val="442908588"/>
       </p:ext>
     </p:extLst>
   </p:cSld>
@@ -1087,36 +1706,6 @@
           <a:bodyPr/>
           <a:lstStyle/>
           <a:p>
-            <a:r>
-              <a:rPr lang="en-US" dirty="0" smtClean="0"/>
-              <a:t>https://</a:t>
-            </a:r>
-            <a:r>
-              <a:rPr lang="en-US" dirty="0" err="1" smtClean="0"/>
-              <a:t>github.com</a:t>
-            </a:r>
-            <a:r>
-              <a:rPr lang="en-US" dirty="0" smtClean="0"/>
-              <a:t>/</a:t>
-            </a:r>
-            <a:r>
-              <a:rPr lang="en-US" dirty="0" err="1" smtClean="0"/>
-              <a:t>ruanyf</a:t>
-            </a:r>
-            <a:r>
-              <a:rPr lang="en-US" dirty="0" smtClean="0"/>
-              <a:t>/react-demos</a:t>
-            </a:r>
-            <a:r>
-              <a:rPr lang="zh-CN" altLang="en-US" dirty="0" smtClean="0"/>
-              <a:t> 阮一峰</a:t>
-            </a:r>
-            <a:endParaRPr lang="en-US" altLang="zh-CN" dirty="0" smtClean="0"/>
-          </a:p>
-          <a:p>
-            <a:endParaRPr lang="en-US" dirty="0" smtClean="0"/>
-          </a:p>
-          <a:p>
             <a:pPr marL="0" marR="0" indent="0" algn="l" defTabSz="914400" rtl="0" eaLnBrk="1" fontAlgn="auto" latinLnBrk="0" hangingPunct="1">
               <a:lnSpc>
                 <a:spcPct val="100000"/>
@@ -1136,29 +1725,45 @@
             </a:pPr>
             <a:r>
               <a:rPr lang="en-US" dirty="0" smtClean="0"/>
-              <a:t>https://</a:t>
+              <a:t>http://</a:t>
             </a:r>
             <a:r>
               <a:rPr lang="en-US" dirty="0" err="1" smtClean="0"/>
-              <a:t>reactjs.org</a:t>
+              <a:t>www.ruanyifeng.com</a:t>
             </a:r>
             <a:r>
               <a:rPr lang="en-US" dirty="0" smtClean="0"/>
-              <a:t>/tutorial/</a:t>
+              <a:t>/blog/2015/03/</a:t>
             </a:r>
             <a:r>
               <a:rPr lang="en-US" dirty="0" err="1" smtClean="0"/>
-              <a:t>tutorial.html</a:t>
+              <a:t>react.html</a:t>
             </a:r>
             <a:r>
               <a:rPr lang="en-US" dirty="0" smtClean="0"/>
-              <a:t> </a:t>
-            </a:r>
-            <a:r>
-              <a:rPr lang="zh-CN" altLang="en-US" dirty="0" smtClean="0"/>
-              <a:t>官方教程</a:t>
-            </a:r>
-            <a:endParaRPr lang="en-US" altLang="zh-CN" dirty="0" smtClean="0"/>
+              <a:t> https://</a:t>
+            </a:r>
+            <a:r>
+              <a:rPr lang="en-US" dirty="0" err="1" smtClean="0"/>
+              <a:t>github.com</a:t>
+            </a:r>
+            <a:r>
+              <a:rPr lang="en-US" dirty="0" smtClean="0"/>
+              <a:t>/</a:t>
+            </a:r>
+            <a:r>
+              <a:rPr lang="en-US" dirty="0" err="1" smtClean="0"/>
+              <a:t>dvajs</a:t>
+            </a:r>
+            <a:r>
+              <a:rPr lang="en-US" dirty="0" smtClean="0"/>
+              <a:t>/</a:t>
+            </a:r>
+            <a:r>
+              <a:rPr lang="en-US" dirty="0" err="1" smtClean="0"/>
+              <a:t>dva-knowledgemap</a:t>
+            </a:r>
+            <a:endParaRPr lang="en-US" dirty="0" smtClean="0"/>
           </a:p>
           <a:p>
             <a:endParaRPr lang="en-US" dirty="0"/>
@@ -1182,7 +1787,7 @@
           <a:p>
             <a:fld id="{3A8071CD-55D8-0E40-9E87-5F5ADA6DF007}" type="slidenum">
               <a:rPr lang="en-US" smtClean="0"/>
-              <a:t>19</a:t>
+              <a:t>16</a:t>
             </a:fld>
             <a:endParaRPr lang="en-US"/>
           </a:p>
@@ -1191,7 +1796,7 @@
     </p:spTree>
     <p:extLst>
       <p:ext uri="{BB962C8B-B14F-4D97-AF65-F5344CB8AC3E}">
-        <p14:creationId xmlns:p14="http://schemas.microsoft.com/office/powerpoint/2010/main" val="210574395"/>
+        <p14:creationId xmlns:p14="http://schemas.microsoft.com/office/powerpoint/2010/main" val="202348755"/>
       </p:ext>
     </p:extLst>
   </p:cSld>
@@ -1251,6 +1856,164 @@
             </a:r>
             <a:r>
               <a:rPr lang="en-US" dirty="0" err="1" smtClean="0"/>
+              <a:t>github.com</a:t>
+            </a:r>
+            <a:r>
+              <a:rPr lang="en-US" dirty="0" smtClean="0"/>
+              <a:t>/</a:t>
+            </a:r>
+            <a:r>
+              <a:rPr lang="en-US" dirty="0" err="1" smtClean="0"/>
+              <a:t>ruanyf</a:t>
+            </a:r>
+            <a:r>
+              <a:rPr lang="en-US" dirty="0" smtClean="0"/>
+              <a:t>/react-demos</a:t>
+            </a:r>
+            <a:r>
+              <a:rPr lang="zh-CN" altLang="en-US" dirty="0" smtClean="0"/>
+              <a:t> 阮一峰</a:t>
+            </a:r>
+            <a:endParaRPr lang="en-US" altLang="zh-CN" dirty="0" smtClean="0"/>
+          </a:p>
+          <a:p>
+            <a:endParaRPr lang="en-US" dirty="0" smtClean="0"/>
+          </a:p>
+          <a:p>
+            <a:pPr marL="0" marR="0" indent="0" algn="l" defTabSz="914400" rtl="0" eaLnBrk="1" fontAlgn="auto" latinLnBrk="0" hangingPunct="1">
+              <a:lnSpc>
+                <a:spcPct val="100000"/>
+              </a:lnSpc>
+              <a:spcBef>
+                <a:spcPts val="0"/>
+              </a:spcBef>
+              <a:spcAft>
+                <a:spcPts val="0"/>
+              </a:spcAft>
+              <a:buClrTx/>
+              <a:buSzTx/>
+              <a:buFontTx/>
+              <a:buNone/>
+              <a:tabLst/>
+              <a:defRPr/>
+            </a:pPr>
+            <a:r>
+              <a:rPr lang="en-US" dirty="0" smtClean="0"/>
+              <a:t>https://</a:t>
+            </a:r>
+            <a:r>
+              <a:rPr lang="en-US" dirty="0" err="1" smtClean="0"/>
+              <a:t>reactjs.org</a:t>
+            </a:r>
+            <a:r>
+              <a:rPr lang="en-US" dirty="0" smtClean="0"/>
+              <a:t>/tutorial/</a:t>
+            </a:r>
+            <a:r>
+              <a:rPr lang="en-US" dirty="0" err="1" smtClean="0"/>
+              <a:t>tutorial.html</a:t>
+            </a:r>
+            <a:r>
+              <a:rPr lang="en-US" dirty="0" smtClean="0"/>
+              <a:t> </a:t>
+            </a:r>
+            <a:r>
+              <a:rPr lang="zh-CN" altLang="en-US" dirty="0" smtClean="0"/>
+              <a:t>官方教程</a:t>
+            </a:r>
+            <a:endParaRPr lang="en-US" altLang="zh-CN" dirty="0" smtClean="0"/>
+          </a:p>
+          <a:p>
+            <a:endParaRPr lang="en-US" dirty="0"/>
+          </a:p>
+        </p:txBody>
+      </p:sp>
+      <p:sp>
+        <p:nvSpPr>
+          <p:cNvPr id="4" name="Slide Number Placeholder 3"/>
+          <p:cNvSpPr>
+            <a:spLocks noGrp="1"/>
+          </p:cNvSpPr>
+          <p:nvPr>
+            <p:ph type="sldNum" sz="quarter" idx="10"/>
+          </p:nvPr>
+        </p:nvSpPr>
+        <p:spPr/>
+        <p:txBody>
+          <a:bodyPr/>
+          <a:lstStyle/>
+          <a:p>
+            <a:fld id="{3A8071CD-55D8-0E40-9E87-5F5ADA6DF007}" type="slidenum">
+              <a:rPr lang="en-US" smtClean="0"/>
+              <a:t>19</a:t>
+            </a:fld>
+            <a:endParaRPr lang="en-US"/>
+          </a:p>
+        </p:txBody>
+      </p:sp>
+    </p:spTree>
+    <p:extLst>
+      <p:ext uri="{BB962C8B-B14F-4D97-AF65-F5344CB8AC3E}">
+        <p14:creationId xmlns:p14="http://schemas.microsoft.com/office/powerpoint/2010/main" val="210574395"/>
+      </p:ext>
+    </p:extLst>
+  </p:cSld>
+  <p:clrMapOvr>
+    <a:masterClrMapping/>
+  </p:clrMapOvr>
+</p:notes>
+</file>
+
+<file path=ppt/notesSlides/notesSlide8.xml><?xml version="1.0" encoding="utf-8"?>
+<p:notes xmlns:a="http://schemas.openxmlformats.org/drawingml/2006/main" xmlns:r="http://schemas.openxmlformats.org/officeDocument/2006/relationships" xmlns:p="http://schemas.openxmlformats.org/presentationml/2006/main">
+  <p:cSld>
+    <p:spTree>
+      <p:nvGrpSpPr>
+        <p:cNvPr id="1" name=""/>
+        <p:cNvGrpSpPr/>
+        <p:nvPr/>
+      </p:nvGrpSpPr>
+      <p:grpSpPr>
+        <a:xfrm>
+          <a:off x="0" y="0"/>
+          <a:ext cx="0" cy="0"/>
+          <a:chOff x="0" y="0"/>
+          <a:chExt cx="0" cy="0"/>
+        </a:xfrm>
+      </p:grpSpPr>
+      <p:sp>
+        <p:nvSpPr>
+          <p:cNvPr id="2" name="Slide Image Placeholder 1"/>
+          <p:cNvSpPr>
+            <a:spLocks noGrp="1" noRot="1" noChangeAspect="1"/>
+          </p:cNvSpPr>
+          <p:nvPr>
+            <p:ph type="sldImg"/>
+          </p:nvPr>
+        </p:nvSpPr>
+        <p:spPr/>
+      </p:sp>
+      <p:sp>
+        <p:nvSpPr>
+          <p:cNvPr id="3" name="Notes Placeholder 2"/>
+          <p:cNvSpPr>
+            <a:spLocks noGrp="1"/>
+          </p:cNvSpPr>
+          <p:nvPr>
+            <p:ph type="body" idx="1"/>
+          </p:nvPr>
+        </p:nvSpPr>
+        <p:spPr/>
+        <p:txBody>
+          <a:bodyPr/>
+          <a:lstStyle/>
+          <a:p>
+            <a:r>
+              <a:rPr lang="en-US" dirty="0" smtClean="0"/>
+              <a:t>https://</a:t>
+            </a:r>
+            <a:r>
+              <a:rPr lang="en-US" dirty="0" err="1" smtClean="0"/>
               <a:t>reactjs.org</a:t>
             </a:r>
             <a:r>
@@ -1311,6 +2074,134 @@
     <p:extLst>
       <p:ext uri="{BB962C8B-B14F-4D97-AF65-F5344CB8AC3E}">
         <p14:creationId xmlns:p14="http://schemas.microsoft.com/office/powerpoint/2010/main" val="1767943556"/>
+      </p:ext>
+    </p:extLst>
+  </p:cSld>
+  <p:clrMapOvr>
+    <a:masterClrMapping/>
+  </p:clrMapOvr>
+</p:notes>
+</file>
+
+<file path=ppt/notesSlides/notesSlide9.xml><?xml version="1.0" encoding="utf-8"?>
+<p:notes xmlns:a="http://schemas.openxmlformats.org/drawingml/2006/main" xmlns:r="http://schemas.openxmlformats.org/officeDocument/2006/relationships" xmlns:p="http://schemas.openxmlformats.org/presentationml/2006/main">
+  <p:cSld>
+    <p:spTree>
+      <p:nvGrpSpPr>
+        <p:cNvPr id="1" name=""/>
+        <p:cNvGrpSpPr/>
+        <p:nvPr/>
+      </p:nvGrpSpPr>
+      <p:grpSpPr>
+        <a:xfrm>
+          <a:off x="0" y="0"/>
+          <a:ext cx="0" cy="0"/>
+          <a:chOff x="0" y="0"/>
+          <a:chExt cx="0" cy="0"/>
+        </a:xfrm>
+      </p:grpSpPr>
+      <p:sp>
+        <p:nvSpPr>
+          <p:cNvPr id="2" name="Slide Image Placeholder 1"/>
+          <p:cNvSpPr>
+            <a:spLocks noGrp="1" noRot="1" noChangeAspect="1"/>
+          </p:cNvSpPr>
+          <p:nvPr>
+            <p:ph type="sldImg"/>
+          </p:nvPr>
+        </p:nvSpPr>
+        <p:spPr/>
+      </p:sp>
+      <p:sp>
+        <p:nvSpPr>
+          <p:cNvPr id="3" name="Notes Placeholder 2"/>
+          <p:cNvSpPr>
+            <a:spLocks noGrp="1"/>
+          </p:cNvSpPr>
+          <p:nvPr>
+            <p:ph type="body" idx="1"/>
+          </p:nvPr>
+        </p:nvSpPr>
+        <p:spPr/>
+        <p:txBody>
+          <a:bodyPr/>
+          <a:lstStyle/>
+          <a:p>
+            <a:r>
+              <a:rPr lang="en-US" dirty="0" smtClean="0"/>
+              <a:t>https://</a:t>
+            </a:r>
+            <a:r>
+              <a:rPr lang="en-US" dirty="0" err="1" smtClean="0"/>
+              <a:t>redux.js.org</a:t>
+            </a:r>
+            <a:r>
+              <a:rPr lang="en-US" dirty="0" smtClean="0"/>
+              <a:t>/</a:t>
+            </a:r>
+          </a:p>
+          <a:p>
+            <a:r>
+              <a:rPr lang="en-US" dirty="0" smtClean="0"/>
+              <a:t>http://</a:t>
+            </a:r>
+            <a:r>
+              <a:rPr lang="en-US" dirty="0" err="1" smtClean="0"/>
+              <a:t>cn.redux.js.org</a:t>
+            </a:r>
+            <a:r>
+              <a:rPr lang="en-US" dirty="0" smtClean="0"/>
+              <a:t>/</a:t>
+            </a:r>
+          </a:p>
+          <a:p>
+            <a:r>
+              <a:rPr lang="en-US" dirty="0" smtClean="0"/>
+              <a:t>http://</a:t>
+            </a:r>
+            <a:r>
+              <a:rPr lang="en-US" dirty="0" err="1" smtClean="0"/>
+              <a:t>www.ruanyifeng.com</a:t>
+            </a:r>
+            <a:r>
+              <a:rPr lang="en-US" dirty="0" smtClean="0"/>
+              <a:t>/blog/2016/09/</a:t>
+            </a:r>
+            <a:r>
+              <a:rPr lang="en-US" dirty="0" err="1" smtClean="0"/>
+              <a:t>redux_tutorial_part_one_basic_usages.html</a:t>
+            </a:r>
+            <a:endParaRPr lang="en-US" dirty="0"/>
+          </a:p>
+        </p:txBody>
+      </p:sp>
+      <p:sp>
+        <p:nvSpPr>
+          <p:cNvPr id="4" name="Slide Number Placeholder 3"/>
+          <p:cNvSpPr>
+            <a:spLocks noGrp="1"/>
+          </p:cNvSpPr>
+          <p:nvPr>
+            <p:ph type="sldNum" sz="quarter" idx="10"/>
+          </p:nvPr>
+        </p:nvSpPr>
+        <p:spPr/>
+        <p:txBody>
+          <a:bodyPr/>
+          <a:lstStyle/>
+          <a:p>
+            <a:fld id="{3A8071CD-55D8-0E40-9E87-5F5ADA6DF007}" type="slidenum">
+              <a:rPr lang="en-US" smtClean="0"/>
+              <a:t>21</a:t>
+            </a:fld>
+            <a:endParaRPr lang="en-US"/>
+          </a:p>
+        </p:txBody>
+      </p:sp>
+    </p:spTree>
+    <p:extLst>
+      <p:ext uri="{BB962C8B-B14F-4D97-AF65-F5344CB8AC3E}">
+        <p14:creationId xmlns:p14="http://schemas.microsoft.com/office/powerpoint/2010/main" val="1619371975"/>
       </p:ext>
     </p:extLst>
   </p:cSld>
@@ -1534,7 +2425,7 @@
             <a:fld id="{B61BEF0D-F0BB-DE4B-95CE-6DB70DBA9567}" type="datetimeFigureOut">
               <a:rPr lang="en-US" dirty="0"/>
               <a:pPr/>
-              <a:t>2/10/18</a:t>
+              <a:t>2/17/18</a:t>
             </a:fld>
             <a:endParaRPr lang="en-US" dirty="0"/>
           </a:p>
@@ -1822,7 +2713,7 @@
             <a:fld id="{B61BEF0D-F0BB-DE4B-95CE-6DB70DBA9567}" type="datetimeFigureOut">
               <a:rPr lang="en-US" dirty="0"/>
               <a:pPr/>
-              <a:t>2/10/18</a:t>
+              <a:t>2/17/18</a:t>
             </a:fld>
             <a:endParaRPr lang="en-US" dirty="0"/>
           </a:p>
@@ -2078,7 +2969,7 @@
             <a:fld id="{B61BEF0D-F0BB-DE4B-95CE-6DB70DBA9567}" type="datetimeFigureOut">
               <a:rPr lang="en-US" dirty="0"/>
               <a:pPr/>
-              <a:t>2/10/18</a:t>
+              <a:t>2/17/18</a:t>
             </a:fld>
             <a:endParaRPr lang="en-US" dirty="0"/>
           </a:p>
@@ -2544,7 +3435,7 @@
             <a:fld id="{B61BEF0D-F0BB-DE4B-95CE-6DB70DBA9567}" type="datetimeFigureOut">
               <a:rPr lang="en-US" dirty="0"/>
               <a:pPr/>
-              <a:t>2/10/18</a:t>
+              <a:t>2/17/18</a:t>
             </a:fld>
             <a:endParaRPr lang="en-US" dirty="0"/>
           </a:p>
@@ -2721,7 +3612,7 @@
             <a:fld id="{B61BEF0D-F0BB-DE4B-95CE-6DB70DBA9567}" type="datetimeFigureOut">
               <a:rPr lang="en-US" dirty="0"/>
               <a:pPr/>
-              <a:t>2/10/18</a:t>
+              <a:t>2/17/18</a:t>
             </a:fld>
             <a:endParaRPr lang="en-US" dirty="0"/>
           </a:p>
@@ -3294,7 +4185,7 @@
             <a:fld id="{B61BEF0D-F0BB-DE4B-95CE-6DB70DBA9567}" type="datetimeFigureOut">
               <a:rPr lang="en-US" dirty="0"/>
               <a:pPr/>
-              <a:t>2/10/18</a:t>
+              <a:t>2/17/18</a:t>
             </a:fld>
             <a:endParaRPr lang="en-US" dirty="0"/>
           </a:p>
@@ -3623,7 +4514,7 @@
             <a:fld id="{B61BEF0D-F0BB-DE4B-95CE-6DB70DBA9567}" type="datetimeFigureOut">
               <a:rPr lang="en-US" dirty="0"/>
               <a:pPr/>
-              <a:t>2/10/18</a:t>
+              <a:t>2/17/18</a:t>
             </a:fld>
             <a:endParaRPr lang="en-US" dirty="0"/>
           </a:p>
@@ -3795,7 +4686,7 @@
             <a:fld id="{B61BEF0D-F0BB-DE4B-95CE-6DB70DBA9567}" type="datetimeFigureOut">
               <a:rPr lang="en-US" dirty="0"/>
               <a:pPr/>
-              <a:t>2/10/18</a:t>
+              <a:t>2/17/18</a:t>
             </a:fld>
             <a:endParaRPr lang="en-US" dirty="0"/>
           </a:p>
@@ -3972,7 +4863,7 @@
             <a:fld id="{B61BEF0D-F0BB-DE4B-95CE-6DB70DBA9567}" type="datetimeFigureOut">
               <a:rPr lang="en-US" dirty="0"/>
               <a:pPr/>
-              <a:t>2/10/18</a:t>
+              <a:t>2/17/18</a:t>
             </a:fld>
             <a:endParaRPr lang="en-US" dirty="0"/>
           </a:p>
@@ -4139,7 +5030,7 @@
             <a:fld id="{B61BEF0D-F0BB-DE4B-95CE-6DB70DBA9567}" type="datetimeFigureOut">
               <a:rPr lang="en-US" dirty="0"/>
               <a:pPr/>
-              <a:t>2/10/18</a:t>
+              <a:t>2/17/18</a:t>
             </a:fld>
             <a:endParaRPr lang="en-US" dirty="0"/>
           </a:p>
@@ -4393,7 +5284,7 @@
             <a:fld id="{B61BEF0D-F0BB-DE4B-95CE-6DB70DBA9567}" type="datetimeFigureOut">
               <a:rPr lang="en-US" dirty="0"/>
               <a:pPr/>
-              <a:t>2/10/18</a:t>
+              <a:t>2/17/18</a:t>
             </a:fld>
             <a:endParaRPr lang="en-US" dirty="0"/>
           </a:p>
@@ -4682,7 +5573,7 @@
             <a:fld id="{B61BEF0D-F0BB-DE4B-95CE-6DB70DBA9567}" type="datetimeFigureOut">
               <a:rPr lang="en-US" dirty="0"/>
               <a:pPr/>
-              <a:t>2/10/18</a:t>
+              <a:t>2/17/18</a:t>
             </a:fld>
             <a:endParaRPr lang="en-US" dirty="0"/>
           </a:p>
@@ -5109,7 +6000,7 @@
             <a:fld id="{B61BEF0D-F0BB-DE4B-95CE-6DB70DBA9567}" type="datetimeFigureOut">
               <a:rPr lang="en-US" dirty="0"/>
               <a:pPr/>
-              <a:t>2/10/18</a:t>
+              <a:t>2/17/18</a:t>
             </a:fld>
             <a:endParaRPr lang="en-US" dirty="0"/>
           </a:p>
@@ -5224,7 +6115,7 @@
             <a:fld id="{B61BEF0D-F0BB-DE4B-95CE-6DB70DBA9567}" type="datetimeFigureOut">
               <a:rPr lang="en-US" dirty="0"/>
               <a:pPr/>
-              <a:t>2/10/18</a:t>
+              <a:t>2/17/18</a:t>
             </a:fld>
             <a:endParaRPr lang="en-US" dirty="0"/>
           </a:p>
@@ -5316,7 +6207,7 @@
             <a:fld id="{B61BEF0D-F0BB-DE4B-95CE-6DB70DBA9567}" type="datetimeFigureOut">
               <a:rPr lang="en-US" dirty="0"/>
               <a:pPr/>
-              <a:t>2/10/18</a:t>
+              <a:t>2/17/18</a:t>
             </a:fld>
             <a:endParaRPr lang="en-US" dirty="0"/>
           </a:p>
@@ -5596,7 +6487,7 @@
             <a:fld id="{B61BEF0D-F0BB-DE4B-95CE-6DB70DBA9567}" type="datetimeFigureOut">
               <a:rPr lang="en-US" dirty="0"/>
               <a:pPr/>
-              <a:t>2/10/18</a:t>
+              <a:t>2/17/18</a:t>
             </a:fld>
             <a:endParaRPr lang="en-US" dirty="0"/>
           </a:p>
@@ -5884,7 +6775,7 @@
             <a:fld id="{B61BEF0D-F0BB-DE4B-95CE-6DB70DBA9567}" type="datetimeFigureOut">
               <a:rPr lang="en-US" dirty="0"/>
               <a:pPr/>
-              <a:t>2/10/18</a:t>
+              <a:t>2/17/18</a:t>
             </a:fld>
             <a:endParaRPr lang="en-US" dirty="0"/>
           </a:p>
@@ -6112,7 +7003,7 @@
             <a:fld id="{B61BEF0D-F0BB-DE4B-95CE-6DB70DBA9567}" type="datetimeFigureOut">
               <a:rPr lang="en-US" dirty="0"/>
               <a:pPr/>
-              <a:t>2/10/18</a:t>
+              <a:t>2/17/18</a:t>
             </a:fld>
             <a:endParaRPr lang="en-US" dirty="0"/>
           </a:p>
@@ -8135,6 +9026,13 @@
   <p:clrMapOvr>
     <a:masterClrMapping/>
   </p:clrMapOvr>
+  <p:timing>
+    <p:tnLst>
+      <p:par>
+        <p:cTn id="1" dur="indefinite" restart="never" nodeType="tmRoot"/>
+      </p:par>
+    </p:tnLst>
+  </p:timing>
 </p:sld>
 </file>
 
@@ -8171,6 +9069,544 @@
           <a:lstStyle/>
           <a:p>
             <a:r>
+              <a:rPr lang="en-US" altLang="zh-CN" dirty="0" err="1" smtClean="0"/>
+              <a:t>Redux</a:t>
+            </a:r>
+            <a:r>
+              <a:rPr lang="zh-CN" altLang="en-US" dirty="0" smtClean="0"/>
+              <a:t>入门</a:t>
+            </a:r>
+            <a:endParaRPr lang="en-US" dirty="0"/>
+          </a:p>
+        </p:txBody>
+      </p:sp>
+      <p:sp>
+        <p:nvSpPr>
+          <p:cNvPr id="3" name="Text Placeholder 2"/>
+          <p:cNvSpPr>
+            <a:spLocks noGrp="1"/>
+          </p:cNvSpPr>
+          <p:nvPr>
+            <p:ph type="body" idx="1"/>
+          </p:nvPr>
+        </p:nvSpPr>
+        <p:spPr/>
+        <p:txBody>
+          <a:bodyPr/>
+          <a:lstStyle/>
+          <a:p>
+            <a:r>
+              <a:rPr lang="en-US" dirty="0" smtClean="0"/>
+              <a:t>State Management Tool</a:t>
+            </a:r>
+            <a:endParaRPr lang="en-US" dirty="0"/>
+          </a:p>
+        </p:txBody>
+      </p:sp>
+    </p:spTree>
+    <p:extLst>
+      <p:ext uri="{BB962C8B-B14F-4D97-AF65-F5344CB8AC3E}">
+        <p14:creationId xmlns:p14="http://schemas.microsoft.com/office/powerpoint/2010/main" val="112265536"/>
+      </p:ext>
+    </p:extLst>
+  </p:cSld>
+  <p:clrMapOvr>
+    <a:masterClrMapping/>
+  </p:clrMapOvr>
+  <p:timing>
+    <p:tnLst>
+      <p:par>
+        <p:cTn id="1" dur="indefinite" restart="never" nodeType="tmRoot"/>
+      </p:par>
+    </p:tnLst>
+  </p:timing>
+</p:sld>
+</file>
+
+<file path=ppt/slides/slide22.xml><?xml version="1.0" encoding="utf-8"?>
+<p:sld xmlns:a="http://schemas.openxmlformats.org/drawingml/2006/main" xmlns:r="http://schemas.openxmlformats.org/officeDocument/2006/relationships" xmlns:p="http://schemas.openxmlformats.org/presentationml/2006/main">
+  <p:cSld>
+    <p:spTree>
+      <p:nvGrpSpPr>
+        <p:cNvPr id="1" name=""/>
+        <p:cNvGrpSpPr/>
+        <p:nvPr/>
+      </p:nvGrpSpPr>
+      <p:grpSpPr>
+        <a:xfrm>
+          <a:off x="0" y="0"/>
+          <a:ext cx="0" cy="0"/>
+          <a:chOff x="0" y="0"/>
+          <a:chExt cx="0" cy="0"/>
+        </a:xfrm>
+      </p:grpSpPr>
+      <p:sp>
+        <p:nvSpPr>
+          <p:cNvPr id="2" name="Title 1"/>
+          <p:cNvSpPr>
+            <a:spLocks noGrp="1"/>
+          </p:cNvSpPr>
+          <p:nvPr>
+            <p:ph type="title"/>
+          </p:nvPr>
+        </p:nvSpPr>
+        <p:spPr/>
+        <p:txBody>
+          <a:bodyPr/>
+          <a:lstStyle/>
+          <a:p>
+            <a:r>
+              <a:rPr lang="en-US" dirty="0" err="1" smtClean="0"/>
+              <a:t>Redux</a:t>
+            </a:r>
+            <a:endParaRPr lang="en-US" dirty="0"/>
+          </a:p>
+        </p:txBody>
+      </p:sp>
+      <p:sp>
+        <p:nvSpPr>
+          <p:cNvPr id="3" name="Content Placeholder 2"/>
+          <p:cNvSpPr>
+            <a:spLocks noGrp="1"/>
+          </p:cNvSpPr>
+          <p:nvPr>
+            <p:ph idx="1"/>
+          </p:nvPr>
+        </p:nvSpPr>
+        <p:spPr>
+          <a:xfrm>
+            <a:off x="1141413" y="2666999"/>
+            <a:ext cx="9905998" cy="3764798"/>
+          </a:xfrm>
+        </p:spPr>
+        <p:txBody>
+          <a:bodyPr>
+            <a:normAutofit/>
+          </a:bodyPr>
+          <a:lstStyle/>
+          <a:p>
+            <a:r>
+              <a:rPr lang="zh-TW" altLang="en-US" sz="2800" dirty="0" smtClean="0">
+                <a:effectLst/>
+              </a:rPr>
+              <a:t>你</a:t>
+            </a:r>
+            <a:r>
+              <a:rPr lang="zh-TW" altLang="en-US" sz="2800" dirty="0">
+                <a:effectLst/>
+              </a:rPr>
+              <a:t>可能不需要 </a:t>
+            </a:r>
+            <a:r>
+              <a:rPr lang="en-US" altLang="zh-TW" sz="2800" dirty="0" err="1">
+                <a:effectLst/>
+              </a:rPr>
+              <a:t>Redux</a:t>
+            </a:r>
+            <a:endParaRPr lang="en-US" altLang="zh-TW" sz="2800" dirty="0">
+              <a:effectLst/>
+            </a:endParaRPr>
+          </a:p>
+          <a:p>
+            <a:r>
+              <a:rPr lang="en-US" altLang="zh-CN" sz="2800" dirty="0">
+                <a:effectLst/>
+              </a:rPr>
+              <a:t>Web </a:t>
+            </a:r>
+            <a:r>
+              <a:rPr lang="zh-CN" altLang="en-US" sz="2800" dirty="0">
+                <a:effectLst/>
+              </a:rPr>
+              <a:t>应用是一个状态机，视图与状态是一一对应的</a:t>
+            </a:r>
+            <a:r>
+              <a:rPr lang="zh-CN" altLang="en-US" sz="2800" dirty="0" smtClean="0">
+                <a:effectLst/>
+              </a:rPr>
+              <a:t>。</a:t>
+            </a:r>
+            <a:endParaRPr lang="en-US" altLang="zh-CN" sz="2800" dirty="0" smtClean="0">
+              <a:effectLst/>
+            </a:endParaRPr>
+          </a:p>
+          <a:p>
+            <a:r>
+              <a:rPr lang="en-US" sz="2800" dirty="0">
+                <a:effectLst/>
+              </a:rPr>
+              <a:t>Store</a:t>
+            </a:r>
+          </a:p>
+          <a:p>
+            <a:r>
+              <a:rPr lang="en-US" sz="2800" dirty="0">
+                <a:effectLst/>
+              </a:rPr>
+              <a:t>Action</a:t>
+            </a:r>
+          </a:p>
+          <a:p>
+            <a:r>
+              <a:rPr lang="en-US" sz="2800" dirty="0">
+                <a:effectLst/>
+              </a:rPr>
+              <a:t>dispatch</a:t>
+            </a:r>
+          </a:p>
+          <a:p>
+            <a:r>
+              <a:rPr lang="en-US" sz="2800" dirty="0">
+                <a:effectLst/>
+              </a:rPr>
+              <a:t>Reducer</a:t>
+            </a:r>
+          </a:p>
+          <a:p>
+            <a:endParaRPr lang="en-US" sz="2800" dirty="0"/>
+          </a:p>
+        </p:txBody>
+      </p:sp>
+    </p:spTree>
+    <p:extLst>
+      <p:ext uri="{BB962C8B-B14F-4D97-AF65-F5344CB8AC3E}">
+        <p14:creationId xmlns:p14="http://schemas.microsoft.com/office/powerpoint/2010/main" val="1327000956"/>
+      </p:ext>
+    </p:extLst>
+  </p:cSld>
+  <p:clrMapOvr>
+    <a:masterClrMapping/>
+  </p:clrMapOvr>
+  <p:timing>
+    <p:tnLst>
+      <p:par>
+        <p:cTn id="1" dur="indefinite" restart="never" nodeType="tmRoot"/>
+      </p:par>
+    </p:tnLst>
+  </p:timing>
+</p:sld>
+</file>
+
+<file path=ppt/slides/slide23.xml><?xml version="1.0" encoding="utf-8"?>
+<p:sld xmlns:a="http://schemas.openxmlformats.org/drawingml/2006/main" xmlns:r="http://schemas.openxmlformats.org/officeDocument/2006/relationships" xmlns:p="http://schemas.openxmlformats.org/presentationml/2006/main">
+  <p:cSld>
+    <p:spTree>
+      <p:nvGrpSpPr>
+        <p:cNvPr id="1" name=""/>
+        <p:cNvGrpSpPr/>
+        <p:nvPr/>
+      </p:nvGrpSpPr>
+      <p:grpSpPr>
+        <a:xfrm>
+          <a:off x="0" y="0"/>
+          <a:ext cx="0" cy="0"/>
+          <a:chOff x="0" y="0"/>
+          <a:chExt cx="0" cy="0"/>
+        </a:xfrm>
+      </p:grpSpPr>
+      <p:sp>
+        <p:nvSpPr>
+          <p:cNvPr id="2" name="Title 1"/>
+          <p:cNvSpPr>
+            <a:spLocks noGrp="1"/>
+          </p:cNvSpPr>
+          <p:nvPr>
+            <p:ph type="title"/>
+          </p:nvPr>
+        </p:nvSpPr>
+        <p:spPr/>
+        <p:txBody>
+          <a:bodyPr/>
+          <a:lstStyle/>
+          <a:p>
+            <a:endParaRPr lang="en-US"/>
+          </a:p>
+        </p:txBody>
+      </p:sp>
+      <p:pic>
+        <p:nvPicPr>
+          <p:cNvPr id="5" name="Content Placeholder 4"/>
+          <p:cNvPicPr>
+            <a:picLocks noGrp="1" noChangeAspect="1"/>
+          </p:cNvPicPr>
+          <p:nvPr>
+            <p:ph idx="1"/>
+          </p:nvPr>
+        </p:nvPicPr>
+        <p:blipFill>
+          <a:blip r:embed="rId3"/>
+          <a:stretch>
+            <a:fillRect/>
+          </a:stretch>
+        </p:blipFill>
+        <p:spPr>
+          <a:xfrm>
+            <a:off x="1535179" y="976860"/>
+            <a:ext cx="9118465" cy="5881140"/>
+          </a:xfrm>
+          <a:prstGeom prst="rect">
+            <a:avLst/>
+          </a:prstGeom>
+        </p:spPr>
+      </p:pic>
+    </p:spTree>
+    <p:extLst>
+      <p:ext uri="{BB962C8B-B14F-4D97-AF65-F5344CB8AC3E}">
+        <p14:creationId xmlns:p14="http://schemas.microsoft.com/office/powerpoint/2010/main" val="497874505"/>
+      </p:ext>
+    </p:extLst>
+  </p:cSld>
+  <p:clrMapOvr>
+    <a:masterClrMapping/>
+  </p:clrMapOvr>
+  <p:timing>
+    <p:tnLst>
+      <p:par>
+        <p:cTn id="1" dur="indefinite" restart="never" nodeType="tmRoot"/>
+      </p:par>
+    </p:tnLst>
+  </p:timing>
+</p:sld>
+</file>
+
+<file path=ppt/slides/slide24.xml><?xml version="1.0" encoding="utf-8"?>
+<p:sld xmlns:a="http://schemas.openxmlformats.org/drawingml/2006/main" xmlns:r="http://schemas.openxmlformats.org/officeDocument/2006/relationships" xmlns:p="http://schemas.openxmlformats.org/presentationml/2006/main">
+  <p:cSld>
+    <p:spTree>
+      <p:nvGrpSpPr>
+        <p:cNvPr id="1" name=""/>
+        <p:cNvGrpSpPr/>
+        <p:nvPr/>
+      </p:nvGrpSpPr>
+      <p:grpSpPr>
+        <a:xfrm>
+          <a:off x="0" y="0"/>
+          <a:ext cx="0" cy="0"/>
+          <a:chOff x="0" y="0"/>
+          <a:chExt cx="0" cy="0"/>
+        </a:xfrm>
+      </p:grpSpPr>
+      <p:sp>
+        <p:nvSpPr>
+          <p:cNvPr id="2" name="Title 1"/>
+          <p:cNvSpPr>
+            <a:spLocks noGrp="1"/>
+          </p:cNvSpPr>
+          <p:nvPr>
+            <p:ph type="title"/>
+          </p:nvPr>
+        </p:nvSpPr>
+        <p:spPr/>
+        <p:txBody>
+          <a:bodyPr/>
+          <a:lstStyle/>
+          <a:p>
+            <a:r>
+              <a:rPr lang="en-US" dirty="0" err="1" smtClean="0"/>
+              <a:t>Dva</a:t>
+            </a:r>
+            <a:endParaRPr lang="en-US" dirty="0"/>
+          </a:p>
+        </p:txBody>
+      </p:sp>
+      <p:sp>
+        <p:nvSpPr>
+          <p:cNvPr id="3" name="Text Placeholder 2"/>
+          <p:cNvSpPr>
+            <a:spLocks noGrp="1"/>
+          </p:cNvSpPr>
+          <p:nvPr>
+            <p:ph type="body" idx="1"/>
+          </p:nvPr>
+        </p:nvSpPr>
+        <p:spPr/>
+        <p:txBody>
+          <a:bodyPr/>
+          <a:lstStyle/>
+          <a:p>
+            <a:r>
+              <a:rPr lang="zh-CN" altLang="en-US" dirty="0" smtClean="0"/>
+              <a:t>阿里对</a:t>
+            </a:r>
+            <a:r>
+              <a:rPr lang="en-US" altLang="zh-CN" dirty="0" err="1" smtClean="0"/>
+              <a:t>Redux</a:t>
+            </a:r>
+            <a:r>
+              <a:rPr lang="zh-CN" altLang="en-US" dirty="0" smtClean="0"/>
+              <a:t>的封装</a:t>
+            </a:r>
+            <a:endParaRPr lang="en-US" altLang="zh-CN" dirty="0" smtClean="0"/>
+          </a:p>
+          <a:p>
+            <a:r>
+              <a:rPr lang="en-US" dirty="0"/>
+              <a:t>https://</a:t>
+            </a:r>
+            <a:r>
+              <a:rPr lang="en-US" dirty="0" err="1"/>
+              <a:t>github.com</a:t>
+            </a:r>
+            <a:r>
+              <a:rPr lang="en-US" dirty="0"/>
+              <a:t>/</a:t>
+            </a:r>
+            <a:r>
+              <a:rPr lang="en-US" dirty="0" err="1"/>
+              <a:t>dvajs</a:t>
+            </a:r>
+            <a:r>
+              <a:rPr lang="en-US" dirty="0"/>
+              <a:t>/</a:t>
+            </a:r>
+            <a:r>
+              <a:rPr lang="en-US" dirty="0" err="1"/>
+              <a:t>dva</a:t>
+            </a:r>
+            <a:r>
+              <a:rPr lang="en-US" dirty="0"/>
+              <a:t>-cli</a:t>
+            </a:r>
+          </a:p>
+        </p:txBody>
+      </p:sp>
+    </p:spTree>
+    <p:extLst>
+      <p:ext uri="{BB962C8B-B14F-4D97-AF65-F5344CB8AC3E}">
+        <p14:creationId xmlns:p14="http://schemas.microsoft.com/office/powerpoint/2010/main" val="1784386784"/>
+      </p:ext>
+    </p:extLst>
+  </p:cSld>
+  <p:clrMapOvr>
+    <a:masterClrMapping/>
+  </p:clrMapOvr>
+  <p:timing>
+    <p:tnLst>
+      <p:par>
+        <p:cTn id="1" dur="indefinite" restart="never" nodeType="tmRoot"/>
+      </p:par>
+    </p:tnLst>
+  </p:timing>
+</p:sld>
+</file>
+
+<file path=ppt/slides/slide25.xml><?xml version="1.0" encoding="utf-8"?>
+<p:sld xmlns:a="http://schemas.openxmlformats.org/drawingml/2006/main" xmlns:r="http://schemas.openxmlformats.org/officeDocument/2006/relationships" xmlns:p="http://schemas.openxmlformats.org/presentationml/2006/main">
+  <p:cSld>
+    <p:spTree>
+      <p:nvGrpSpPr>
+        <p:cNvPr id="1" name=""/>
+        <p:cNvGrpSpPr/>
+        <p:nvPr/>
+      </p:nvGrpSpPr>
+      <p:grpSpPr>
+        <a:xfrm>
+          <a:off x="0" y="0"/>
+          <a:ext cx="0" cy="0"/>
+          <a:chOff x="0" y="0"/>
+          <a:chExt cx="0" cy="0"/>
+        </a:xfrm>
+      </p:grpSpPr>
+      <p:sp>
+        <p:nvSpPr>
+          <p:cNvPr id="2" name="Title 1"/>
+          <p:cNvSpPr>
+            <a:spLocks noGrp="1"/>
+          </p:cNvSpPr>
+          <p:nvPr>
+            <p:ph type="title"/>
+          </p:nvPr>
+        </p:nvSpPr>
+        <p:spPr/>
+        <p:txBody>
+          <a:bodyPr/>
+          <a:lstStyle/>
+          <a:p>
+            <a:r>
+              <a:rPr lang="zh-CN" altLang="en-US" dirty="0" smtClean="0"/>
+              <a:t>基于</a:t>
+            </a:r>
+            <a:r>
+              <a:rPr lang="en-US" altLang="zh-CN" dirty="0" smtClean="0"/>
+              <a:t>DVA</a:t>
+            </a:r>
+            <a:r>
+              <a:rPr lang="zh-CN" altLang="en-US" dirty="0" smtClean="0"/>
+              <a:t>的项目实例</a:t>
+            </a:r>
+            <a:endParaRPr lang="en-US" dirty="0"/>
+          </a:p>
+        </p:txBody>
+      </p:sp>
+      <p:sp>
+        <p:nvSpPr>
+          <p:cNvPr id="3" name="Text Placeholder 2"/>
+          <p:cNvSpPr>
+            <a:spLocks noGrp="1"/>
+          </p:cNvSpPr>
+          <p:nvPr>
+            <p:ph type="body" idx="1"/>
+          </p:nvPr>
+        </p:nvSpPr>
+        <p:spPr/>
+        <p:txBody>
+          <a:bodyPr/>
+          <a:lstStyle/>
+          <a:p>
+            <a:r>
+              <a:rPr lang="zh-CN" altLang="en-US" dirty="0" smtClean="0"/>
+              <a:t>获取模拟用户</a:t>
+            </a:r>
+            <a:endParaRPr lang="en-US" dirty="0"/>
+          </a:p>
+        </p:txBody>
+      </p:sp>
+    </p:spTree>
+    <p:extLst>
+      <p:ext uri="{BB962C8B-B14F-4D97-AF65-F5344CB8AC3E}">
+        <p14:creationId xmlns:p14="http://schemas.microsoft.com/office/powerpoint/2010/main" val="977823030"/>
+      </p:ext>
+    </p:extLst>
+  </p:cSld>
+  <p:clrMapOvr>
+    <a:masterClrMapping/>
+  </p:clrMapOvr>
+</p:sld>
+</file>
+
+<file path=ppt/slides/slide26.xml><?xml version="1.0" encoding="utf-8"?>
+<p:sld xmlns:a="http://schemas.openxmlformats.org/drawingml/2006/main" xmlns:r="http://schemas.openxmlformats.org/officeDocument/2006/relationships" xmlns:p="http://schemas.openxmlformats.org/presentationml/2006/main">
+  <p:cSld>
+    <p:spTree>
+      <p:nvGrpSpPr>
+        <p:cNvPr id="1" name=""/>
+        <p:cNvGrpSpPr/>
+        <p:nvPr/>
+      </p:nvGrpSpPr>
+      <p:grpSpPr>
+        <a:xfrm>
+          <a:off x="0" y="0"/>
+          <a:ext cx="0" cy="0"/>
+          <a:chOff x="0" y="0"/>
+          <a:chExt cx="0" cy="0"/>
+        </a:xfrm>
+      </p:grpSpPr>
+      <p:sp>
+        <p:nvSpPr>
+          <p:cNvPr id="2" name="Title 1"/>
+          <p:cNvSpPr>
+            <a:spLocks noGrp="1"/>
+          </p:cNvSpPr>
+          <p:nvPr>
+            <p:ph type="title"/>
+          </p:nvPr>
+        </p:nvSpPr>
+        <p:spPr/>
+        <p:txBody>
+          <a:bodyPr/>
+          <a:lstStyle/>
+          <a:p>
+            <a:r>
               <a:rPr lang="en-US" dirty="0" err="1" smtClean="0"/>
               <a:t>Anuglar</a:t>
             </a:r>
@@ -8199,13 +9635,13 @@
           <a:p>
             <a:r>
               <a:rPr lang="en-US" dirty="0">
-                <a:hlinkClick r:id="rId2"/>
+                <a:hlinkClick r:id="rId3"/>
               </a:rPr>
               <a:t>https://</a:t>
             </a:r>
             <a:r>
               <a:rPr lang="en-US" dirty="0" smtClean="0">
-                <a:hlinkClick r:id="rId2"/>
+                <a:hlinkClick r:id="rId3"/>
               </a:rPr>
               <a:t>angular.io/tutorial</a:t>
             </a:r>
@@ -8237,6 +9673,429 @@
   <p:clrMapOvr>
     <a:masterClrMapping/>
   </p:clrMapOvr>
+  <p:timing>
+    <p:tnLst>
+      <p:par>
+        <p:cTn id="1" dur="indefinite" restart="never" nodeType="tmRoot"/>
+      </p:par>
+    </p:tnLst>
+  </p:timing>
+</p:sld>
+</file>
+
+<file path=ppt/slides/slide27.xml><?xml version="1.0" encoding="utf-8"?>
+<p:sld xmlns:a="http://schemas.openxmlformats.org/drawingml/2006/main" xmlns:r="http://schemas.openxmlformats.org/officeDocument/2006/relationships" xmlns:p="http://schemas.openxmlformats.org/presentationml/2006/main">
+  <p:cSld>
+    <p:spTree>
+      <p:nvGrpSpPr>
+        <p:cNvPr id="1" name=""/>
+        <p:cNvGrpSpPr/>
+        <p:nvPr/>
+      </p:nvGrpSpPr>
+      <p:grpSpPr>
+        <a:xfrm>
+          <a:off x="0" y="0"/>
+          <a:ext cx="0" cy="0"/>
+          <a:chOff x="0" y="0"/>
+          <a:chExt cx="0" cy="0"/>
+        </a:xfrm>
+      </p:grpSpPr>
+      <p:sp>
+        <p:nvSpPr>
+          <p:cNvPr id="2" name="Title 1"/>
+          <p:cNvSpPr>
+            <a:spLocks noGrp="1"/>
+          </p:cNvSpPr>
+          <p:nvPr>
+            <p:ph type="title"/>
+          </p:nvPr>
+        </p:nvSpPr>
+        <p:spPr/>
+        <p:txBody>
+          <a:bodyPr/>
+          <a:lstStyle/>
+          <a:p>
+            <a:r>
+              <a:rPr lang="zh-CN" altLang="en-US" dirty="0" smtClean="0"/>
+              <a:t>与</a:t>
+            </a:r>
+            <a:r>
+              <a:rPr lang="en-US" altLang="zh-CN" dirty="0" smtClean="0"/>
+              <a:t>React</a:t>
+            </a:r>
+            <a:r>
+              <a:rPr lang="zh-CN" altLang="en-US" dirty="0" smtClean="0"/>
+              <a:t>的区别</a:t>
+            </a:r>
+            <a:endParaRPr lang="en-US" dirty="0"/>
+          </a:p>
+        </p:txBody>
+      </p:sp>
+      <p:sp>
+        <p:nvSpPr>
+          <p:cNvPr id="3" name="Text Placeholder 2"/>
+          <p:cNvSpPr>
+            <a:spLocks noGrp="1"/>
+          </p:cNvSpPr>
+          <p:nvPr>
+            <p:ph type="body" idx="1"/>
+          </p:nvPr>
+        </p:nvSpPr>
+        <p:spPr>
+          <a:xfrm>
+            <a:off x="1751011" y="4777381"/>
+            <a:ext cx="8686801" cy="1344450"/>
+          </a:xfrm>
+        </p:spPr>
+        <p:txBody>
+          <a:bodyPr>
+            <a:normAutofit/>
+          </a:bodyPr>
+          <a:lstStyle/>
+          <a:p>
+            <a:pPr marL="457200" indent="-457200">
+              <a:buAutoNum type="arabicPeriod"/>
+            </a:pPr>
+            <a:r>
+              <a:rPr lang="zh-CN" altLang="en-US" dirty="0" smtClean="0"/>
+              <a:t>保留</a:t>
+            </a:r>
+            <a:r>
+              <a:rPr lang="en-US" altLang="zh-CN" dirty="0" smtClean="0"/>
+              <a:t>HTML</a:t>
+            </a:r>
+            <a:r>
+              <a:rPr lang="zh-CN" altLang="en-US" dirty="0" smtClean="0"/>
+              <a:t>结构</a:t>
+            </a:r>
+            <a:endParaRPr lang="en-US" altLang="zh-CN" dirty="0" smtClean="0"/>
+          </a:p>
+          <a:p>
+            <a:pPr marL="457200" indent="-457200">
+              <a:buAutoNum type="arabicPeriod"/>
+            </a:pPr>
+            <a:r>
+              <a:rPr lang="en-US" altLang="zh-CN" dirty="0" smtClean="0"/>
+              <a:t>MVVM</a:t>
+            </a:r>
+          </a:p>
+          <a:p>
+            <a:pPr marL="457200" indent="-457200">
+              <a:buAutoNum type="arabicPeriod"/>
+            </a:pPr>
+            <a:r>
+              <a:rPr lang="zh-CN" altLang="en-US" dirty="0" smtClean="0"/>
+              <a:t>大而全，不只是</a:t>
+            </a:r>
+            <a:r>
+              <a:rPr lang="en-US" altLang="zh-CN" dirty="0" smtClean="0"/>
+              <a:t>UI</a:t>
+            </a:r>
+            <a:r>
+              <a:rPr lang="zh-CN" altLang="en-US" dirty="0" smtClean="0"/>
+              <a:t>库，规定好了</a:t>
+            </a:r>
+            <a:r>
+              <a:rPr lang="zh-CN" altLang="en-US" smtClean="0"/>
+              <a:t>最佳开发实践</a:t>
+            </a:r>
+            <a:endParaRPr lang="en-US" altLang="zh-CN" dirty="0" smtClean="0"/>
+          </a:p>
+        </p:txBody>
+      </p:sp>
+    </p:spTree>
+    <p:extLst>
+      <p:ext uri="{BB962C8B-B14F-4D97-AF65-F5344CB8AC3E}">
+        <p14:creationId xmlns:p14="http://schemas.microsoft.com/office/powerpoint/2010/main" val="137241654"/>
+      </p:ext>
+    </p:extLst>
+  </p:cSld>
+  <p:clrMapOvr>
+    <a:masterClrMapping/>
+  </p:clrMapOvr>
+  <p:timing>
+    <p:tnLst>
+      <p:par>
+        <p:cTn id="1" dur="indefinite" restart="never" nodeType="tmRoot"/>
+      </p:par>
+    </p:tnLst>
+  </p:timing>
+</p:sld>
+</file>
+
+<file path=ppt/slides/slide28.xml><?xml version="1.0" encoding="utf-8"?>
+<p:sld xmlns:a="http://schemas.openxmlformats.org/drawingml/2006/main" xmlns:r="http://schemas.openxmlformats.org/officeDocument/2006/relationships" xmlns:p="http://schemas.openxmlformats.org/presentationml/2006/main">
+  <p:cSld>
+    <p:spTree>
+      <p:nvGrpSpPr>
+        <p:cNvPr id="1" name=""/>
+        <p:cNvGrpSpPr/>
+        <p:nvPr/>
+      </p:nvGrpSpPr>
+      <p:grpSpPr>
+        <a:xfrm>
+          <a:off x="0" y="0"/>
+          <a:ext cx="0" cy="0"/>
+          <a:chOff x="0" y="0"/>
+          <a:chExt cx="0" cy="0"/>
+        </a:xfrm>
+      </p:grpSpPr>
+      <p:sp>
+        <p:nvSpPr>
+          <p:cNvPr id="2" name="Title 1"/>
+          <p:cNvSpPr>
+            <a:spLocks noGrp="1"/>
+          </p:cNvSpPr>
+          <p:nvPr>
+            <p:ph type="title"/>
+          </p:nvPr>
+        </p:nvSpPr>
+        <p:spPr/>
+        <p:txBody>
+          <a:bodyPr/>
+          <a:lstStyle/>
+          <a:p>
+            <a:r>
+              <a:rPr lang="en-US" altLang="zh-CN" dirty="0" smtClean="0"/>
+              <a:t>Angular JS</a:t>
+            </a:r>
+            <a:endParaRPr lang="en-US" dirty="0"/>
+          </a:p>
+        </p:txBody>
+      </p:sp>
+      <p:sp>
+        <p:nvSpPr>
+          <p:cNvPr id="3" name="Content Placeholder 2"/>
+          <p:cNvSpPr>
+            <a:spLocks noGrp="1"/>
+          </p:cNvSpPr>
+          <p:nvPr>
+            <p:ph idx="1"/>
+          </p:nvPr>
+        </p:nvSpPr>
+        <p:spPr/>
+        <p:txBody>
+          <a:bodyPr/>
+          <a:lstStyle/>
+          <a:p>
+            <a:r>
+              <a:rPr lang="en-US" dirty="0" smtClean="0"/>
+              <a:t>Directive </a:t>
+            </a:r>
+            <a:r>
+              <a:rPr lang="zh-CN" altLang="en-US" dirty="0" smtClean="0"/>
+              <a:t>指令</a:t>
+            </a:r>
+            <a:endParaRPr lang="en-US" altLang="zh-CN" dirty="0" smtClean="0"/>
+          </a:p>
+          <a:p>
+            <a:r>
+              <a:rPr lang="en-US" dirty="0" smtClean="0">
+                <a:effectLst/>
+              </a:rPr>
+              <a:t>Module</a:t>
+            </a:r>
+            <a:r>
+              <a:rPr lang="zh-CN" altLang="en-US" dirty="0" smtClean="0">
+                <a:effectLst/>
+              </a:rPr>
+              <a:t> 模块</a:t>
+            </a:r>
+            <a:endParaRPr lang="en-US" dirty="0" smtClean="0"/>
+          </a:p>
+          <a:p>
+            <a:r>
+              <a:rPr lang="en-US" altLang="zh-CN" dirty="0" smtClean="0"/>
+              <a:t>Component</a:t>
+            </a:r>
+            <a:r>
+              <a:rPr lang="zh-CN" altLang="en-US" dirty="0" smtClean="0"/>
+              <a:t> 组件</a:t>
+            </a:r>
+            <a:endParaRPr lang="en-US" dirty="0" smtClean="0"/>
+          </a:p>
+          <a:p>
+            <a:r>
+              <a:rPr lang="en-US" dirty="0" smtClean="0"/>
+              <a:t>Provider(Service, factory)</a:t>
+            </a:r>
+          </a:p>
+          <a:p>
+            <a:r>
+              <a:rPr lang="en-US" dirty="0">
+                <a:effectLst/>
+              </a:rPr>
+              <a:t>Dependency </a:t>
+            </a:r>
+            <a:r>
+              <a:rPr lang="en-US" dirty="0" smtClean="0">
+                <a:effectLst/>
+              </a:rPr>
+              <a:t>Injection </a:t>
+            </a:r>
+            <a:r>
+              <a:rPr lang="zh-CN" altLang="en-US" dirty="0" smtClean="0">
+                <a:effectLst/>
+              </a:rPr>
+              <a:t>依赖注入</a:t>
+            </a:r>
+            <a:endParaRPr lang="en-US" altLang="zh-CN" dirty="0" smtClean="0">
+              <a:effectLst/>
+            </a:endParaRPr>
+          </a:p>
+          <a:p>
+            <a:r>
+              <a:rPr lang="en-US" altLang="zh-CN" dirty="0" smtClean="0">
+                <a:effectLst/>
+              </a:rPr>
+              <a:t>Controller</a:t>
+            </a:r>
+            <a:r>
+              <a:rPr lang="zh-CN" altLang="en-US" dirty="0" smtClean="0">
+                <a:effectLst/>
+              </a:rPr>
+              <a:t> 控制器</a:t>
+            </a:r>
+            <a:endParaRPr lang="en-US" altLang="zh-CN" dirty="0" smtClean="0">
+              <a:effectLst/>
+            </a:endParaRPr>
+          </a:p>
+          <a:p>
+            <a:endParaRPr lang="en-US" dirty="0"/>
+          </a:p>
+        </p:txBody>
+      </p:sp>
+      <p:sp>
+        <p:nvSpPr>
+          <p:cNvPr id="4" name="Text Placeholder 3"/>
+          <p:cNvSpPr>
+            <a:spLocks noGrp="1"/>
+          </p:cNvSpPr>
+          <p:nvPr>
+            <p:ph type="body" sz="half" idx="2"/>
+          </p:nvPr>
+        </p:nvSpPr>
+        <p:spPr/>
+        <p:txBody>
+          <a:bodyPr/>
+          <a:lstStyle/>
+          <a:p>
+            <a:r>
+              <a:rPr lang="zh-CN" altLang="en-US" dirty="0" smtClean="0"/>
+              <a:t>知识简介</a:t>
+            </a:r>
+            <a:endParaRPr lang="en-US" dirty="0"/>
+          </a:p>
+        </p:txBody>
+      </p:sp>
+    </p:spTree>
+    <p:extLst>
+      <p:ext uri="{BB962C8B-B14F-4D97-AF65-F5344CB8AC3E}">
+        <p14:creationId xmlns:p14="http://schemas.microsoft.com/office/powerpoint/2010/main" val="1326356102"/>
+      </p:ext>
+    </p:extLst>
+  </p:cSld>
+  <p:clrMapOvr>
+    <a:masterClrMapping/>
+  </p:clrMapOvr>
+  <p:timing>
+    <p:tnLst>
+      <p:par>
+        <p:cTn id="1" dur="indefinite" restart="never" nodeType="tmRoot"/>
+      </p:par>
+    </p:tnLst>
+  </p:timing>
+</p:sld>
+</file>
+
+<file path=ppt/slides/slide29.xml><?xml version="1.0" encoding="utf-8"?>
+<p:sld xmlns:a="http://schemas.openxmlformats.org/drawingml/2006/main" xmlns:r="http://schemas.openxmlformats.org/officeDocument/2006/relationships" xmlns:p="http://schemas.openxmlformats.org/presentationml/2006/main">
+  <p:cSld>
+    <p:spTree>
+      <p:nvGrpSpPr>
+        <p:cNvPr id="1" name=""/>
+        <p:cNvGrpSpPr/>
+        <p:nvPr/>
+      </p:nvGrpSpPr>
+      <p:grpSpPr>
+        <a:xfrm>
+          <a:off x="0" y="0"/>
+          <a:ext cx="0" cy="0"/>
+          <a:chOff x="0" y="0"/>
+          <a:chExt cx="0" cy="0"/>
+        </a:xfrm>
+      </p:grpSpPr>
+      <p:sp>
+        <p:nvSpPr>
+          <p:cNvPr id="2" name="Title 1"/>
+          <p:cNvSpPr>
+            <a:spLocks noGrp="1"/>
+          </p:cNvSpPr>
+          <p:nvPr>
+            <p:ph type="title"/>
+          </p:nvPr>
+        </p:nvSpPr>
+        <p:spPr/>
+        <p:txBody>
+          <a:bodyPr/>
+          <a:lstStyle/>
+          <a:p>
+            <a:r>
+              <a:rPr lang="en-US" altLang="zh-CN" dirty="0" err="1" smtClean="0"/>
+              <a:t>AngularJS</a:t>
+            </a:r>
+            <a:r>
+              <a:rPr lang="zh-CN" altLang="en-US" dirty="0" smtClean="0"/>
+              <a:t>项目实战</a:t>
+            </a:r>
+            <a:endParaRPr lang="en-US" dirty="0"/>
+          </a:p>
+        </p:txBody>
+      </p:sp>
+      <p:sp>
+        <p:nvSpPr>
+          <p:cNvPr id="3" name="Text Placeholder 2"/>
+          <p:cNvSpPr>
+            <a:spLocks noGrp="1"/>
+          </p:cNvSpPr>
+          <p:nvPr>
+            <p:ph type="body" idx="1"/>
+          </p:nvPr>
+        </p:nvSpPr>
+        <p:spPr/>
+        <p:txBody>
+          <a:bodyPr/>
+          <a:lstStyle/>
+          <a:p>
+            <a:r>
+              <a:rPr lang="en-US" altLang="zh-CN" dirty="0" err="1" smtClean="0"/>
+              <a:t>Todo</a:t>
+            </a:r>
+            <a:r>
+              <a:rPr lang="en-US" altLang="zh-CN" dirty="0" smtClean="0"/>
+              <a:t> List</a:t>
+            </a:r>
+            <a:endParaRPr lang="en-US" dirty="0"/>
+          </a:p>
+        </p:txBody>
+      </p:sp>
+    </p:spTree>
+    <p:extLst>
+      <p:ext uri="{BB962C8B-B14F-4D97-AF65-F5344CB8AC3E}">
+        <p14:creationId xmlns:p14="http://schemas.microsoft.com/office/powerpoint/2010/main" val="1639088771"/>
+      </p:ext>
+    </p:extLst>
+  </p:cSld>
+  <p:clrMapOvr>
+    <a:masterClrMapping/>
+  </p:clrMapOvr>
+  <p:timing>
+    <p:tnLst>
+      <p:par>
+        <p:cTn id="1" dur="indefinite" restart="never" nodeType="tmRoot"/>
+      </p:par>
+    </p:tnLst>
+  </p:timing>
 </p:sld>
 </file>
 
@@ -8403,6 +10262,121 @@
     <p:extLst>
       <p:ext uri="{BB962C8B-B14F-4D97-AF65-F5344CB8AC3E}">
         <p14:creationId xmlns:p14="http://schemas.microsoft.com/office/powerpoint/2010/main" val="352618200"/>
+      </p:ext>
+    </p:extLst>
+  </p:cSld>
+  <p:clrMapOvr>
+    <a:masterClrMapping/>
+  </p:clrMapOvr>
+  <p:timing>
+    <p:tnLst>
+      <p:par>
+        <p:cTn id="1" dur="indefinite" restart="never" nodeType="tmRoot"/>
+      </p:par>
+    </p:tnLst>
+  </p:timing>
+</p:sld>
+</file>
+
+<file path=ppt/slides/slide30.xml><?xml version="1.0" encoding="utf-8"?>
+<p:sld xmlns:a="http://schemas.openxmlformats.org/drawingml/2006/main" xmlns:r="http://schemas.openxmlformats.org/officeDocument/2006/relationships" xmlns:p="http://schemas.openxmlformats.org/presentationml/2006/main">
+  <p:cSld>
+    <p:spTree>
+      <p:nvGrpSpPr>
+        <p:cNvPr id="1" name=""/>
+        <p:cNvGrpSpPr/>
+        <p:nvPr/>
+      </p:nvGrpSpPr>
+      <p:grpSpPr>
+        <a:xfrm>
+          <a:off x="0" y="0"/>
+          <a:ext cx="0" cy="0"/>
+          <a:chOff x="0" y="0"/>
+          <a:chExt cx="0" cy="0"/>
+        </a:xfrm>
+      </p:grpSpPr>
+      <p:sp>
+        <p:nvSpPr>
+          <p:cNvPr id="2" name="Title 1"/>
+          <p:cNvSpPr>
+            <a:spLocks noGrp="1"/>
+          </p:cNvSpPr>
+          <p:nvPr>
+            <p:ph type="title"/>
+          </p:nvPr>
+        </p:nvSpPr>
+        <p:spPr/>
+        <p:txBody>
+          <a:bodyPr/>
+          <a:lstStyle/>
+          <a:p>
+            <a:r>
+              <a:rPr lang="en-US" altLang="zh-CN" dirty="0" smtClean="0"/>
+              <a:t>Angular </a:t>
+            </a:r>
+            <a:r>
+              <a:rPr lang="zh-CN" altLang="en-US" dirty="0" smtClean="0"/>
+              <a:t>脚手架项目</a:t>
+            </a:r>
+            <a:endParaRPr lang="en-US" dirty="0"/>
+          </a:p>
+        </p:txBody>
+      </p:sp>
+      <p:sp>
+        <p:nvSpPr>
+          <p:cNvPr id="3" name="Content Placeholder 2"/>
+          <p:cNvSpPr>
+            <a:spLocks noGrp="1"/>
+          </p:cNvSpPr>
+          <p:nvPr>
+            <p:ph idx="1"/>
+          </p:nvPr>
+        </p:nvSpPr>
+        <p:spPr/>
+        <p:txBody>
+          <a:bodyPr/>
+          <a:lstStyle/>
+          <a:p>
+            <a:r>
+              <a:rPr lang="en-US" dirty="0"/>
+              <a:t>Yeoman: </a:t>
+            </a:r>
+            <a:r>
+              <a:rPr lang="en-US" dirty="0">
+                <a:hlinkClick r:id="rId3"/>
+              </a:rPr>
+              <a:t>https://</a:t>
+            </a:r>
+            <a:r>
+              <a:rPr lang="en-US" dirty="0" smtClean="0">
+                <a:hlinkClick r:id="rId3"/>
+              </a:rPr>
+              <a:t>github.com/Swiip/generator-gulp-angular</a:t>
+            </a:r>
+            <a:endParaRPr lang="en-US" dirty="0" smtClean="0"/>
+          </a:p>
+          <a:p>
+            <a:r>
+              <a:rPr lang="en-US" dirty="0" smtClean="0"/>
+              <a:t>Gulp serve</a:t>
+            </a:r>
+          </a:p>
+          <a:p>
+            <a:r>
+              <a:rPr lang="en-US" dirty="0" err="1" smtClean="0"/>
+              <a:t>Anuglar</a:t>
+            </a:r>
+            <a:r>
+              <a:rPr lang="en-US" dirty="0" smtClean="0"/>
+              <a:t> Material</a:t>
+            </a:r>
+          </a:p>
+        </p:txBody>
+      </p:sp>
+    </p:spTree>
+    <p:extLst>
+      <p:ext uri="{BB962C8B-B14F-4D97-AF65-F5344CB8AC3E}">
+        <p14:creationId xmlns:p14="http://schemas.microsoft.com/office/powerpoint/2010/main" val="1446031074"/>
       </p:ext>
     </p:extLst>
   </p:cSld>

</xml_diff>

<commit_message>
add code for session 3
</commit_message>
<xml_diff>
--- a/前端课程.pptx
+++ b/前端课程.pptx
@@ -5,7 +5,7 @@
     <p:sldMasterId id="2147484229" r:id="rId1"/>
   </p:sldMasterIdLst>
   <p:notesMasterIdLst>
-    <p:notesMasterId r:id="rId62"/>
+    <p:notesMasterId r:id="rId64"/>
   </p:notesMasterIdLst>
   <p:sldIdLst>
     <p:sldId id="272" r:id="rId2"/>
@@ -41,33 +41,35 @@
     <p:sldId id="271" r:id="rId32"/>
     <p:sldId id="269" r:id="rId33"/>
     <p:sldId id="323" r:id="rId34"/>
-    <p:sldId id="273" r:id="rId35"/>
-    <p:sldId id="322" r:id="rId36"/>
-    <p:sldId id="276" r:id="rId37"/>
-    <p:sldId id="282" r:id="rId38"/>
-    <p:sldId id="284" r:id="rId39"/>
-    <p:sldId id="285" r:id="rId40"/>
-    <p:sldId id="286" r:id="rId41"/>
-    <p:sldId id="288" r:id="rId42"/>
-    <p:sldId id="277" r:id="rId43"/>
-    <p:sldId id="279" r:id="rId44"/>
-    <p:sldId id="278" r:id="rId45"/>
-    <p:sldId id="281" r:id="rId46"/>
-    <p:sldId id="287" r:id="rId47"/>
-    <p:sldId id="289" r:id="rId48"/>
-    <p:sldId id="295" r:id="rId49"/>
-    <p:sldId id="293" r:id="rId50"/>
-    <p:sldId id="291" r:id="rId51"/>
-    <p:sldId id="292" r:id="rId52"/>
-    <p:sldId id="290" r:id="rId53"/>
-    <p:sldId id="294" r:id="rId54"/>
-    <p:sldId id="298" r:id="rId55"/>
-    <p:sldId id="296" r:id="rId56"/>
-    <p:sldId id="297" r:id="rId57"/>
-    <p:sldId id="299" r:id="rId58"/>
-    <p:sldId id="300" r:id="rId59"/>
-    <p:sldId id="301" r:id="rId60"/>
-    <p:sldId id="302" r:id="rId61"/>
+    <p:sldId id="324" r:id="rId35"/>
+    <p:sldId id="273" r:id="rId36"/>
+    <p:sldId id="325" r:id="rId37"/>
+    <p:sldId id="276" r:id="rId38"/>
+    <p:sldId id="322" r:id="rId39"/>
+    <p:sldId id="282" r:id="rId40"/>
+    <p:sldId id="284" r:id="rId41"/>
+    <p:sldId id="285" r:id="rId42"/>
+    <p:sldId id="286" r:id="rId43"/>
+    <p:sldId id="288" r:id="rId44"/>
+    <p:sldId id="277" r:id="rId45"/>
+    <p:sldId id="279" r:id="rId46"/>
+    <p:sldId id="278" r:id="rId47"/>
+    <p:sldId id="281" r:id="rId48"/>
+    <p:sldId id="287" r:id="rId49"/>
+    <p:sldId id="289" r:id="rId50"/>
+    <p:sldId id="295" r:id="rId51"/>
+    <p:sldId id="293" r:id="rId52"/>
+    <p:sldId id="291" r:id="rId53"/>
+    <p:sldId id="292" r:id="rId54"/>
+    <p:sldId id="290" r:id="rId55"/>
+    <p:sldId id="294" r:id="rId56"/>
+    <p:sldId id="298" r:id="rId57"/>
+    <p:sldId id="296" r:id="rId58"/>
+    <p:sldId id="297" r:id="rId59"/>
+    <p:sldId id="299" r:id="rId60"/>
+    <p:sldId id="300" r:id="rId61"/>
+    <p:sldId id="301" r:id="rId62"/>
+    <p:sldId id="302" r:id="rId63"/>
   </p:sldIdLst>
   <p:sldSz cx="12192000" cy="6858000"/>
   <p:notesSz cx="6858000" cy="9144000"/>
@@ -204,9 +206,11 @@
             <p14:sldId id="271"/>
             <p14:sldId id="269"/>
             <p14:sldId id="323"/>
+            <p14:sldId id="324"/>
             <p14:sldId id="273"/>
+            <p14:sldId id="325"/>
+            <p14:sldId id="276"/>
             <p14:sldId id="322"/>
-            <p14:sldId id="276"/>
             <p14:sldId id="282"/>
             <p14:sldId id="284"/>
             <p14:sldId id="285"/>
@@ -327,7 +331,7 @@
           <a:p>
             <a:fld id="{A75DC609-2A5E-994A-AEB9-E13728C46CDD}" type="datetimeFigureOut">
               <a:rPr lang="en-US" smtClean="0"/>
-              <a:t>7/8/18</a:t>
+              <a:t>7/13/18</a:t>
             </a:fld>
             <a:endParaRPr lang="en-US"/>
           </a:p>
@@ -2026,7 +2030,7 @@
           <a:p>
             <a:fld id="{3A8071CD-55D8-0E40-9E87-5F5ADA6DF007}" type="slidenum">
               <a:rPr lang="en-US" smtClean="0"/>
-              <a:t>34</a:t>
+              <a:t>35</a:t>
             </a:fld>
             <a:endParaRPr lang="en-US"/>
           </a:p>
@@ -2145,7 +2149,7 @@
           <a:p>
             <a:fld id="{3A8071CD-55D8-0E40-9E87-5F5ADA6DF007}" type="slidenum">
               <a:rPr lang="en-US" smtClean="0"/>
-              <a:t>36</a:t>
+              <a:t>37</a:t>
             </a:fld>
             <a:endParaRPr lang="en-US"/>
           </a:p>
@@ -2273,7 +2277,7 @@
           <a:p>
             <a:fld id="{3A8071CD-55D8-0E40-9E87-5F5ADA6DF007}" type="slidenum">
               <a:rPr lang="en-US" smtClean="0"/>
-              <a:t>37</a:t>
+              <a:t>39</a:t>
             </a:fld>
             <a:endParaRPr lang="en-US"/>
           </a:p>
@@ -2357,7 +2361,7 @@
           <a:p>
             <a:fld id="{3A8071CD-55D8-0E40-9E87-5F5ADA6DF007}" type="slidenum">
               <a:rPr lang="en-US" smtClean="0"/>
-              <a:t>39</a:t>
+              <a:t>41</a:t>
             </a:fld>
             <a:endParaRPr lang="en-US"/>
           </a:p>
@@ -2461,7 +2465,7 @@
           <a:p>
             <a:fld id="{3A8071CD-55D8-0E40-9E87-5F5ADA6DF007}" type="slidenum">
               <a:rPr lang="en-US" smtClean="0"/>
-              <a:t>40</a:t>
+              <a:t>42</a:t>
             </a:fld>
             <a:endParaRPr lang="en-US"/>
           </a:p>
@@ -2573,7 +2577,7 @@
           <a:p>
             <a:fld id="{3A8071CD-55D8-0E40-9E87-5F5ADA6DF007}" type="slidenum">
               <a:rPr lang="en-US" smtClean="0"/>
-              <a:t>42</a:t>
+              <a:t>44</a:t>
             </a:fld>
             <a:endParaRPr lang="en-US"/>
           </a:p>
@@ -2719,7 +2723,7 @@
           <a:p>
             <a:fld id="{3A8071CD-55D8-0E40-9E87-5F5ADA6DF007}" type="slidenum">
               <a:rPr lang="en-US" smtClean="0"/>
-              <a:t>44</a:t>
+              <a:t>46</a:t>
             </a:fld>
             <a:endParaRPr lang="en-US"/>
           </a:p>
@@ -2838,7 +2842,7 @@
           <a:p>
             <a:fld id="{3A8071CD-55D8-0E40-9E87-5F5ADA6DF007}" type="slidenum">
               <a:rPr lang="en-US" smtClean="0"/>
-              <a:t>45</a:t>
+              <a:t>47</a:t>
             </a:fld>
             <a:endParaRPr lang="en-US"/>
           </a:p>
@@ -2934,7 +2938,7 @@
           <a:p>
             <a:fld id="{3A8071CD-55D8-0E40-9E87-5F5ADA6DF007}" type="slidenum">
               <a:rPr lang="en-US" smtClean="0"/>
-              <a:t>46</a:t>
+              <a:t>48</a:t>
             </a:fld>
             <a:endParaRPr lang="en-US"/>
           </a:p>
@@ -3052,7 +3056,7 @@
           <a:p>
             <a:fld id="{3A8071CD-55D8-0E40-9E87-5F5ADA6DF007}" type="slidenum">
               <a:rPr lang="en-US" smtClean="0"/>
-              <a:t>47</a:t>
+              <a:t>49</a:t>
             </a:fld>
             <a:endParaRPr lang="en-US"/>
           </a:p>
@@ -3278,7 +3282,7 @@
           <a:p>
             <a:fld id="{3A8071CD-55D8-0E40-9E87-5F5ADA6DF007}" type="slidenum">
               <a:rPr lang="en-US" smtClean="0"/>
-              <a:t>49</a:t>
+              <a:t>51</a:t>
             </a:fld>
             <a:endParaRPr lang="en-US"/>
           </a:p>
@@ -3388,7 +3392,7 @@
           <a:p>
             <a:fld id="{3A8071CD-55D8-0E40-9E87-5F5ADA6DF007}" type="slidenum">
               <a:rPr lang="en-US" smtClean="0"/>
-              <a:t>50</a:t>
+              <a:t>52</a:t>
             </a:fld>
             <a:endParaRPr lang="en-US"/>
           </a:p>
@@ -3472,7 +3476,7 @@
           <a:p>
             <a:fld id="{3A8071CD-55D8-0E40-9E87-5F5ADA6DF007}" type="slidenum">
               <a:rPr lang="en-US" smtClean="0"/>
-              <a:t>52</a:t>
+              <a:t>54</a:t>
             </a:fld>
             <a:endParaRPr lang="en-US"/>
           </a:p>
@@ -3556,7 +3560,7 @@
           <a:p>
             <a:fld id="{3A8071CD-55D8-0E40-9E87-5F5ADA6DF007}" type="slidenum">
               <a:rPr lang="en-US" smtClean="0"/>
-              <a:t>53</a:t>
+              <a:t>55</a:t>
             </a:fld>
             <a:endParaRPr lang="en-US"/>
           </a:p>
@@ -3671,7 +3675,7 @@
           <a:p>
             <a:fld id="{3A8071CD-55D8-0E40-9E87-5F5ADA6DF007}" type="slidenum">
               <a:rPr lang="en-US" smtClean="0"/>
-              <a:t>55</a:t>
+              <a:t>57</a:t>
             </a:fld>
             <a:endParaRPr lang="en-US"/>
           </a:p>
@@ -3779,7 +3783,7 @@
           <a:p>
             <a:fld id="{3A8071CD-55D8-0E40-9E87-5F5ADA6DF007}" type="slidenum">
               <a:rPr lang="en-US" smtClean="0"/>
-              <a:t>60</a:t>
+              <a:t>62</a:t>
             </a:fld>
             <a:endParaRPr lang="en-US"/>
           </a:p>
@@ -4602,7 +4606,7 @@
             <a:fld id="{B61BEF0D-F0BB-DE4B-95CE-6DB70DBA9567}" type="datetimeFigureOut">
               <a:rPr lang="en-US" smtClean="0"/>
               <a:pPr/>
-              <a:t>7/8/18</a:t>
+              <a:t>7/13/18</a:t>
             </a:fld>
             <a:endParaRPr lang="en-US" dirty="0"/>
           </a:p>
@@ -4876,7 +4880,7 @@
             <a:fld id="{B61BEF0D-F0BB-DE4B-95CE-6DB70DBA9567}" type="datetimeFigureOut">
               <a:rPr lang="en-US" smtClean="0"/>
               <a:pPr/>
-              <a:t>7/8/18</a:t>
+              <a:t>7/13/18</a:t>
             </a:fld>
             <a:endParaRPr lang="en-US" dirty="0"/>
           </a:p>
@@ -5109,7 +5113,7 @@
             <a:fld id="{B61BEF0D-F0BB-DE4B-95CE-6DB70DBA9567}" type="datetimeFigureOut">
               <a:rPr lang="en-US" smtClean="0"/>
               <a:pPr/>
-              <a:t>7/8/18</a:t>
+              <a:t>7/13/18</a:t>
             </a:fld>
             <a:endParaRPr lang="en-US" dirty="0"/>
           </a:p>
@@ -5421,7 +5425,7 @@
             <a:fld id="{B61BEF0D-F0BB-DE4B-95CE-6DB70DBA9567}" type="datetimeFigureOut">
               <a:rPr lang="en-US" smtClean="0"/>
               <a:pPr/>
-              <a:t>7/8/18</a:t>
+              <a:t>7/13/18</a:t>
             </a:fld>
             <a:endParaRPr lang="en-US" dirty="0"/>
           </a:p>
@@ -5896,7 +5900,7 @@
             <a:fld id="{B61BEF0D-F0BB-DE4B-95CE-6DB70DBA9567}" type="datetimeFigureOut">
               <a:rPr lang="en-US" smtClean="0"/>
               <a:pPr/>
-              <a:t>7/8/18</a:t>
+              <a:t>7/13/18</a:t>
             </a:fld>
             <a:endParaRPr lang="en-US" dirty="0"/>
           </a:p>
@@ -6445,7 +6449,7 @@
             <a:fld id="{B61BEF0D-F0BB-DE4B-95CE-6DB70DBA9567}" type="datetimeFigureOut">
               <a:rPr lang="en-US" smtClean="0"/>
               <a:pPr/>
-              <a:t>7/8/18</a:t>
+              <a:t>7/13/18</a:t>
             </a:fld>
             <a:endParaRPr lang="en-US" dirty="0"/>
           </a:p>
@@ -7221,7 +7225,7 @@
             <a:fld id="{B61BEF0D-F0BB-DE4B-95CE-6DB70DBA9567}" type="datetimeFigureOut">
               <a:rPr lang="en-US" smtClean="0"/>
               <a:pPr/>
-              <a:t>7/8/18</a:t>
+              <a:t>7/13/18</a:t>
             </a:fld>
             <a:endParaRPr lang="en-US" dirty="0"/>
           </a:p>
@@ -7398,7 +7402,7 @@
             <a:fld id="{B61BEF0D-F0BB-DE4B-95CE-6DB70DBA9567}" type="datetimeFigureOut">
               <a:rPr lang="en-US" smtClean="0"/>
               <a:pPr/>
-              <a:t>7/8/18</a:t>
+              <a:t>7/13/18</a:t>
             </a:fld>
             <a:endParaRPr lang="en-US" dirty="0"/>
           </a:p>
@@ -7623,7 +7627,7 @@
             <a:fld id="{B61BEF0D-F0BB-DE4B-95CE-6DB70DBA9567}" type="datetimeFigureOut">
               <a:rPr lang="en-US" smtClean="0"/>
               <a:pPr/>
-              <a:t>7/8/18</a:t>
+              <a:t>7/13/18</a:t>
             </a:fld>
             <a:endParaRPr lang="en-US" dirty="0"/>
           </a:p>
@@ -7810,7 +7814,7 @@
             <a:fld id="{B61BEF0D-F0BB-DE4B-95CE-6DB70DBA9567}" type="datetimeFigureOut">
               <a:rPr lang="en-US" smtClean="0"/>
               <a:pPr/>
-              <a:t>7/8/18</a:t>
+              <a:t>7/13/18</a:t>
             </a:fld>
             <a:endParaRPr lang="en-US" dirty="0"/>
           </a:p>
@@ -8101,7 +8105,7 @@
             <a:fld id="{B61BEF0D-F0BB-DE4B-95CE-6DB70DBA9567}" type="datetimeFigureOut">
               <a:rPr lang="en-US" smtClean="0"/>
               <a:pPr/>
-              <a:t>7/8/18</a:t>
+              <a:t>7/13/18</a:t>
             </a:fld>
             <a:endParaRPr lang="en-US" dirty="0"/>
           </a:p>
@@ -8350,7 +8354,7 @@
             <a:fld id="{B61BEF0D-F0BB-DE4B-95CE-6DB70DBA9567}" type="datetimeFigureOut">
               <a:rPr lang="en-US" smtClean="0"/>
               <a:pPr/>
-              <a:t>7/8/18</a:t>
+              <a:t>7/13/18</a:t>
             </a:fld>
             <a:endParaRPr lang="en-US" dirty="0"/>
           </a:p>
@@ -8736,7 +8740,7 @@
             <a:fld id="{B61BEF0D-F0BB-DE4B-95CE-6DB70DBA9567}" type="datetimeFigureOut">
               <a:rPr lang="en-US" smtClean="0"/>
               <a:pPr/>
-              <a:t>7/8/18</a:t>
+              <a:t>7/13/18</a:t>
             </a:fld>
             <a:endParaRPr lang="en-US" dirty="0"/>
           </a:p>
@@ -8861,7 +8865,7 @@
             <a:fld id="{B61BEF0D-F0BB-DE4B-95CE-6DB70DBA9567}" type="datetimeFigureOut">
               <a:rPr lang="en-US" smtClean="0"/>
               <a:pPr/>
-              <a:t>7/8/18</a:t>
+              <a:t>7/13/18</a:t>
             </a:fld>
             <a:endParaRPr lang="en-US" dirty="0"/>
           </a:p>
@@ -8958,7 +8962,7 @@
             <a:fld id="{B61BEF0D-F0BB-DE4B-95CE-6DB70DBA9567}" type="datetimeFigureOut">
               <a:rPr lang="en-US" smtClean="0"/>
               <a:pPr/>
-              <a:t>7/8/18</a:t>
+              <a:t>7/13/18</a:t>
             </a:fld>
             <a:endParaRPr lang="en-US" dirty="0"/>
           </a:p>
@@ -9214,7 +9218,7 @@
             <a:fld id="{B61BEF0D-F0BB-DE4B-95CE-6DB70DBA9567}" type="datetimeFigureOut">
               <a:rPr lang="en-US" smtClean="0"/>
               <a:pPr/>
-              <a:t>7/8/18</a:t>
+              <a:t>7/13/18</a:t>
             </a:fld>
             <a:endParaRPr lang="en-US" dirty="0"/>
           </a:p>
@@ -9478,7 +9482,7 @@
             <a:fld id="{B61BEF0D-F0BB-DE4B-95CE-6DB70DBA9567}" type="datetimeFigureOut">
               <a:rPr lang="en-US" smtClean="0"/>
               <a:pPr/>
-              <a:t>7/8/18</a:t>
+              <a:t>7/13/18</a:t>
             </a:fld>
             <a:endParaRPr lang="en-US" dirty="0"/>
           </a:p>
@@ -9723,7 +9727,7 @@
             <a:fld id="{B61BEF0D-F0BB-DE4B-95CE-6DB70DBA9567}" type="datetimeFigureOut">
               <a:rPr lang="en-US" smtClean="0"/>
               <a:pPr/>
-              <a:t>7/8/18</a:t>
+              <a:t>7/13/18</a:t>
             </a:fld>
             <a:endParaRPr lang="en-US" dirty="0"/>
           </a:p>
@@ -13153,23 +13157,14 @@
             <p:ph type="title"/>
           </p:nvPr>
         </p:nvSpPr>
-        <p:spPr>
-          <a:xfrm>
-            <a:off x="1751011" y="527281"/>
-            <a:ext cx="8686800" cy="1468800"/>
-          </a:xfrm>
-        </p:spPr>
-        <p:txBody>
-          <a:bodyPr/>
-          <a:lstStyle/>
-          <a:p>
-            <a:r>
-              <a:rPr lang="en-US" dirty="0" smtClean="0"/>
-              <a:t>React </a:t>
-            </a:r>
+        <p:spPr/>
+        <p:txBody>
+          <a:bodyPr/>
+          <a:lstStyle/>
+          <a:p>
             <a:r>
               <a:rPr lang="zh-CN" altLang="en-US" dirty="0" smtClean="0"/>
-              <a:t>基础语法</a:t>
+              <a:t>作业批改</a:t>
             </a:r>
             <a:endParaRPr lang="en-US" dirty="0"/>
           </a:p>
@@ -13185,91 +13180,10 @@
             <p:ph type="body" idx="1"/>
           </p:nvPr>
         </p:nvSpPr>
-        <p:spPr>
-          <a:xfrm>
-            <a:off x="1611311" y="2262781"/>
-            <a:ext cx="8686801" cy="860400"/>
-          </a:xfrm>
-        </p:spPr>
-        <p:txBody>
-          <a:bodyPr/>
-          <a:lstStyle/>
-          <a:p>
-            <a:r>
-              <a:rPr lang="en-US" dirty="0"/>
-              <a:t>http://</a:t>
-            </a:r>
-            <a:r>
-              <a:rPr lang="en-US" dirty="0" err="1"/>
-              <a:t>www.ruanyifeng.com</a:t>
-            </a:r>
-            <a:r>
-              <a:rPr lang="en-US" dirty="0"/>
-              <a:t>/blog/2015/03/</a:t>
-            </a:r>
-            <a:r>
-              <a:rPr lang="en-US" dirty="0" err="1"/>
-              <a:t>react.html</a:t>
-            </a:r>
-            <a:endParaRPr lang="en-US" dirty="0"/>
-          </a:p>
-        </p:txBody>
-      </p:sp>
-      <p:sp>
-        <p:nvSpPr>
-          <p:cNvPr id="4" name="TextBox 3"/>
-          <p:cNvSpPr txBox="1"/>
-          <p:nvPr/>
-        </p:nvSpPr>
-        <p:spPr>
-          <a:xfrm>
-            <a:off x="1751011" y="3683000"/>
-            <a:ext cx="6605589" cy="1754326"/>
-          </a:xfrm>
-          <a:prstGeom prst="rect">
-            <a:avLst/>
-          </a:prstGeom>
-          <a:noFill/>
-        </p:spPr>
-        <p:txBody>
-          <a:bodyPr wrap="square" rtlCol="0">
-            <a:spAutoFit/>
-          </a:bodyPr>
-          <a:lstStyle/>
-          <a:p>
-            <a:r>
-              <a:rPr lang="zh-CN" altLang="en-US" dirty="0" smtClean="0"/>
-              <a:t>打开命令行</a:t>
-            </a:r>
-            <a:endParaRPr lang="en-US" altLang="zh-CN" dirty="0" smtClean="0"/>
-          </a:p>
-          <a:p>
-            <a:endParaRPr lang="en-US" dirty="0" smtClean="0"/>
-          </a:p>
-          <a:p>
-            <a:r>
-              <a:rPr lang="en-US" dirty="0" err="1" smtClean="0"/>
-              <a:t>npm</a:t>
-            </a:r>
-            <a:r>
-              <a:rPr lang="en-US" dirty="0" smtClean="0"/>
-              <a:t> </a:t>
-            </a:r>
-            <a:r>
-              <a:rPr lang="en-US" dirty="0"/>
-              <a:t>install -g create-react-app </a:t>
-            </a:r>
-            <a:endParaRPr lang="en-US" dirty="0" smtClean="0"/>
-          </a:p>
-          <a:p>
-            <a:r>
-              <a:rPr lang="en-US" dirty="0" smtClean="0"/>
-              <a:t>create-react-app game</a:t>
-            </a:r>
-          </a:p>
-          <a:p>
-            <a:endParaRPr lang="en-US" dirty="0" smtClean="0"/>
-          </a:p>
+        <p:spPr/>
+        <p:txBody>
+          <a:bodyPr/>
+          <a:lstStyle/>
           <a:p>
             <a:endParaRPr lang="en-US" dirty="0"/>
           </a:p>
@@ -13278,7 +13192,7 @@
     </p:spTree>
     <p:extLst>
       <p:ext uri="{BB962C8B-B14F-4D97-AF65-F5344CB8AC3E}">
-        <p14:creationId xmlns:p14="http://schemas.microsoft.com/office/powerpoint/2010/main" val="1795940807"/>
+        <p14:creationId xmlns:p14="http://schemas.microsoft.com/office/powerpoint/2010/main" val="606395550"/>
       </p:ext>
     </p:extLst>
   </p:cSld>
@@ -13322,22 +13236,23 @@
             <p:ph type="title"/>
           </p:nvPr>
         </p:nvSpPr>
-        <p:spPr/>
-        <p:txBody>
-          <a:bodyPr/>
-          <a:lstStyle/>
-          <a:p>
-            <a:r>
-              <a:rPr lang="en-US" altLang="zh-CN" dirty="0" smtClean="0"/>
-              <a:t>React</a:t>
+        <p:spPr>
+          <a:xfrm>
+            <a:off x="1751011" y="527281"/>
+            <a:ext cx="8686800" cy="1468800"/>
+          </a:xfrm>
+        </p:spPr>
+        <p:txBody>
+          <a:bodyPr/>
+          <a:lstStyle/>
+          <a:p>
+            <a:r>
+              <a:rPr lang="en-US" dirty="0" smtClean="0"/>
+              <a:t>React </a:t>
             </a:r>
             <a:r>
               <a:rPr lang="zh-CN" altLang="en-US" dirty="0" smtClean="0"/>
-              <a:t> 作业</a:t>
-            </a:r>
-            <a:r>
-              <a:rPr lang="en-US" altLang="zh-CN" dirty="0" smtClean="0"/>
-              <a:t>1</a:t>
+              <a:t>基础语法</a:t>
             </a:r>
             <a:endParaRPr lang="en-US" dirty="0"/>
           </a:p>
@@ -13353,23 +13268,136 @@
             <p:ph type="body" idx="1"/>
           </p:nvPr>
         </p:nvSpPr>
-        <p:spPr/>
-        <p:txBody>
-          <a:bodyPr/>
+        <p:spPr>
+          <a:xfrm>
+            <a:off x="1611311" y="2262781"/>
+            <a:ext cx="8686801" cy="860400"/>
+          </a:xfrm>
+        </p:spPr>
+        <p:txBody>
+          <a:bodyPr/>
+          <a:lstStyle/>
+          <a:p>
+            <a:r>
+              <a:rPr lang="en-US" dirty="0"/>
+              <a:t>http://</a:t>
+            </a:r>
+            <a:r>
+              <a:rPr lang="en-US" dirty="0" err="1"/>
+              <a:t>www.ruanyifeng.com</a:t>
+            </a:r>
+            <a:r>
+              <a:rPr lang="en-US" dirty="0"/>
+              <a:t>/blog/2015/03/</a:t>
+            </a:r>
+            <a:r>
+              <a:rPr lang="en-US" dirty="0" err="1"/>
+              <a:t>react.html</a:t>
+            </a:r>
+            <a:endParaRPr lang="en-US" dirty="0"/>
+          </a:p>
+        </p:txBody>
+      </p:sp>
+      <p:sp>
+        <p:nvSpPr>
+          <p:cNvPr id="4" name="TextBox 3"/>
+          <p:cNvSpPr txBox="1"/>
+          <p:nvPr/>
+        </p:nvSpPr>
+        <p:spPr>
+          <a:xfrm>
+            <a:off x="1751011" y="3683000"/>
+            <a:ext cx="6605589" cy="2585323"/>
+          </a:xfrm>
+          <a:prstGeom prst="rect">
+            <a:avLst/>
+          </a:prstGeom>
+          <a:noFill/>
+        </p:spPr>
+        <p:txBody>
+          <a:bodyPr wrap="square" rtlCol="0">
+            <a:spAutoFit/>
+          </a:bodyPr>
           <a:lstStyle/>
           <a:p>
             <a:r>
               <a:rPr lang="zh-CN" altLang="en-US" dirty="0" smtClean="0"/>
-              <a:t>自己搭建好一个</a:t>
-            </a:r>
-            <a:r>
-              <a:rPr lang="en-US" altLang="zh-CN" dirty="0" smtClean="0"/>
-              <a:t>React</a:t>
-            </a:r>
+              <a:t>打开命令行</a:t>
+            </a:r>
+            <a:endParaRPr lang="en-US" altLang="zh-CN" dirty="0" smtClean="0"/>
+          </a:p>
+          <a:p>
+            <a:endParaRPr lang="en-US" dirty="0" smtClean="0"/>
+          </a:p>
+          <a:p>
+            <a:r>
+              <a:rPr lang="en-US" dirty="0" err="1" smtClean="0"/>
+              <a:t>npm</a:t>
+            </a:r>
+            <a:r>
+              <a:rPr lang="en-US" dirty="0" smtClean="0"/>
+              <a:t> </a:t>
+            </a:r>
+            <a:r>
+              <a:rPr lang="en-US" dirty="0"/>
+              <a:t>install -g create-react-app </a:t>
+            </a:r>
+            <a:endParaRPr lang="en-US" dirty="0" smtClean="0"/>
+          </a:p>
+          <a:p>
+            <a:r>
+              <a:rPr lang="en-US" dirty="0" smtClean="0"/>
+              <a:t>create-react-app </a:t>
+            </a:r>
+            <a:r>
+              <a:rPr lang="en-US" dirty="0" smtClean="0"/>
+              <a:t>game</a:t>
+            </a:r>
+          </a:p>
+          <a:p>
+            <a:r>
+              <a:rPr lang="en-US" dirty="0" smtClean="0"/>
+              <a:t>cd game</a:t>
+            </a:r>
+          </a:p>
+          <a:p>
+            <a:r>
+              <a:rPr lang="en-US" dirty="0" err="1"/>
+              <a:t>n</a:t>
+            </a:r>
+            <a:r>
+              <a:rPr lang="en-US" dirty="0" err="1" smtClean="0"/>
+              <a:t>pm</a:t>
+            </a:r>
+            <a:r>
+              <a:rPr lang="en-US" dirty="0" smtClean="0"/>
+              <a:t> start</a:t>
+            </a:r>
+            <a:endParaRPr lang="en-US" dirty="0" smtClean="0"/>
+          </a:p>
+          <a:p>
+            <a:endParaRPr lang="en-US" dirty="0" smtClean="0"/>
+          </a:p>
+          <a:p>
             <a:r>
               <a:rPr lang="zh-CN" altLang="en-US" dirty="0" smtClean="0"/>
-              <a:t>项目框架，并实现圣杯布局</a:t>
-            </a:r>
+              <a:t>安装</a:t>
+            </a:r>
+            <a:r>
+              <a:rPr lang="en-US" dirty="0" err="1" smtClean="0"/>
+              <a:t>Vscode</a:t>
+            </a:r>
+            <a:r>
+              <a:rPr lang="en-US" dirty="0" smtClean="0"/>
+              <a:t> </a:t>
+            </a:r>
+            <a:r>
+              <a:rPr lang="zh-CN" altLang="en-US" dirty="0" smtClean="0"/>
+              <a:t>插件</a:t>
+            </a:r>
+            <a:endParaRPr lang="en-US" dirty="0" smtClean="0"/>
+          </a:p>
+          <a:p>
             <a:endParaRPr lang="en-US" dirty="0"/>
           </a:p>
         </p:txBody>
@@ -13377,13 +13405,20 @@
     </p:spTree>
     <p:extLst>
       <p:ext uri="{BB962C8B-B14F-4D97-AF65-F5344CB8AC3E}">
-        <p14:creationId xmlns:p14="http://schemas.microsoft.com/office/powerpoint/2010/main" val="1410929711"/>
+        <p14:creationId xmlns:p14="http://schemas.microsoft.com/office/powerpoint/2010/main" val="1795940807"/>
       </p:ext>
     </p:extLst>
   </p:cSld>
   <p:clrMapOvr>
     <a:masterClrMapping/>
   </p:clrMapOvr>
+  <p:timing>
+    <p:tnLst>
+      <p:par>
+        <p:cTn id="1" dur="indefinite" restart="never" nodeType="tmRoot"/>
+      </p:par>
+    </p:tnLst>
+  </p:timing>
 </p:sld>
 </file>
 
@@ -13406,7 +13441,7 @@
       </p:grpSpPr>
       <p:sp>
         <p:nvSpPr>
-          <p:cNvPr id="2" name="Title 1"/>
+          <p:cNvPr id="6" name="Title 5"/>
           <p:cNvSpPr>
             <a:spLocks noGrp="1"/>
           </p:cNvSpPr>
@@ -13425,38 +13460,99 @@
             </a:r>
             <a:r>
               <a:rPr lang="zh-CN" altLang="en-US" dirty="0" smtClean="0"/>
-              <a:t>项目实战</a:t>
-            </a:r>
-            <a:endParaRPr lang="en-US" dirty="0"/>
-          </a:p>
-        </p:txBody>
-      </p:sp>
-      <p:sp>
-        <p:nvSpPr>
-          <p:cNvPr id="3" name="Text Placeholder 2"/>
-          <p:cNvSpPr>
-            <a:spLocks noGrp="1"/>
-          </p:cNvSpPr>
-          <p:nvPr>
-            <p:ph type="body" idx="1"/>
-          </p:nvPr>
-        </p:nvSpPr>
-        <p:spPr/>
-        <p:txBody>
-          <a:bodyPr/>
-          <a:lstStyle/>
-          <a:p>
+              <a:t>小结</a:t>
+            </a:r>
+            <a:endParaRPr lang="en-US" dirty="0"/>
+          </a:p>
+        </p:txBody>
+      </p:sp>
+      <p:sp>
+        <p:nvSpPr>
+          <p:cNvPr id="7" name="Content Placeholder 6"/>
+          <p:cNvSpPr>
+            <a:spLocks noGrp="1"/>
+          </p:cNvSpPr>
+          <p:nvPr>
+            <p:ph idx="1"/>
+          </p:nvPr>
+        </p:nvSpPr>
+        <p:spPr/>
+        <p:txBody>
+          <a:bodyPr/>
+          <a:lstStyle/>
+          <a:p>
+            <a:r>
+              <a:rPr lang="en-US" altLang="zh-CN" dirty="0" smtClean="0"/>
+              <a:t>Virtual</a:t>
+            </a:r>
             <a:r>
               <a:rPr lang="zh-CN" altLang="en-US" dirty="0" smtClean="0"/>
-              <a:t>实现官方教程</a:t>
+              <a:t> </a:t>
             </a:r>
             <a:r>
               <a:rPr lang="en-US" altLang="zh-CN" dirty="0" smtClean="0"/>
-              <a:t>-</a:t>
-            </a:r>
+              <a:t>Dom</a:t>
+            </a:r>
+          </a:p>
+          <a:p>
             <a:r>
               <a:rPr lang="zh-CN" altLang="en-US" dirty="0" smtClean="0"/>
-              <a:t>井字棋</a:t>
+              <a:t>使用</a:t>
+            </a:r>
+            <a:r>
+              <a:rPr lang="en-US" altLang="zh-CN" dirty="0" smtClean="0"/>
+              <a:t>Component</a:t>
+            </a:r>
+          </a:p>
+          <a:p>
+            <a:r>
+              <a:rPr lang="en-US" altLang="zh-CN" dirty="0" smtClean="0"/>
+              <a:t>State</a:t>
+            </a:r>
+            <a:r>
+              <a:rPr lang="zh-CN" altLang="en-US" dirty="0" smtClean="0"/>
+              <a:t>和</a:t>
+            </a:r>
+            <a:r>
+              <a:rPr lang="en-US" altLang="zh-CN" dirty="0" smtClean="0"/>
+              <a:t>Props</a:t>
+            </a:r>
+          </a:p>
+          <a:p>
+            <a:r>
+              <a:rPr lang="zh-CN" altLang="en-US" dirty="0" smtClean="0"/>
+              <a:t>怎么从父节点传给子节点</a:t>
+            </a:r>
+            <a:endParaRPr lang="en-US" altLang="zh-CN" dirty="0" smtClean="0"/>
+          </a:p>
+          <a:p>
+            <a:r>
+              <a:rPr lang="zh-CN" altLang="en-US" dirty="0" smtClean="0"/>
+              <a:t>使用</a:t>
+            </a:r>
+            <a:r>
+              <a:rPr lang="en-US" dirty="0" err="1"/>
+              <a:t>npm</a:t>
+            </a:r>
+            <a:r>
+              <a:rPr lang="en-US" dirty="0"/>
+              <a:t> </a:t>
+            </a:r>
+            <a:r>
+              <a:rPr lang="en-US" smtClean="0"/>
+              <a:t>i</a:t>
+            </a:r>
+            <a:r>
+              <a:rPr lang="zh-CN" altLang="en-US" smtClean="0"/>
+              <a:t>安装</a:t>
+            </a:r>
+            <a:r>
+              <a:rPr lang="en-US" altLang="zh-CN" dirty="0" err="1" smtClean="0"/>
+              <a:t>npm</a:t>
+            </a:r>
+            <a:r>
+              <a:rPr lang="zh-CN" altLang="en-US" dirty="0" smtClean="0"/>
+              <a:t>库</a:t>
             </a:r>
             <a:endParaRPr lang="en-US" dirty="0"/>
           </a:p>
@@ -13465,7 +13561,7 @@
     </p:spTree>
     <p:extLst>
       <p:ext uri="{BB962C8B-B14F-4D97-AF65-F5344CB8AC3E}">
-        <p14:creationId xmlns:p14="http://schemas.microsoft.com/office/powerpoint/2010/main" val="1403310130"/>
+        <p14:creationId xmlns:p14="http://schemas.microsoft.com/office/powerpoint/2010/main" val="1934418425"/>
       </p:ext>
     </p:extLst>
   </p:cSld>
@@ -13515,12 +13611,12 @@
           <a:lstStyle/>
           <a:p>
             <a:r>
-              <a:rPr lang="en-US" altLang="zh-CN" dirty="0" err="1" smtClean="0"/>
-              <a:t>Redux</a:t>
+              <a:rPr lang="en-US" altLang="zh-CN" dirty="0" smtClean="0"/>
+              <a:t>React</a:t>
             </a:r>
             <a:r>
               <a:rPr lang="zh-CN" altLang="en-US" dirty="0" smtClean="0"/>
-              <a:t>入门</a:t>
+              <a:t>项目实战</a:t>
             </a:r>
             <a:endParaRPr lang="en-US" dirty="0"/>
           </a:p>
@@ -13542,8 +13638,16 @@
           <a:lstStyle/>
           <a:p>
             <a:r>
-              <a:rPr lang="en-US" dirty="0" smtClean="0"/>
-              <a:t>State Management Tool</a:t>
+              <a:rPr lang="zh-CN" altLang="en-US" dirty="0" smtClean="0"/>
+              <a:t>实现官方教程</a:t>
+            </a:r>
+            <a:r>
+              <a:rPr lang="en-US" altLang="zh-CN" dirty="0" smtClean="0"/>
+              <a:t>-</a:t>
+            </a:r>
+            <a:r>
+              <a:rPr lang="zh-CN" altLang="en-US" dirty="0" smtClean="0"/>
+              <a:t>井字棋</a:t>
             </a:r>
             <a:endParaRPr lang="en-US" dirty="0"/>
           </a:p>
@@ -13552,7 +13656,7 @@
     </p:spTree>
     <p:extLst>
       <p:ext uri="{BB962C8B-B14F-4D97-AF65-F5344CB8AC3E}">
-        <p14:creationId xmlns:p14="http://schemas.microsoft.com/office/powerpoint/2010/main" val="112265536"/>
+        <p14:creationId xmlns:p14="http://schemas.microsoft.com/office/powerpoint/2010/main" val="1403310130"/>
       </p:ext>
     </p:extLst>
   </p:cSld>
@@ -13602,6 +13706,354 @@
           <a:lstStyle/>
           <a:p>
             <a:r>
+              <a:rPr lang="en-US" altLang="zh-CN" dirty="0" smtClean="0"/>
+              <a:t>React</a:t>
+            </a:r>
+            <a:r>
+              <a:rPr lang="zh-CN" altLang="en-US" dirty="0" smtClean="0"/>
+              <a:t> 作业</a:t>
+            </a:r>
+            <a:r>
+              <a:rPr lang="en-US" altLang="zh-CN" dirty="0" smtClean="0"/>
+              <a:t>1</a:t>
+            </a:r>
+            <a:endParaRPr lang="en-US" dirty="0"/>
+          </a:p>
+        </p:txBody>
+      </p:sp>
+      <p:sp>
+        <p:nvSpPr>
+          <p:cNvPr id="3" name="Text Placeholder 2"/>
+          <p:cNvSpPr>
+            <a:spLocks noGrp="1"/>
+          </p:cNvSpPr>
+          <p:nvPr>
+            <p:ph type="body" idx="1"/>
+          </p:nvPr>
+        </p:nvSpPr>
+        <p:spPr/>
+        <p:txBody>
+          <a:bodyPr/>
+          <a:lstStyle/>
+          <a:p>
+            <a:r>
+              <a:rPr lang="zh-CN" altLang="en-US" dirty="0" smtClean="0"/>
+              <a:t>自己搭建好一个</a:t>
+            </a:r>
+            <a:r>
+              <a:rPr lang="en-US" altLang="zh-CN" dirty="0" smtClean="0"/>
+              <a:t>React</a:t>
+            </a:r>
+            <a:r>
+              <a:rPr lang="zh-CN" altLang="en-US" dirty="0" smtClean="0"/>
+              <a:t>项目框架，实现</a:t>
+            </a:r>
+            <a:r>
+              <a:rPr lang="en-US" altLang="zh-CN" dirty="0" err="1" smtClean="0"/>
+              <a:t>Todo</a:t>
+            </a:r>
+            <a:r>
+              <a:rPr lang="en-US" altLang="zh-CN" dirty="0" smtClean="0"/>
+              <a:t> list</a:t>
+            </a:r>
+          </a:p>
+          <a:p>
+            <a:r>
+              <a:rPr lang="zh-CN" altLang="en-US" dirty="0"/>
+              <a:t>实现官方教程</a:t>
+            </a:r>
+            <a:endParaRPr lang="en-US" dirty="0"/>
+          </a:p>
+        </p:txBody>
+      </p:sp>
+    </p:spTree>
+    <p:extLst>
+      <p:ext uri="{BB962C8B-B14F-4D97-AF65-F5344CB8AC3E}">
+        <p14:creationId xmlns:p14="http://schemas.microsoft.com/office/powerpoint/2010/main" val="1410929711"/>
+      </p:ext>
+    </p:extLst>
+  </p:cSld>
+  <p:clrMapOvr>
+    <a:masterClrMapping/>
+  </p:clrMapOvr>
+  <p:timing>
+    <p:tnLst>
+      <p:par>
+        <p:cTn id="1" dur="indefinite" restart="never" nodeType="tmRoot"/>
+      </p:par>
+    </p:tnLst>
+  </p:timing>
+</p:sld>
+</file>
+
+<file path=ppt/slides/slide39.xml><?xml version="1.0" encoding="utf-8"?>
+<p:sld xmlns:a="http://schemas.openxmlformats.org/drawingml/2006/main" xmlns:r="http://schemas.openxmlformats.org/officeDocument/2006/relationships" xmlns:p="http://schemas.openxmlformats.org/presentationml/2006/main">
+  <p:cSld>
+    <p:spTree>
+      <p:nvGrpSpPr>
+        <p:cNvPr id="1" name=""/>
+        <p:cNvGrpSpPr/>
+        <p:nvPr/>
+      </p:nvGrpSpPr>
+      <p:grpSpPr>
+        <a:xfrm>
+          <a:off x="0" y="0"/>
+          <a:ext cx="0" cy="0"/>
+          <a:chOff x="0" y="0"/>
+          <a:chExt cx="0" cy="0"/>
+        </a:xfrm>
+      </p:grpSpPr>
+      <p:sp>
+        <p:nvSpPr>
+          <p:cNvPr id="2" name="Title 1"/>
+          <p:cNvSpPr>
+            <a:spLocks noGrp="1"/>
+          </p:cNvSpPr>
+          <p:nvPr>
+            <p:ph type="title"/>
+          </p:nvPr>
+        </p:nvSpPr>
+        <p:spPr/>
+        <p:txBody>
+          <a:bodyPr/>
+          <a:lstStyle/>
+          <a:p>
+            <a:r>
+              <a:rPr lang="en-US" altLang="zh-CN" dirty="0" err="1" smtClean="0"/>
+              <a:t>Redux</a:t>
+            </a:r>
+            <a:r>
+              <a:rPr lang="zh-CN" altLang="en-US" dirty="0" smtClean="0"/>
+              <a:t>入门</a:t>
+            </a:r>
+            <a:endParaRPr lang="en-US" dirty="0"/>
+          </a:p>
+        </p:txBody>
+      </p:sp>
+      <p:sp>
+        <p:nvSpPr>
+          <p:cNvPr id="3" name="Text Placeholder 2"/>
+          <p:cNvSpPr>
+            <a:spLocks noGrp="1"/>
+          </p:cNvSpPr>
+          <p:nvPr>
+            <p:ph type="body" idx="1"/>
+          </p:nvPr>
+        </p:nvSpPr>
+        <p:spPr/>
+        <p:txBody>
+          <a:bodyPr/>
+          <a:lstStyle/>
+          <a:p>
+            <a:r>
+              <a:rPr lang="en-US" dirty="0" smtClean="0"/>
+              <a:t>State Management Tool</a:t>
+            </a:r>
+            <a:endParaRPr lang="en-US" dirty="0"/>
+          </a:p>
+        </p:txBody>
+      </p:sp>
+    </p:spTree>
+    <p:extLst>
+      <p:ext uri="{BB962C8B-B14F-4D97-AF65-F5344CB8AC3E}">
+        <p14:creationId xmlns:p14="http://schemas.microsoft.com/office/powerpoint/2010/main" val="112265536"/>
+      </p:ext>
+    </p:extLst>
+  </p:cSld>
+  <p:clrMapOvr>
+    <a:masterClrMapping/>
+  </p:clrMapOvr>
+  <p:timing>
+    <p:tnLst>
+      <p:par>
+        <p:cTn id="1" dur="indefinite" restart="never" nodeType="tmRoot"/>
+      </p:par>
+    </p:tnLst>
+  </p:timing>
+</p:sld>
+</file>
+
+<file path=ppt/slides/slide4.xml><?xml version="1.0" encoding="utf-8"?>
+<p:sld xmlns:a="http://schemas.openxmlformats.org/drawingml/2006/main" xmlns:r="http://schemas.openxmlformats.org/officeDocument/2006/relationships" xmlns:p="http://schemas.openxmlformats.org/presentationml/2006/main">
+  <p:cSld>
+    <p:spTree>
+      <p:nvGrpSpPr>
+        <p:cNvPr id="1" name=""/>
+        <p:cNvGrpSpPr/>
+        <p:nvPr/>
+      </p:nvGrpSpPr>
+      <p:grpSpPr>
+        <a:xfrm>
+          <a:off x="0" y="0"/>
+          <a:ext cx="0" cy="0"/>
+          <a:chOff x="0" y="0"/>
+          <a:chExt cx="0" cy="0"/>
+        </a:xfrm>
+      </p:grpSpPr>
+      <p:sp>
+        <p:nvSpPr>
+          <p:cNvPr id="2" name="Title 1"/>
+          <p:cNvSpPr>
+            <a:spLocks noGrp="1"/>
+          </p:cNvSpPr>
+          <p:nvPr>
+            <p:ph type="title"/>
+          </p:nvPr>
+        </p:nvSpPr>
+        <p:spPr/>
+        <p:txBody>
+          <a:bodyPr/>
+          <a:lstStyle/>
+          <a:p>
+            <a:r>
+              <a:rPr lang="zh-CN" altLang="en-US" dirty="0" smtClean="0"/>
+              <a:t>这门课程要学什么</a:t>
+            </a:r>
+            <a:endParaRPr lang="en-US" dirty="0"/>
+          </a:p>
+        </p:txBody>
+      </p:sp>
+      <p:sp>
+        <p:nvSpPr>
+          <p:cNvPr id="3" name="Content Placeholder 2"/>
+          <p:cNvSpPr>
+            <a:spLocks noGrp="1"/>
+          </p:cNvSpPr>
+          <p:nvPr>
+            <p:ph idx="1"/>
+          </p:nvPr>
+        </p:nvSpPr>
+        <p:spPr/>
+        <p:txBody>
+          <a:bodyPr/>
+          <a:lstStyle/>
+          <a:p>
+            <a:r>
+              <a:rPr lang="zh-CN" altLang="en-US" dirty="0" smtClean="0"/>
+              <a:t>了解前端技术</a:t>
+            </a:r>
+            <a:endParaRPr lang="en-US" altLang="zh-CN" dirty="0" smtClean="0"/>
+          </a:p>
+          <a:p>
+            <a:r>
+              <a:rPr lang="zh-CN" altLang="en-US" dirty="0" smtClean="0"/>
+              <a:t>为什么要用前端技术</a:t>
+            </a:r>
+            <a:endParaRPr lang="en-US" altLang="zh-CN" dirty="0" smtClean="0"/>
+          </a:p>
+          <a:p>
+            <a:r>
+              <a:rPr lang="en-US" altLang="zh-CN" dirty="0" smtClean="0"/>
+              <a:t>HTML, CSS, JS</a:t>
+            </a:r>
+            <a:r>
+              <a:rPr lang="zh-CN" altLang="en-US" dirty="0" smtClean="0"/>
+              <a:t>基础回顾</a:t>
+            </a:r>
+            <a:endParaRPr lang="en-US" altLang="zh-CN" dirty="0" smtClean="0"/>
+          </a:p>
+          <a:p>
+            <a:r>
+              <a:rPr lang="zh-CN" altLang="en-US" dirty="0" smtClean="0"/>
+              <a:t>分别学习</a:t>
+            </a:r>
+            <a:r>
+              <a:rPr lang="en-US" altLang="zh-CN" dirty="0" smtClean="0"/>
+              <a:t>React</a:t>
+            </a:r>
+            <a:r>
+              <a:rPr lang="zh-CN" altLang="en-US" dirty="0" smtClean="0"/>
+              <a:t> 和 </a:t>
+            </a:r>
+            <a:r>
+              <a:rPr lang="en-US" altLang="zh-CN" dirty="0" smtClean="0"/>
+              <a:t>angular</a:t>
+            </a:r>
+          </a:p>
+          <a:p>
+            <a:r>
+              <a:rPr lang="zh-CN" altLang="en-US" dirty="0" smtClean="0"/>
+              <a:t>在课程结束时达到自己能写一个前端</a:t>
+            </a:r>
+            <a:r>
+              <a:rPr lang="en-US" altLang="zh-CN" dirty="0" smtClean="0"/>
+              <a:t>SPA(Single page application)</a:t>
+            </a:r>
+            <a:r>
+              <a:rPr lang="zh-CN" altLang="en-US" dirty="0" smtClean="0"/>
+              <a:t>的水平</a:t>
+            </a:r>
+            <a:endParaRPr lang="en-US" altLang="zh-CN" dirty="0" smtClean="0"/>
+          </a:p>
+          <a:p>
+            <a:r>
+              <a:rPr lang="zh-CN" altLang="en-US" dirty="0" smtClean="0"/>
+              <a:t>能够形成自己对前端技术的理解</a:t>
+            </a:r>
+            <a:endParaRPr lang="en-US" altLang="zh-CN" dirty="0" smtClean="0"/>
+          </a:p>
+          <a:p>
+            <a:r>
+              <a:rPr lang="zh-CN" altLang="en-US" dirty="0" smtClean="0"/>
+              <a:t>面试辅导</a:t>
+            </a:r>
+            <a:endParaRPr lang="en-US" dirty="0"/>
+          </a:p>
+        </p:txBody>
+      </p:sp>
+    </p:spTree>
+    <p:extLst>
+      <p:ext uri="{BB962C8B-B14F-4D97-AF65-F5344CB8AC3E}">
+        <p14:creationId xmlns:p14="http://schemas.microsoft.com/office/powerpoint/2010/main" val="24290296"/>
+      </p:ext>
+    </p:extLst>
+  </p:cSld>
+  <p:clrMapOvr>
+    <a:masterClrMapping/>
+  </p:clrMapOvr>
+  <p:timing>
+    <p:tnLst>
+      <p:par>
+        <p:cTn id="1" dur="indefinite" restart="never" nodeType="tmRoot"/>
+      </p:par>
+    </p:tnLst>
+  </p:timing>
+</p:sld>
+</file>
+
+<file path=ppt/slides/slide40.xml><?xml version="1.0" encoding="utf-8"?>
+<p:sld xmlns:a="http://schemas.openxmlformats.org/drawingml/2006/main" xmlns:r="http://schemas.openxmlformats.org/officeDocument/2006/relationships" xmlns:p="http://schemas.openxmlformats.org/presentationml/2006/main">
+  <p:cSld>
+    <p:spTree>
+      <p:nvGrpSpPr>
+        <p:cNvPr id="1" name=""/>
+        <p:cNvGrpSpPr/>
+        <p:nvPr/>
+      </p:nvGrpSpPr>
+      <p:grpSpPr>
+        <a:xfrm>
+          <a:off x="0" y="0"/>
+          <a:ext cx="0" cy="0"/>
+          <a:chOff x="0" y="0"/>
+          <a:chExt cx="0" cy="0"/>
+        </a:xfrm>
+      </p:grpSpPr>
+      <p:sp>
+        <p:nvSpPr>
+          <p:cNvPr id="2" name="Title 1"/>
+          <p:cNvSpPr>
+            <a:spLocks noGrp="1"/>
+          </p:cNvSpPr>
+          <p:nvPr>
+            <p:ph type="title"/>
+          </p:nvPr>
+        </p:nvSpPr>
+        <p:spPr/>
+        <p:txBody>
+          <a:bodyPr/>
+          <a:lstStyle/>
+          <a:p>
+            <a:r>
               <a:rPr lang="en-US" dirty="0" err="1" smtClean="0"/>
               <a:t>Redux</a:t>
             </a:r>
@@ -13733,7 +14185,7 @@
 </p:sld>
 </file>
 
-<file path=ppt/slides/slide39.xml><?xml version="1.0" encoding="utf-8"?>
+<file path=ppt/slides/slide41.xml><?xml version="1.0" encoding="utf-8"?>
 <p:sld xmlns:a="http://schemas.openxmlformats.org/drawingml/2006/main" xmlns:r="http://schemas.openxmlformats.org/officeDocument/2006/relationships" xmlns:p="http://schemas.openxmlformats.org/presentationml/2006/main">
   <p:cSld>
     <p:spTree>
@@ -13823,359 +14275,6 @@
 </p:sld>
 </file>
 
-<file path=ppt/slides/slide4.xml><?xml version="1.0" encoding="utf-8"?>
-<p:sld xmlns:a="http://schemas.openxmlformats.org/drawingml/2006/main" xmlns:r="http://schemas.openxmlformats.org/officeDocument/2006/relationships" xmlns:p="http://schemas.openxmlformats.org/presentationml/2006/main">
-  <p:cSld>
-    <p:spTree>
-      <p:nvGrpSpPr>
-        <p:cNvPr id="1" name=""/>
-        <p:cNvGrpSpPr/>
-        <p:nvPr/>
-      </p:nvGrpSpPr>
-      <p:grpSpPr>
-        <a:xfrm>
-          <a:off x="0" y="0"/>
-          <a:ext cx="0" cy="0"/>
-          <a:chOff x="0" y="0"/>
-          <a:chExt cx="0" cy="0"/>
-        </a:xfrm>
-      </p:grpSpPr>
-      <p:sp>
-        <p:nvSpPr>
-          <p:cNvPr id="2" name="Title 1"/>
-          <p:cNvSpPr>
-            <a:spLocks noGrp="1"/>
-          </p:cNvSpPr>
-          <p:nvPr>
-            <p:ph type="title"/>
-          </p:nvPr>
-        </p:nvSpPr>
-        <p:spPr/>
-        <p:txBody>
-          <a:bodyPr/>
-          <a:lstStyle/>
-          <a:p>
-            <a:r>
-              <a:rPr lang="zh-CN" altLang="en-US" dirty="0" smtClean="0"/>
-              <a:t>这门课程要学什么</a:t>
-            </a:r>
-            <a:endParaRPr lang="en-US" dirty="0"/>
-          </a:p>
-        </p:txBody>
-      </p:sp>
-      <p:sp>
-        <p:nvSpPr>
-          <p:cNvPr id="3" name="Content Placeholder 2"/>
-          <p:cNvSpPr>
-            <a:spLocks noGrp="1"/>
-          </p:cNvSpPr>
-          <p:nvPr>
-            <p:ph idx="1"/>
-          </p:nvPr>
-        </p:nvSpPr>
-        <p:spPr/>
-        <p:txBody>
-          <a:bodyPr/>
-          <a:lstStyle/>
-          <a:p>
-            <a:r>
-              <a:rPr lang="zh-CN" altLang="en-US" dirty="0" smtClean="0"/>
-              <a:t>了解前端技术</a:t>
-            </a:r>
-            <a:endParaRPr lang="en-US" altLang="zh-CN" dirty="0" smtClean="0"/>
-          </a:p>
-          <a:p>
-            <a:r>
-              <a:rPr lang="zh-CN" altLang="en-US" dirty="0" smtClean="0"/>
-              <a:t>为什么要用前端技术</a:t>
-            </a:r>
-            <a:endParaRPr lang="en-US" altLang="zh-CN" dirty="0" smtClean="0"/>
-          </a:p>
-          <a:p>
-            <a:r>
-              <a:rPr lang="en-US" altLang="zh-CN" dirty="0" smtClean="0"/>
-              <a:t>HTML, CSS, JS</a:t>
-            </a:r>
-            <a:r>
-              <a:rPr lang="zh-CN" altLang="en-US" dirty="0" smtClean="0"/>
-              <a:t>基础回顾</a:t>
-            </a:r>
-            <a:endParaRPr lang="en-US" altLang="zh-CN" dirty="0" smtClean="0"/>
-          </a:p>
-          <a:p>
-            <a:r>
-              <a:rPr lang="zh-CN" altLang="en-US" dirty="0" smtClean="0"/>
-              <a:t>分别学习</a:t>
-            </a:r>
-            <a:r>
-              <a:rPr lang="en-US" altLang="zh-CN" dirty="0" smtClean="0"/>
-              <a:t>React</a:t>
-            </a:r>
-            <a:r>
-              <a:rPr lang="zh-CN" altLang="en-US" dirty="0" smtClean="0"/>
-              <a:t> 和 </a:t>
-            </a:r>
-            <a:r>
-              <a:rPr lang="en-US" altLang="zh-CN" dirty="0" smtClean="0"/>
-              <a:t>angular</a:t>
-            </a:r>
-          </a:p>
-          <a:p>
-            <a:r>
-              <a:rPr lang="zh-CN" altLang="en-US" dirty="0" smtClean="0"/>
-              <a:t>在课程结束时达到自己能写一个前端</a:t>
-            </a:r>
-            <a:r>
-              <a:rPr lang="en-US" altLang="zh-CN" dirty="0" smtClean="0"/>
-              <a:t>SPA(Single page application)</a:t>
-            </a:r>
-            <a:r>
-              <a:rPr lang="zh-CN" altLang="en-US" dirty="0" smtClean="0"/>
-              <a:t>的水平</a:t>
-            </a:r>
-            <a:endParaRPr lang="en-US" altLang="zh-CN" dirty="0" smtClean="0"/>
-          </a:p>
-          <a:p>
-            <a:r>
-              <a:rPr lang="zh-CN" altLang="en-US" dirty="0" smtClean="0"/>
-              <a:t>能够形成自己对前端技术的理解</a:t>
-            </a:r>
-            <a:endParaRPr lang="en-US" altLang="zh-CN" dirty="0" smtClean="0"/>
-          </a:p>
-          <a:p>
-            <a:r>
-              <a:rPr lang="zh-CN" altLang="en-US" dirty="0" smtClean="0"/>
-              <a:t>面试辅导</a:t>
-            </a:r>
-            <a:endParaRPr lang="en-US" dirty="0"/>
-          </a:p>
-        </p:txBody>
-      </p:sp>
-    </p:spTree>
-    <p:extLst>
-      <p:ext uri="{BB962C8B-B14F-4D97-AF65-F5344CB8AC3E}">
-        <p14:creationId xmlns:p14="http://schemas.microsoft.com/office/powerpoint/2010/main" val="24290296"/>
-      </p:ext>
-    </p:extLst>
-  </p:cSld>
-  <p:clrMapOvr>
-    <a:masterClrMapping/>
-  </p:clrMapOvr>
-  <p:timing>
-    <p:tnLst>
-      <p:par>
-        <p:cTn id="1" dur="indefinite" restart="never" nodeType="tmRoot"/>
-      </p:par>
-    </p:tnLst>
-  </p:timing>
-</p:sld>
-</file>
-
-<file path=ppt/slides/slide40.xml><?xml version="1.0" encoding="utf-8"?>
-<p:sld xmlns:a="http://schemas.openxmlformats.org/drawingml/2006/main" xmlns:r="http://schemas.openxmlformats.org/officeDocument/2006/relationships" xmlns:p="http://schemas.openxmlformats.org/presentationml/2006/main">
-  <p:cSld>
-    <p:spTree>
-      <p:nvGrpSpPr>
-        <p:cNvPr id="1" name=""/>
-        <p:cNvGrpSpPr/>
-        <p:nvPr/>
-      </p:nvGrpSpPr>
-      <p:grpSpPr>
-        <a:xfrm>
-          <a:off x="0" y="0"/>
-          <a:ext cx="0" cy="0"/>
-          <a:chOff x="0" y="0"/>
-          <a:chExt cx="0" cy="0"/>
-        </a:xfrm>
-      </p:grpSpPr>
-      <p:sp>
-        <p:nvSpPr>
-          <p:cNvPr id="2" name="Title 1"/>
-          <p:cNvSpPr>
-            <a:spLocks noGrp="1"/>
-          </p:cNvSpPr>
-          <p:nvPr>
-            <p:ph type="title"/>
-          </p:nvPr>
-        </p:nvSpPr>
-        <p:spPr/>
-        <p:txBody>
-          <a:bodyPr/>
-          <a:lstStyle/>
-          <a:p>
-            <a:r>
-              <a:rPr lang="en-US" dirty="0" err="1" smtClean="0"/>
-              <a:t>Dva</a:t>
-            </a:r>
-            <a:endParaRPr lang="en-US" dirty="0"/>
-          </a:p>
-        </p:txBody>
-      </p:sp>
-      <p:sp>
-        <p:nvSpPr>
-          <p:cNvPr id="3" name="Text Placeholder 2"/>
-          <p:cNvSpPr>
-            <a:spLocks noGrp="1"/>
-          </p:cNvSpPr>
-          <p:nvPr>
-            <p:ph type="body" idx="1"/>
-          </p:nvPr>
-        </p:nvSpPr>
-        <p:spPr/>
-        <p:txBody>
-          <a:bodyPr/>
-          <a:lstStyle/>
-          <a:p>
-            <a:r>
-              <a:rPr lang="zh-CN" altLang="en-US" dirty="0" smtClean="0"/>
-              <a:t>阿里对</a:t>
-            </a:r>
-            <a:r>
-              <a:rPr lang="en-US" altLang="zh-CN" dirty="0" err="1" smtClean="0"/>
-              <a:t>Redux</a:t>
-            </a:r>
-            <a:r>
-              <a:rPr lang="zh-CN" altLang="en-US" dirty="0" smtClean="0"/>
-              <a:t>的封装</a:t>
-            </a:r>
-            <a:endParaRPr lang="en-US" altLang="zh-CN" dirty="0" smtClean="0"/>
-          </a:p>
-          <a:p>
-            <a:r>
-              <a:rPr lang="en-US" dirty="0"/>
-              <a:t>https://</a:t>
-            </a:r>
-            <a:r>
-              <a:rPr lang="en-US" dirty="0" err="1"/>
-              <a:t>github.com</a:t>
-            </a:r>
-            <a:r>
-              <a:rPr lang="en-US" dirty="0"/>
-              <a:t>/</a:t>
-            </a:r>
-            <a:r>
-              <a:rPr lang="en-US" dirty="0" err="1"/>
-              <a:t>dvajs</a:t>
-            </a:r>
-            <a:r>
-              <a:rPr lang="en-US" dirty="0"/>
-              <a:t>/</a:t>
-            </a:r>
-            <a:r>
-              <a:rPr lang="en-US" dirty="0" err="1"/>
-              <a:t>dva</a:t>
-            </a:r>
-            <a:r>
-              <a:rPr lang="en-US" dirty="0"/>
-              <a:t>-cli</a:t>
-            </a:r>
-          </a:p>
-        </p:txBody>
-      </p:sp>
-    </p:spTree>
-    <p:extLst>
-      <p:ext uri="{BB962C8B-B14F-4D97-AF65-F5344CB8AC3E}">
-        <p14:creationId xmlns:p14="http://schemas.microsoft.com/office/powerpoint/2010/main" val="1784386784"/>
-      </p:ext>
-    </p:extLst>
-  </p:cSld>
-  <p:clrMapOvr>
-    <a:masterClrMapping/>
-  </p:clrMapOvr>
-  <p:timing>
-    <p:tnLst>
-      <p:par>
-        <p:cTn id="1" dur="indefinite" restart="never" nodeType="tmRoot"/>
-      </p:par>
-    </p:tnLst>
-  </p:timing>
-</p:sld>
-</file>
-
-<file path=ppt/slides/slide41.xml><?xml version="1.0" encoding="utf-8"?>
-<p:sld xmlns:a="http://schemas.openxmlformats.org/drawingml/2006/main" xmlns:r="http://schemas.openxmlformats.org/officeDocument/2006/relationships" xmlns:p="http://schemas.openxmlformats.org/presentationml/2006/main">
-  <p:cSld>
-    <p:spTree>
-      <p:nvGrpSpPr>
-        <p:cNvPr id="1" name=""/>
-        <p:cNvGrpSpPr/>
-        <p:nvPr/>
-      </p:nvGrpSpPr>
-      <p:grpSpPr>
-        <a:xfrm>
-          <a:off x="0" y="0"/>
-          <a:ext cx="0" cy="0"/>
-          <a:chOff x="0" y="0"/>
-          <a:chExt cx="0" cy="0"/>
-        </a:xfrm>
-      </p:grpSpPr>
-      <p:sp>
-        <p:nvSpPr>
-          <p:cNvPr id="2" name="Title 1"/>
-          <p:cNvSpPr>
-            <a:spLocks noGrp="1"/>
-          </p:cNvSpPr>
-          <p:nvPr>
-            <p:ph type="title"/>
-          </p:nvPr>
-        </p:nvSpPr>
-        <p:spPr/>
-        <p:txBody>
-          <a:bodyPr/>
-          <a:lstStyle/>
-          <a:p>
-            <a:r>
-              <a:rPr lang="zh-CN" altLang="en-US" dirty="0" smtClean="0"/>
-              <a:t>基于</a:t>
-            </a:r>
-            <a:r>
-              <a:rPr lang="en-US" altLang="zh-CN" dirty="0" smtClean="0"/>
-              <a:t>DVA</a:t>
-            </a:r>
-            <a:r>
-              <a:rPr lang="zh-CN" altLang="en-US" dirty="0" smtClean="0"/>
-              <a:t>的项目实例</a:t>
-            </a:r>
-            <a:endParaRPr lang="en-US" dirty="0"/>
-          </a:p>
-        </p:txBody>
-      </p:sp>
-      <p:sp>
-        <p:nvSpPr>
-          <p:cNvPr id="3" name="Text Placeholder 2"/>
-          <p:cNvSpPr>
-            <a:spLocks noGrp="1"/>
-          </p:cNvSpPr>
-          <p:nvPr>
-            <p:ph type="body" idx="1"/>
-          </p:nvPr>
-        </p:nvSpPr>
-        <p:spPr/>
-        <p:txBody>
-          <a:bodyPr/>
-          <a:lstStyle/>
-          <a:p>
-            <a:r>
-              <a:rPr lang="zh-CN" altLang="en-US" dirty="0" smtClean="0"/>
-              <a:t>获取模拟用户</a:t>
-            </a:r>
-            <a:endParaRPr lang="en-US" dirty="0"/>
-          </a:p>
-        </p:txBody>
-      </p:sp>
-    </p:spTree>
-    <p:extLst>
-      <p:ext uri="{BB962C8B-B14F-4D97-AF65-F5344CB8AC3E}">
-        <p14:creationId xmlns:p14="http://schemas.microsoft.com/office/powerpoint/2010/main" val="977823030"/>
-      </p:ext>
-    </p:extLst>
-  </p:cSld>
-  <p:clrMapOvr>
-    <a:masterClrMapping/>
-  </p:clrMapOvr>
-</p:sld>
-</file>
-
 <file path=ppt/slides/slide42.xml><?xml version="1.0" encoding="utf-8"?>
 <p:sld xmlns:a="http://schemas.openxmlformats.org/drawingml/2006/main" xmlns:r="http://schemas.openxmlformats.org/officeDocument/2006/relationships" xmlns:p="http://schemas.openxmlformats.org/presentationml/2006/main">
   <p:cSld>
@@ -14210,11 +14309,7 @@
           <a:p>
             <a:r>
               <a:rPr lang="en-US" dirty="0" err="1" smtClean="0"/>
-              <a:t>Anuglar</a:t>
-            </a:r>
-            <a:r>
-              <a:rPr lang="en-US" dirty="0" smtClean="0"/>
-              <a:t> Tutorial</a:t>
+              <a:t>Dva</a:t>
             </a:r>
             <a:endParaRPr lang="en-US" dirty="0"/>
           </a:p>
@@ -14236,18 +14331,18 @@
           <a:lstStyle/>
           <a:p>
             <a:r>
-              <a:rPr lang="en-US" dirty="0">
-                <a:hlinkClick r:id="rId3"/>
-              </a:rPr>
-              <a:t>https://</a:t>
-            </a:r>
-            <a:r>
-              <a:rPr lang="en-US" dirty="0" smtClean="0">
-                <a:hlinkClick r:id="rId3"/>
-              </a:rPr>
-              <a:t>angular.io/tutorial</a:t>
-            </a:r>
-            <a:endParaRPr lang="en-US" dirty="0" smtClean="0"/>
+              <a:rPr lang="zh-CN" altLang="en-US" dirty="0" smtClean="0"/>
+              <a:t>阿里对</a:t>
+            </a:r>
+            <a:r>
+              <a:rPr lang="en-US" altLang="zh-CN" dirty="0" err="1" smtClean="0"/>
+              <a:t>Redux</a:t>
+            </a:r>
+            <a:r>
+              <a:rPr lang="zh-CN" altLang="en-US" dirty="0" smtClean="0"/>
+              <a:t>的封装</a:t>
+            </a:r>
+            <a:endParaRPr lang="en-US" altLang="zh-CN" dirty="0" smtClean="0"/>
           </a:p>
           <a:p>
             <a:r>
@@ -14256,11 +14351,27 @@
             </a:r>
             <a:r>
               <a:rPr lang="en-US" dirty="0" err="1"/>
-              <a:t>docs.angularjs.org</a:t>
+              <a:t>github.com</a:t>
             </a:r>
             <a:r>
               <a:rPr lang="en-US" dirty="0"/>
-              <a:t>/tutorial</a:t>
+              <a:t>/</a:t>
+            </a:r>
+            <a:r>
+              <a:rPr lang="en-US" dirty="0" err="1"/>
+              <a:t>dvajs</a:t>
+            </a:r>
+            <a:r>
+              <a:rPr lang="en-US" dirty="0"/>
+              <a:t>/</a:t>
+            </a:r>
+            <a:r>
+              <a:rPr lang="en-US" dirty="0" err="1"/>
+              <a:t>dva</a:t>
+            </a:r>
+            <a:r>
+              <a:rPr lang="en-US" dirty="0"/>
+              <a:t>-cli</a:t>
             </a:r>
           </a:p>
         </p:txBody>
@@ -14268,7 +14379,7 @@
     </p:spTree>
     <p:extLst>
       <p:ext uri="{BB962C8B-B14F-4D97-AF65-F5344CB8AC3E}">
-        <p14:creationId xmlns:p14="http://schemas.microsoft.com/office/powerpoint/2010/main" val="2098117636"/>
+        <p14:creationId xmlns:p14="http://schemas.microsoft.com/office/powerpoint/2010/main" val="1784386784"/>
       </p:ext>
     </p:extLst>
   </p:cSld>
@@ -14319,15 +14430,15 @@
           <a:p>
             <a:r>
               <a:rPr lang="zh-CN" altLang="en-US" dirty="0" smtClean="0"/>
-              <a:t>与</a:t>
+              <a:t>基于</a:t>
             </a:r>
             <a:r>
               <a:rPr lang="en-US" altLang="zh-CN" dirty="0" smtClean="0"/>
-              <a:t>React</a:t>
+              <a:t>DVA</a:t>
             </a:r>
             <a:r>
               <a:rPr lang="zh-CN" altLang="en-US" dirty="0" smtClean="0"/>
-              <a:t>的区别</a:t>
+              <a:t>的项目实例</a:t>
             </a:r>
             <a:endParaRPr lang="en-US" dirty="0"/>
           </a:p>
@@ -14343,85 +14454,29 @@
             <p:ph type="body" idx="1"/>
           </p:nvPr>
         </p:nvSpPr>
-        <p:spPr>
-          <a:xfrm>
-            <a:off x="1751011" y="4777381"/>
-            <a:ext cx="8686801" cy="1344450"/>
-          </a:xfrm>
-        </p:spPr>
-        <p:txBody>
-          <a:bodyPr>
-            <a:normAutofit/>
-          </a:bodyPr>
-          <a:lstStyle/>
-          <a:p>
-            <a:pPr marL="457200" indent="-457200">
-              <a:buAutoNum type="arabicPeriod"/>
-            </a:pPr>
+        <p:spPr/>
+        <p:txBody>
+          <a:bodyPr/>
+          <a:lstStyle/>
+          <a:p>
             <a:r>
               <a:rPr lang="zh-CN" altLang="en-US" dirty="0" smtClean="0"/>
-              <a:t>保留</a:t>
-            </a:r>
-            <a:r>
-              <a:rPr lang="en-US" altLang="zh-CN" dirty="0" smtClean="0"/>
-              <a:t>HTML</a:t>
-            </a:r>
-            <a:r>
-              <a:rPr lang="zh-CN" altLang="en-US" dirty="0" smtClean="0"/>
-              <a:t>结构</a:t>
-            </a:r>
-            <a:endParaRPr lang="en-US" altLang="zh-CN" dirty="0" smtClean="0"/>
-          </a:p>
-          <a:p>
-            <a:pPr marL="457200" indent="-457200">
-              <a:buAutoNum type="arabicPeriod"/>
-            </a:pPr>
-            <a:r>
-              <a:rPr lang="en-US" altLang="zh-CN" dirty="0" smtClean="0"/>
-              <a:t>MVVM</a:t>
-            </a:r>
-          </a:p>
-          <a:p>
-            <a:pPr marL="457200" indent="-457200">
-              <a:buAutoNum type="arabicPeriod"/>
-            </a:pPr>
-            <a:r>
-              <a:rPr lang="zh-CN" altLang="en-US" dirty="0" smtClean="0"/>
-              <a:t>大而全，不只是</a:t>
-            </a:r>
-            <a:r>
-              <a:rPr lang="en-US" altLang="zh-CN" dirty="0" smtClean="0"/>
-              <a:t>UI</a:t>
-            </a:r>
-            <a:r>
-              <a:rPr lang="zh-CN" altLang="en-US" dirty="0" smtClean="0"/>
-              <a:t>库，规定好了</a:t>
-            </a:r>
-            <a:r>
-              <a:rPr lang="zh-CN" altLang="en-US" smtClean="0"/>
-              <a:t>最佳开发实践</a:t>
-            </a:r>
-            <a:endParaRPr lang="en-US" altLang="zh-CN" dirty="0" smtClean="0"/>
+              <a:t>获取模拟用户</a:t>
+            </a:r>
+            <a:endParaRPr lang="en-US" dirty="0"/>
           </a:p>
         </p:txBody>
       </p:sp>
     </p:spTree>
     <p:extLst>
       <p:ext uri="{BB962C8B-B14F-4D97-AF65-F5344CB8AC3E}">
-        <p14:creationId xmlns:p14="http://schemas.microsoft.com/office/powerpoint/2010/main" val="137241654"/>
+        <p14:creationId xmlns:p14="http://schemas.microsoft.com/office/powerpoint/2010/main" val="977823030"/>
       </p:ext>
     </p:extLst>
   </p:cSld>
   <p:clrMapOvr>
     <a:masterClrMapping/>
   </p:clrMapOvr>
-  <p:timing>
-    <p:tnLst>
-      <p:par>
-        <p:cTn id="1" dur="indefinite" restart="never" nodeType="tmRoot"/>
-      </p:par>
-    </p:tnLst>
-  </p:timing>
 </p:sld>
 </file>
 
@@ -14458,142 +14513,66 @@
           <a:lstStyle/>
           <a:p>
             <a:r>
-              <a:rPr lang="en-US" altLang="zh-CN" dirty="0" smtClean="0"/>
-              <a:t>Angular JS</a:t>
-            </a:r>
-            <a:endParaRPr lang="en-US" dirty="0"/>
-          </a:p>
-        </p:txBody>
-      </p:sp>
-      <p:sp>
-        <p:nvSpPr>
-          <p:cNvPr id="3" name="Content Placeholder 2"/>
-          <p:cNvSpPr>
-            <a:spLocks noGrp="1"/>
-          </p:cNvSpPr>
-          <p:nvPr>
-            <p:ph idx="1"/>
-          </p:nvPr>
-        </p:nvSpPr>
-        <p:spPr/>
-        <p:txBody>
-          <a:bodyPr/>
-          <a:lstStyle/>
-          <a:p>
+              <a:rPr lang="en-US" dirty="0" err="1" smtClean="0"/>
+              <a:t>Anuglar</a:t>
+            </a:r>
             <a:r>
               <a:rPr lang="en-US" dirty="0" smtClean="0"/>
-              <a:t>Directive </a:t>
-            </a:r>
-            <a:r>
-              <a:rPr lang="zh-CN" altLang="en-US" dirty="0" smtClean="0"/>
-              <a:t>指令</a:t>
-            </a:r>
-            <a:endParaRPr lang="en-US" altLang="zh-CN" dirty="0" smtClean="0"/>
-          </a:p>
-          <a:p>
+              <a:t> Tutorial</a:t>
+            </a:r>
+            <a:endParaRPr lang="en-US" dirty="0"/>
+          </a:p>
+        </p:txBody>
+      </p:sp>
+      <p:sp>
+        <p:nvSpPr>
+          <p:cNvPr id="3" name="Text Placeholder 2"/>
+          <p:cNvSpPr>
+            <a:spLocks noGrp="1"/>
+          </p:cNvSpPr>
+          <p:nvPr>
+            <p:ph type="body" idx="1"/>
+          </p:nvPr>
+        </p:nvSpPr>
+        <p:spPr/>
+        <p:txBody>
+          <a:bodyPr/>
+          <a:lstStyle/>
+          <a:p>
+            <a:r>
+              <a:rPr lang="en-US" dirty="0">
+                <a:hlinkClick r:id="rId3"/>
+              </a:rPr>
+              <a:t>https://</a:t>
+            </a:r>
             <a:r>
               <a:rPr lang="en-US" dirty="0" smtClean="0">
-                <a:effectLst/>
+                <a:hlinkClick r:id="rId3"/>
               </a:rPr>
-              <a:t>Module</a:t>
-            </a:r>
-            <a:r>
-              <a:rPr lang="zh-CN" altLang="en-US" dirty="0" smtClean="0">
-                <a:effectLst/>
-              </a:rPr>
-              <a:t> 模块</a:t>
+              <a:t>angular.io/tutorial</a:t>
             </a:r>
             <a:endParaRPr lang="en-US" dirty="0" smtClean="0"/>
           </a:p>
           <a:p>
             <a:r>
-              <a:rPr lang="en-US" altLang="zh-CN" dirty="0" smtClean="0"/>
-              <a:t>Component</a:t>
-            </a:r>
-            <a:r>
-              <a:rPr lang="zh-CN" altLang="en-US" dirty="0" smtClean="0"/>
-              <a:t> 组件</a:t>
-            </a:r>
-            <a:endParaRPr lang="en-US" dirty="0" smtClean="0"/>
-          </a:p>
-          <a:p>
-            <a:r>
-              <a:rPr lang="en-US" dirty="0" smtClean="0"/>
-              <a:t>Provider(Service, factory)</a:t>
-            </a:r>
-          </a:p>
-          <a:p>
-            <a:r>
-              <a:rPr lang="en-US" dirty="0">
-                <a:effectLst/>
-              </a:rPr>
-              <a:t>Dependency </a:t>
-            </a:r>
-            <a:r>
-              <a:rPr lang="en-US" dirty="0" smtClean="0">
-                <a:effectLst/>
-              </a:rPr>
-              <a:t>Injection </a:t>
-            </a:r>
-            <a:r>
-              <a:rPr lang="zh-CN" altLang="en-US" dirty="0" smtClean="0">
-                <a:effectLst/>
-              </a:rPr>
-              <a:t>依赖注入</a:t>
-            </a:r>
-            <a:endParaRPr lang="en-US" altLang="zh-CN" dirty="0" smtClean="0">
-              <a:effectLst/>
-            </a:endParaRPr>
-          </a:p>
-          <a:p>
-            <a:r>
-              <a:rPr lang="en-US" altLang="zh-CN" dirty="0" smtClean="0">
-                <a:effectLst/>
-              </a:rPr>
-              <a:t>Controller</a:t>
-            </a:r>
-            <a:r>
-              <a:rPr lang="zh-CN" altLang="en-US" dirty="0" smtClean="0">
-                <a:effectLst/>
-              </a:rPr>
-              <a:t> 控制器</a:t>
-            </a:r>
-            <a:endParaRPr lang="en-US" altLang="zh-CN" dirty="0" smtClean="0">
-              <a:effectLst/>
-            </a:endParaRPr>
-          </a:p>
-          <a:p>
-            <a:endParaRPr lang="en-US" dirty="0"/>
-          </a:p>
-        </p:txBody>
-      </p:sp>
-      <p:sp>
-        <p:nvSpPr>
-          <p:cNvPr id="4" name="Text Placeholder 3"/>
-          <p:cNvSpPr>
-            <a:spLocks noGrp="1"/>
-          </p:cNvSpPr>
-          <p:nvPr>
-            <p:ph type="body" sz="half" idx="2"/>
-          </p:nvPr>
-        </p:nvSpPr>
-        <p:spPr/>
-        <p:txBody>
-          <a:bodyPr/>
-          <a:lstStyle/>
-          <a:p>
-            <a:r>
-              <a:rPr lang="zh-CN" altLang="en-US" dirty="0" smtClean="0"/>
-              <a:t>知识简介</a:t>
-            </a:r>
-            <a:endParaRPr lang="en-US" dirty="0"/>
+              <a:rPr lang="en-US" dirty="0"/>
+              <a:t>https://</a:t>
+            </a:r>
+            <a:r>
+              <a:rPr lang="en-US" dirty="0" err="1"/>
+              <a:t>docs.angularjs.org</a:t>
+            </a:r>
+            <a:r>
+              <a:rPr lang="en-US" dirty="0"/>
+              <a:t>/tutorial</a:t>
+            </a:r>
           </a:p>
         </p:txBody>
       </p:sp>
     </p:spTree>
     <p:extLst>
       <p:ext uri="{BB962C8B-B14F-4D97-AF65-F5344CB8AC3E}">
-        <p14:creationId xmlns:p14="http://schemas.microsoft.com/office/powerpoint/2010/main" val="1326356102"/>
+        <p14:creationId xmlns:p14="http://schemas.microsoft.com/office/powerpoint/2010/main" val="2098117636"/>
       </p:ext>
     </p:extLst>
   </p:cSld>
@@ -14643,12 +14622,16 @@
           <a:lstStyle/>
           <a:p>
             <a:r>
-              <a:rPr lang="en-US" altLang="zh-CN" dirty="0" err="1" smtClean="0"/>
-              <a:t>AngularJS</a:t>
-            </a:r>
-            <a:r>
               <a:rPr lang="zh-CN" altLang="en-US" dirty="0" smtClean="0"/>
-              <a:t>项目实战</a:t>
+              <a:t>与</a:t>
+            </a:r>
+            <a:r>
+              <a:rPr lang="en-US" altLang="zh-CN" dirty="0" smtClean="0"/>
+              <a:t>React</a:t>
+            </a:r>
+            <a:r>
+              <a:rPr lang="zh-CN" altLang="en-US" dirty="0" smtClean="0"/>
+              <a:t>的区别</a:t>
             </a:r>
             <a:endParaRPr lang="en-US" dirty="0"/>
           </a:p>
@@ -14664,27 +14647,72 @@
             <p:ph type="body" idx="1"/>
           </p:nvPr>
         </p:nvSpPr>
-        <p:spPr/>
-        <p:txBody>
-          <a:bodyPr/>
-          <a:lstStyle/>
-          <a:p>
-            <a:r>
-              <a:rPr lang="en-US" altLang="zh-CN" dirty="0" err="1" smtClean="0"/>
-              <a:t>Todo</a:t>
+        <p:spPr>
+          <a:xfrm>
+            <a:off x="1751011" y="4777381"/>
+            <a:ext cx="8686801" cy="1344450"/>
+          </a:xfrm>
+        </p:spPr>
+        <p:txBody>
+          <a:bodyPr>
+            <a:normAutofit/>
+          </a:bodyPr>
+          <a:lstStyle/>
+          <a:p>
+            <a:pPr marL="457200" indent="-457200">
+              <a:buAutoNum type="arabicPeriod"/>
+            </a:pPr>
+            <a:r>
+              <a:rPr lang="zh-CN" altLang="en-US" dirty="0" smtClean="0"/>
+              <a:t>保留</a:t>
             </a:r>
             <a:r>
               <a:rPr lang="en-US" altLang="zh-CN" dirty="0" smtClean="0"/>
-              <a:t> List</a:t>
-            </a:r>
-            <a:endParaRPr lang="en-US" dirty="0"/>
+              <a:t>HTML</a:t>
+            </a:r>
+            <a:r>
+              <a:rPr lang="zh-CN" altLang="en-US" dirty="0" smtClean="0"/>
+              <a:t>结构</a:t>
+            </a:r>
+            <a:endParaRPr lang="en-US" altLang="zh-CN" dirty="0" smtClean="0"/>
+          </a:p>
+          <a:p>
+            <a:pPr marL="457200" indent="-457200">
+              <a:buAutoNum type="arabicPeriod"/>
+            </a:pPr>
+            <a:r>
+              <a:rPr lang="en-US" altLang="zh-CN" dirty="0" smtClean="0"/>
+              <a:t>MVVM</a:t>
+            </a:r>
+          </a:p>
+          <a:p>
+            <a:pPr marL="457200" indent="-457200">
+              <a:buAutoNum type="arabicPeriod"/>
+            </a:pPr>
+            <a:r>
+              <a:rPr lang="zh-CN" altLang="en-US" dirty="0" smtClean="0"/>
+              <a:t>大而全，不只是</a:t>
+            </a:r>
+            <a:r>
+              <a:rPr lang="en-US" altLang="zh-CN" dirty="0" smtClean="0"/>
+              <a:t>UI</a:t>
+            </a:r>
+            <a:r>
+              <a:rPr lang="zh-CN" altLang="en-US" dirty="0" smtClean="0"/>
+              <a:t>库，规定好了</a:t>
+            </a:r>
+            <a:r>
+              <a:rPr lang="zh-CN" altLang="en-US" smtClean="0"/>
+              <a:t>最佳开发实践</a:t>
+            </a:r>
+            <a:endParaRPr lang="en-US" altLang="zh-CN" dirty="0" smtClean="0"/>
           </a:p>
         </p:txBody>
       </p:sp>
     </p:spTree>
     <p:extLst>
       <p:ext uri="{BB962C8B-B14F-4D97-AF65-F5344CB8AC3E}">
-        <p14:creationId xmlns:p14="http://schemas.microsoft.com/office/powerpoint/2010/main" val="1639088771"/>
+        <p14:creationId xmlns:p14="http://schemas.microsoft.com/office/powerpoint/2010/main" val="137241654"/>
       </p:ext>
     </p:extLst>
   </p:cSld>
@@ -14735,71 +14763,141 @@
           <a:p>
             <a:r>
               <a:rPr lang="en-US" altLang="zh-CN" dirty="0" smtClean="0"/>
-              <a:t>Angular </a:t>
+              <a:t>Angular JS</a:t>
+            </a:r>
+            <a:endParaRPr lang="en-US" dirty="0"/>
+          </a:p>
+        </p:txBody>
+      </p:sp>
+      <p:sp>
+        <p:nvSpPr>
+          <p:cNvPr id="3" name="Content Placeholder 2"/>
+          <p:cNvSpPr>
+            <a:spLocks noGrp="1"/>
+          </p:cNvSpPr>
+          <p:nvPr>
+            <p:ph idx="1"/>
+          </p:nvPr>
+        </p:nvSpPr>
+        <p:spPr/>
+        <p:txBody>
+          <a:bodyPr/>
+          <a:lstStyle/>
+          <a:p>
+            <a:r>
+              <a:rPr lang="en-US" dirty="0" smtClean="0"/>
+              <a:t>Directive </a:t>
             </a:r>
             <a:r>
               <a:rPr lang="zh-CN" altLang="en-US" dirty="0" smtClean="0"/>
-              <a:t>脚手架项目</a:t>
-            </a:r>
-            <a:endParaRPr lang="en-US" dirty="0"/>
-          </a:p>
-        </p:txBody>
-      </p:sp>
-      <p:sp>
-        <p:nvSpPr>
-          <p:cNvPr id="3" name="Content Placeholder 2"/>
-          <p:cNvSpPr>
-            <a:spLocks noGrp="1"/>
-          </p:cNvSpPr>
-          <p:nvPr>
-            <p:ph idx="1"/>
-          </p:nvPr>
-        </p:nvSpPr>
-        <p:spPr/>
-        <p:txBody>
-          <a:bodyPr/>
-          <a:lstStyle/>
-          <a:p>
-            <a:r>
-              <a:rPr lang="en-US" dirty="0"/>
-              <a:t>Yeoman: </a:t>
-            </a:r>
+              <a:t>指令</a:t>
+            </a:r>
+            <a:endParaRPr lang="en-US" altLang="zh-CN" dirty="0" smtClean="0"/>
+          </a:p>
+          <a:p>
+            <a:r>
+              <a:rPr lang="en-US" dirty="0" smtClean="0">
+                <a:effectLst/>
+              </a:rPr>
+              <a:t>Module</a:t>
+            </a:r>
+            <a:r>
+              <a:rPr lang="zh-CN" altLang="en-US" dirty="0" smtClean="0">
+                <a:effectLst/>
+              </a:rPr>
+              <a:t> 模块</a:t>
+            </a:r>
+            <a:endParaRPr lang="en-US" dirty="0" smtClean="0"/>
+          </a:p>
+          <a:p>
+            <a:r>
+              <a:rPr lang="en-US" altLang="zh-CN" dirty="0" smtClean="0"/>
+              <a:t>Component</a:t>
+            </a:r>
+            <a:r>
+              <a:rPr lang="zh-CN" altLang="en-US" dirty="0" smtClean="0"/>
+              <a:t> 组件</a:t>
+            </a:r>
+            <a:endParaRPr lang="en-US" dirty="0" smtClean="0"/>
+          </a:p>
+          <a:p>
+            <a:r>
+              <a:rPr lang="en-US" dirty="0" smtClean="0"/>
+              <a:t>Provider(Service, factory)</a:t>
+            </a:r>
+          </a:p>
+          <a:p>
             <a:r>
               <a:rPr lang="en-US" dirty="0">
-                <a:hlinkClick r:id="rId3"/>
+                <a:effectLst/>
               </a:rPr>
-              <a:t>https://</a:t>
+              <a:t>Dependency </a:t>
             </a:r>
             <a:r>
               <a:rPr lang="en-US" dirty="0" smtClean="0">
-                <a:hlinkClick r:id="rId3"/>
+                <a:effectLst/>
               </a:rPr>
-              <a:t>github.com/Swiip/generator-gulp-angular</a:t>
-            </a:r>
-            <a:endParaRPr lang="en-US" dirty="0" smtClean="0"/>
-          </a:p>
-          <a:p>
-            <a:r>
-              <a:rPr lang="en-US" dirty="0" smtClean="0"/>
-              <a:t>Gulp serve</a:t>
-            </a:r>
-          </a:p>
-          <a:p>
-            <a:r>
-              <a:rPr lang="en-US" dirty="0" err="1" smtClean="0"/>
-              <a:t>Anuglar</a:t>
-            </a:r>
-            <a:r>
-              <a:rPr lang="en-US" dirty="0" smtClean="0"/>
-              <a:t> Material</a:t>
-            </a:r>
+              <a:t>Injection </a:t>
+            </a:r>
+            <a:r>
+              <a:rPr lang="zh-CN" altLang="en-US" dirty="0" smtClean="0">
+                <a:effectLst/>
+              </a:rPr>
+              <a:t>依赖注入</a:t>
+            </a:r>
+            <a:endParaRPr lang="en-US" altLang="zh-CN" dirty="0" smtClean="0">
+              <a:effectLst/>
+            </a:endParaRPr>
+          </a:p>
+          <a:p>
+            <a:r>
+              <a:rPr lang="en-US" altLang="zh-CN" dirty="0" smtClean="0">
+                <a:effectLst/>
+              </a:rPr>
+              <a:t>Controller</a:t>
+            </a:r>
+            <a:r>
+              <a:rPr lang="zh-CN" altLang="en-US" dirty="0" smtClean="0">
+                <a:effectLst/>
+              </a:rPr>
+              <a:t> 控制器</a:t>
+            </a:r>
+            <a:endParaRPr lang="en-US" altLang="zh-CN" dirty="0" smtClean="0">
+              <a:effectLst/>
+            </a:endParaRPr>
+          </a:p>
+          <a:p>
+            <a:endParaRPr lang="en-US" dirty="0"/>
+          </a:p>
+        </p:txBody>
+      </p:sp>
+      <p:sp>
+        <p:nvSpPr>
+          <p:cNvPr id="4" name="Text Placeholder 3"/>
+          <p:cNvSpPr>
+            <a:spLocks noGrp="1"/>
+          </p:cNvSpPr>
+          <p:nvPr>
+            <p:ph type="body" sz="half" idx="2"/>
+          </p:nvPr>
+        </p:nvSpPr>
+        <p:spPr/>
+        <p:txBody>
+          <a:bodyPr/>
+          <a:lstStyle/>
+          <a:p>
+            <a:r>
+              <a:rPr lang="zh-CN" altLang="en-US" dirty="0" smtClean="0"/>
+              <a:t>知识简介</a:t>
+            </a:r>
+            <a:endParaRPr lang="en-US" dirty="0"/>
           </a:p>
         </p:txBody>
       </p:sp>
     </p:spTree>
     <p:extLst>
       <p:ext uri="{BB962C8B-B14F-4D97-AF65-F5344CB8AC3E}">
-        <p14:creationId xmlns:p14="http://schemas.microsoft.com/office/powerpoint/2010/main" val="1446031074"/>
+        <p14:creationId xmlns:p14="http://schemas.microsoft.com/office/powerpoint/2010/main" val="1326356102"/>
       </p:ext>
     </p:extLst>
   </p:cSld>
@@ -14849,97 +14947,40 @@
           <a:lstStyle/>
           <a:p>
             <a:r>
-              <a:rPr lang="en-US" dirty="0" smtClean="0"/>
-              <a:t>Angular 6</a:t>
-            </a:r>
-            <a:endParaRPr lang="en-US" dirty="0"/>
-          </a:p>
-        </p:txBody>
-      </p:sp>
-      <p:sp>
-        <p:nvSpPr>
-          <p:cNvPr id="3" name="Content Placeholder 2"/>
-          <p:cNvSpPr>
-            <a:spLocks noGrp="1"/>
-          </p:cNvSpPr>
-          <p:nvPr>
-            <p:ph idx="1"/>
-          </p:nvPr>
-        </p:nvSpPr>
-        <p:spPr/>
-        <p:txBody>
-          <a:bodyPr/>
-          <a:lstStyle/>
-          <a:p>
-            <a:r>
-              <a:rPr lang="en-US" dirty="0" smtClean="0"/>
-              <a:t>1. Typescript</a:t>
-            </a:r>
-          </a:p>
-          <a:p>
-            <a:r>
-              <a:rPr lang="en-US" dirty="0" smtClean="0"/>
-              <a:t>2. </a:t>
-            </a:r>
-            <a:r>
-              <a:rPr lang="zh-CN" altLang="en-US" dirty="0" smtClean="0"/>
-              <a:t>其实与</a:t>
-            </a:r>
-            <a:r>
               <a:rPr lang="en-US" altLang="zh-CN" dirty="0" err="1" smtClean="0"/>
               <a:t>AngularJS</a:t>
             </a:r>
             <a:r>
               <a:rPr lang="zh-CN" altLang="en-US" dirty="0" smtClean="0"/>
-              <a:t>比较相似</a:t>
-            </a:r>
-            <a:endParaRPr lang="en-US" altLang="zh-CN" dirty="0" smtClean="0"/>
-          </a:p>
-          <a:p>
+              <a:t>项目实战</a:t>
+            </a:r>
+            <a:endParaRPr lang="en-US" dirty="0"/>
+          </a:p>
+        </p:txBody>
+      </p:sp>
+      <p:sp>
+        <p:nvSpPr>
+          <p:cNvPr id="3" name="Text Placeholder 2"/>
+          <p:cNvSpPr>
+            <a:spLocks noGrp="1"/>
+          </p:cNvSpPr>
+          <p:nvPr>
+            <p:ph type="body" idx="1"/>
+          </p:nvPr>
+        </p:nvSpPr>
+        <p:spPr/>
+        <p:txBody>
+          <a:bodyPr/>
+          <a:lstStyle/>
+          <a:p>
+            <a:r>
+              <a:rPr lang="en-US" altLang="zh-CN" dirty="0" err="1" smtClean="0"/>
+              <a:t>Todo</a:t>
+            </a:r>
             <a:r>
               <a:rPr lang="en-US" altLang="zh-CN" dirty="0" smtClean="0"/>
-              <a:t>3.</a:t>
-            </a:r>
-            <a:r>
-              <a:rPr lang="zh-CN" altLang="en-US" dirty="0" smtClean="0"/>
-              <a:t> 完整的</a:t>
-            </a:r>
-            <a:r>
-              <a:rPr lang="en-US" altLang="zh-CN" dirty="0" err="1" smtClean="0"/>
-              <a:t>Cli</a:t>
-            </a:r>
-            <a:r>
-              <a:rPr lang="zh-CN" altLang="en-US" dirty="0" smtClean="0"/>
-              <a:t>系统</a:t>
-            </a:r>
-            <a:endParaRPr lang="en-US" altLang="zh-CN" dirty="0" smtClean="0"/>
-          </a:p>
-          <a:p>
-            <a:r>
-              <a:rPr lang="en-US" dirty="0" smtClean="0"/>
-              <a:t>4. observables, </a:t>
-            </a:r>
-            <a:r>
-              <a:rPr lang="en-US" dirty="0" err="1" smtClean="0"/>
-              <a:t>RxJS</a:t>
-            </a:r>
-            <a:r>
-              <a:rPr lang="en-US" dirty="0" smtClean="0"/>
-              <a:t> (Reactive </a:t>
-            </a:r>
-            <a:r>
-              <a:rPr lang="en-US" dirty="0">
-                <a:effectLst/>
-              </a:rPr>
-              <a:t>Extensions</a:t>
-            </a:r>
-            <a:r>
-              <a:rPr lang="en-US" dirty="0" smtClean="0"/>
-              <a:t>)</a:t>
-            </a:r>
-            <a:endParaRPr lang="en-US" dirty="0"/>
-          </a:p>
-          <a:p>
+              <a:t> List</a:t>
+            </a:r>
             <a:endParaRPr lang="en-US" dirty="0"/>
           </a:p>
         </p:txBody>
@@ -14947,7 +14988,7 @@
     </p:spTree>
     <p:extLst>
       <p:ext uri="{BB962C8B-B14F-4D97-AF65-F5344CB8AC3E}">
-        <p14:creationId xmlns:p14="http://schemas.microsoft.com/office/powerpoint/2010/main" val="1418923925"/>
+        <p14:creationId xmlns:p14="http://schemas.microsoft.com/office/powerpoint/2010/main" val="1639088771"/>
       </p:ext>
     </p:extLst>
   </p:cSld>
@@ -14998,7 +15039,11 @@
           <a:p>
             <a:r>
               <a:rPr lang="en-US" altLang="zh-CN" dirty="0" smtClean="0"/>
-              <a:t>Observable</a:t>
+              <a:t>Angular </a:t>
+            </a:r>
+            <a:r>
+              <a:rPr lang="zh-CN" altLang="en-US" dirty="0" smtClean="0"/>
+              <a:t>脚手架项目</a:t>
             </a:r>
             <a:endParaRPr lang="en-US" dirty="0"/>
           </a:p>
@@ -15020,70 +15065,45 @@
           <a:lstStyle/>
           <a:p>
             <a:r>
+              <a:rPr lang="en-US" dirty="0"/>
+              <a:t>Yeoman: </a:t>
+            </a:r>
+            <a:r>
+              <a:rPr lang="en-US" dirty="0">
+                <a:hlinkClick r:id="rId3"/>
+              </a:rPr>
+              <a:t>https://</a:t>
+            </a:r>
+            <a:r>
+              <a:rPr lang="en-US" dirty="0" smtClean="0">
+                <a:hlinkClick r:id="rId3"/>
+              </a:rPr>
+              <a:t>github.com/Swiip/generator-gulp-angular</a:t>
+            </a:r>
+            <a:endParaRPr lang="en-US" dirty="0" smtClean="0"/>
+          </a:p>
+          <a:p>
+            <a:r>
               <a:rPr lang="en-US" dirty="0" smtClean="0"/>
-              <a:t>1. </a:t>
-            </a:r>
-            <a:r>
-              <a:rPr lang="zh-CN" altLang="en-US" dirty="0" smtClean="0"/>
-              <a:t>支持多个变量</a:t>
-            </a:r>
-            <a:endParaRPr lang="en-US" altLang="zh-CN" dirty="0" smtClean="0"/>
-          </a:p>
-          <a:p>
-            <a:r>
-              <a:rPr lang="en-US" altLang="zh-CN" dirty="0" smtClean="0"/>
-              <a:t>2.</a:t>
-            </a:r>
-            <a:r>
-              <a:rPr lang="zh-CN" altLang="en-US" dirty="0" smtClean="0"/>
-              <a:t> </a:t>
-            </a:r>
-            <a:r>
-              <a:rPr lang="en-US" altLang="zh-CN" dirty="0" smtClean="0"/>
-              <a:t>cancel</a:t>
-            </a:r>
-            <a:r>
-              <a:rPr lang="zh-CN" altLang="en-US" dirty="0" smtClean="0"/>
-              <a:t>掉一个</a:t>
-            </a:r>
-            <a:r>
-              <a:rPr lang="en-US" altLang="zh-CN" dirty="0" smtClean="0"/>
-              <a:t>observable</a:t>
-            </a:r>
-          </a:p>
-          <a:p>
-            <a:r>
-              <a:rPr lang="en-US" altLang="zh-CN" dirty="0" smtClean="0"/>
-              <a:t>3.</a:t>
-            </a:r>
-            <a:r>
-              <a:rPr lang="zh-CN" altLang="en-US" dirty="0" smtClean="0"/>
-              <a:t> </a:t>
-            </a:r>
-            <a:r>
-              <a:rPr lang="en-US" altLang="zh-CN" dirty="0" smtClean="0"/>
-              <a:t>promise-&gt; then</a:t>
-            </a:r>
-            <a:r>
-              <a:rPr lang="zh-CN" altLang="en-US" dirty="0" smtClean="0"/>
-              <a:t> </a:t>
-            </a:r>
-            <a:r>
-              <a:rPr lang="en-US" altLang="zh-CN" dirty="0" smtClean="0"/>
-              <a:t>  observable -&gt; subscribe</a:t>
+              <a:t>Gulp serve</a:t>
+            </a:r>
+          </a:p>
+          <a:p>
+            <a:r>
+              <a:rPr lang="en-US" dirty="0" err="1" smtClean="0"/>
+              <a:t>Anuglar</a:t>
             </a:r>
             <a:r>
               <a:rPr lang="en-US" dirty="0" smtClean="0"/>
-              <a:t> </a:t>
-            </a:r>
-            <a:endParaRPr lang="en-US" dirty="0"/>
+              <a:t> Material</a:t>
+            </a:r>
           </a:p>
         </p:txBody>
       </p:sp>
     </p:spTree>
     <p:extLst>
       <p:ext uri="{BB962C8B-B14F-4D97-AF65-F5344CB8AC3E}">
-        <p14:creationId xmlns:p14="http://schemas.microsoft.com/office/powerpoint/2010/main" val="1029556927"/>
+        <p14:creationId xmlns:p14="http://schemas.microsoft.com/office/powerpoint/2010/main" val="1446031074"/>
       </p:ext>
     </p:extLst>
   </p:cSld>
@@ -15133,193 +15153,95 @@
           <a:lstStyle/>
           <a:p>
             <a:r>
+              <a:rPr lang="en-US" dirty="0" smtClean="0"/>
+              <a:t>Angular 6</a:t>
+            </a:r>
+            <a:endParaRPr lang="en-US" dirty="0"/>
+          </a:p>
+        </p:txBody>
+      </p:sp>
+      <p:sp>
+        <p:nvSpPr>
+          <p:cNvPr id="3" name="Content Placeholder 2"/>
+          <p:cNvSpPr>
+            <a:spLocks noGrp="1"/>
+          </p:cNvSpPr>
+          <p:nvPr>
+            <p:ph idx="1"/>
+          </p:nvPr>
+        </p:nvSpPr>
+        <p:spPr/>
+        <p:txBody>
+          <a:bodyPr/>
+          <a:lstStyle/>
+          <a:p>
+            <a:r>
+              <a:rPr lang="en-US" dirty="0" smtClean="0"/>
+              <a:t>1. Typescript</a:t>
+            </a:r>
+          </a:p>
+          <a:p>
+            <a:r>
+              <a:rPr lang="en-US" dirty="0" smtClean="0"/>
+              <a:t>2. </a:t>
+            </a:r>
+            <a:r>
+              <a:rPr lang="zh-CN" altLang="en-US" dirty="0" smtClean="0"/>
+              <a:t>其实与</a:t>
+            </a:r>
+            <a:r>
+              <a:rPr lang="en-US" altLang="zh-CN" dirty="0" err="1" smtClean="0"/>
+              <a:t>AngularJS</a:t>
+            </a:r>
+            <a:r>
+              <a:rPr lang="zh-CN" altLang="en-US" dirty="0" smtClean="0"/>
+              <a:t>比较相似</a:t>
+            </a:r>
+            <a:endParaRPr lang="en-US" altLang="zh-CN" dirty="0" smtClean="0"/>
+          </a:p>
+          <a:p>
+            <a:r>
               <a:rPr lang="en-US" altLang="zh-CN" dirty="0" smtClean="0"/>
-              <a:t>Angular</a:t>
+              <a:t>3.</a:t>
             </a:r>
             <a:r>
               <a:rPr lang="zh-CN" altLang="en-US" dirty="0" smtClean="0"/>
-              <a:t> 指令</a:t>
-            </a:r>
-            <a:endParaRPr lang="en-US" dirty="0"/>
-          </a:p>
-        </p:txBody>
-      </p:sp>
-      <p:sp>
-        <p:nvSpPr>
-          <p:cNvPr id="3" name="Content Placeholder 2"/>
-          <p:cNvSpPr>
-            <a:spLocks noGrp="1"/>
-          </p:cNvSpPr>
-          <p:nvPr>
-            <p:ph idx="1"/>
-          </p:nvPr>
-        </p:nvSpPr>
-        <p:spPr/>
-        <p:txBody>
-          <a:bodyPr/>
-          <a:lstStyle/>
-          <a:p>
-            <a:r>
-              <a:rPr lang="zh-CN" altLang="en-US" dirty="0">
+              <a:t> 完整的</a:t>
+            </a:r>
+            <a:r>
+              <a:rPr lang="en-US" altLang="zh-CN" dirty="0" err="1" smtClean="0"/>
+              <a:t>Cli</a:t>
+            </a:r>
+            <a:r>
+              <a:rPr lang="zh-CN" altLang="en-US" dirty="0" smtClean="0"/>
+              <a:t>系统</a:t>
+            </a:r>
+            <a:endParaRPr lang="en-US" altLang="zh-CN" dirty="0" smtClean="0"/>
+          </a:p>
+          <a:p>
+            <a:r>
+              <a:rPr lang="en-US" dirty="0" smtClean="0"/>
+              <a:t>4. observables, </a:t>
+            </a:r>
+            <a:r>
+              <a:rPr lang="en-US" dirty="0" err="1" smtClean="0"/>
+              <a:t>RxJS</a:t>
+            </a:r>
+            <a:r>
+              <a:rPr lang="en-US" dirty="0" smtClean="0"/>
+              <a:t> (Reactive </a:t>
+            </a:r>
+            <a:r>
+              <a:rPr lang="en-US" dirty="0">
                 <a:effectLst/>
               </a:rPr>
-              <a:t>组件 </a:t>
-            </a:r>
-            <a:r>
-              <a:rPr lang="en-US" altLang="zh-CN" dirty="0">
-                <a:effectLst/>
-              </a:rPr>
-              <a:t>- </a:t>
-            </a:r>
-            <a:r>
-              <a:rPr lang="zh-CN" altLang="en-US" dirty="0">
-                <a:effectLst/>
-              </a:rPr>
-              <a:t>带有模板的指令</a:t>
-            </a:r>
-            <a:r>
-              <a:rPr lang="en-US" altLang="zh-CN" dirty="0">
-                <a:effectLst/>
-              </a:rPr>
-              <a:t>(</a:t>
-            </a:r>
-            <a:r>
-              <a:rPr lang="zh-CN" altLang="en-US" dirty="0">
-                <a:effectLst/>
-              </a:rPr>
-              <a:t>组件皆指令</a:t>
-            </a:r>
-            <a:r>
-              <a:rPr lang="en-US" altLang="zh-CN" dirty="0">
-                <a:effectLst/>
-              </a:rPr>
+              <a:t>Extensions</a:t>
+            </a:r>
+            <a:r>
+              <a:rPr lang="en-US" dirty="0" smtClean="0"/>
               <a:t>)</a:t>
             </a:r>
-          </a:p>
-          <a:p>
-            <a:r>
-              <a:rPr lang="zh-CN" altLang="en-US" dirty="0">
-                <a:effectLst/>
-              </a:rPr>
-              <a:t>结构型指令 </a:t>
-            </a:r>
-            <a:r>
-              <a:rPr lang="en-US" altLang="zh-CN" dirty="0">
-                <a:effectLst/>
-              </a:rPr>
-              <a:t>- </a:t>
-            </a:r>
-            <a:r>
-              <a:rPr lang="zh-CN" altLang="en-US" dirty="0">
-                <a:effectLst/>
-              </a:rPr>
-              <a:t>作用于</a:t>
-            </a:r>
-            <a:r>
-              <a:rPr lang="en-US" altLang="zh-CN" dirty="0">
-                <a:effectLst/>
-              </a:rPr>
-              <a:t>DOM</a:t>
-            </a:r>
-            <a:r>
-              <a:rPr lang="zh-CN" altLang="en-US" dirty="0">
-                <a:effectLst/>
-              </a:rPr>
-              <a:t>元素修改视图结构的指令</a:t>
-            </a:r>
-            <a:r>
-              <a:rPr lang="en-US" altLang="zh-CN" dirty="0">
-                <a:effectLst/>
-              </a:rPr>
-              <a:t>(</a:t>
-            </a:r>
-            <a:r>
-              <a:rPr lang="en-US" altLang="zh-CN" dirty="0" err="1">
-                <a:effectLst/>
-              </a:rPr>
-              <a:t>NgIf</a:t>
-            </a:r>
-            <a:r>
-              <a:rPr lang="zh-CN" altLang="en-US" dirty="0">
-                <a:effectLst/>
-              </a:rPr>
-              <a:t>、</a:t>
-            </a:r>
-            <a:r>
-              <a:rPr lang="en-US" altLang="zh-CN" dirty="0" err="1">
-                <a:effectLst/>
-              </a:rPr>
-              <a:t>NgFor</a:t>
-            </a:r>
-            <a:r>
-              <a:rPr lang="zh-CN" altLang="en-US" dirty="0">
-                <a:effectLst/>
-              </a:rPr>
-              <a:t>等</a:t>
-            </a:r>
-            <a:r>
-              <a:rPr lang="en-US" altLang="zh-CN" dirty="0">
-                <a:effectLst/>
-              </a:rPr>
-              <a:t>)</a:t>
-            </a:r>
-          </a:p>
-          <a:p>
-            <a:r>
-              <a:rPr lang="zh-CN" altLang="en-US" dirty="0">
-                <a:effectLst/>
-              </a:rPr>
-              <a:t>属性型指令 </a:t>
-            </a:r>
-            <a:r>
-              <a:rPr lang="en-US" altLang="zh-CN" dirty="0">
-                <a:effectLst/>
-              </a:rPr>
-              <a:t>- </a:t>
-            </a:r>
-            <a:r>
-              <a:rPr lang="zh-CN" altLang="en-US" dirty="0">
-                <a:effectLst/>
-              </a:rPr>
-              <a:t>作用于</a:t>
-            </a:r>
-            <a:r>
-              <a:rPr lang="en-US" altLang="zh-CN" dirty="0">
-                <a:effectLst/>
-              </a:rPr>
-              <a:t>DOM</a:t>
-            </a:r>
-            <a:r>
-              <a:rPr lang="zh-CN" altLang="en-US" dirty="0">
-                <a:effectLst/>
-              </a:rPr>
-              <a:t>元素的外观和行为的指令</a:t>
-            </a:r>
-            <a:r>
-              <a:rPr lang="en-US" altLang="zh-CN" dirty="0">
-                <a:effectLst/>
-              </a:rPr>
-              <a:t>(</a:t>
-            </a:r>
-            <a:r>
-              <a:rPr lang="en-US" altLang="zh-CN" dirty="0" err="1"/>
-              <a:t>NgStyle</a:t>
-            </a:r>
-            <a:r>
-              <a:rPr lang="zh-CN" altLang="en-US" dirty="0">
-                <a:effectLst/>
-              </a:rPr>
-              <a:t>等</a:t>
-            </a:r>
-            <a:r>
-              <a:rPr lang="en-US" altLang="zh-CN" dirty="0">
-                <a:effectLst/>
-              </a:rPr>
-              <a:t>)</a:t>
-            </a:r>
-            <a:endParaRPr lang="zh-CN" altLang="en-US" dirty="0">
-              <a:effectLst/>
-            </a:endParaRPr>
+            <a:endParaRPr lang="en-US" dirty="0"/>
           </a:p>
           <a:p>
             <a:endParaRPr lang="en-US" dirty="0"/>
@@ -15329,7 +15251,7 @@
     </p:spTree>
     <p:extLst>
       <p:ext uri="{BB962C8B-B14F-4D97-AF65-F5344CB8AC3E}">
-        <p14:creationId xmlns:p14="http://schemas.microsoft.com/office/powerpoint/2010/main" val="366916453"/>
+        <p14:creationId xmlns:p14="http://schemas.microsoft.com/office/powerpoint/2010/main" val="1418923925"/>
       </p:ext>
     </p:extLst>
   </p:cSld>
@@ -15545,159 +15467,84 @@
           <a:lstStyle/>
           <a:p>
             <a:r>
+              <a:rPr lang="en-US" altLang="zh-CN" dirty="0" smtClean="0"/>
+              <a:t>Observable</a:t>
+            </a:r>
+            <a:endParaRPr lang="en-US" dirty="0"/>
+          </a:p>
+        </p:txBody>
+      </p:sp>
+      <p:sp>
+        <p:nvSpPr>
+          <p:cNvPr id="3" name="Content Placeholder 2"/>
+          <p:cNvSpPr>
+            <a:spLocks noGrp="1"/>
+          </p:cNvSpPr>
+          <p:nvPr>
+            <p:ph idx="1"/>
+          </p:nvPr>
+        </p:nvSpPr>
+        <p:spPr/>
+        <p:txBody>
+          <a:bodyPr/>
+          <a:lstStyle/>
+          <a:p>
+            <a:r>
               <a:rPr lang="en-US" dirty="0" smtClean="0"/>
-              <a:t>Angular 2+ HTML </a:t>
+              <a:t>1. </a:t>
             </a:r>
             <a:r>
               <a:rPr lang="zh-CN" altLang="en-US" dirty="0" smtClean="0"/>
-              <a:t>模版语法</a:t>
-            </a:r>
-            <a:endParaRPr lang="en-US" dirty="0"/>
-          </a:p>
-        </p:txBody>
-      </p:sp>
-      <p:sp>
-        <p:nvSpPr>
-          <p:cNvPr id="3" name="Content Placeholder 2"/>
-          <p:cNvSpPr>
-            <a:spLocks noGrp="1"/>
-          </p:cNvSpPr>
-          <p:nvPr>
-            <p:ph idx="1"/>
-          </p:nvPr>
-        </p:nvSpPr>
-        <p:spPr/>
-        <p:txBody>
-          <a:bodyPr/>
-          <a:lstStyle/>
-          <a:p>
-            <a:r>
-              <a:rPr lang="en-US" dirty="0">
-                <a:effectLst/>
-              </a:rPr>
-              <a:t>[prop]="</a:t>
-            </a:r>
-            <a:r>
-              <a:rPr lang="en-US" dirty="0" smtClean="0">
-                <a:effectLst/>
-              </a:rPr>
-              <a:t>value”</a:t>
-            </a:r>
-            <a:endParaRPr lang="en-US" dirty="0">
-              <a:effectLst/>
-            </a:endParaRPr>
-          </a:p>
-          <a:p>
-            <a:r>
-              <a:rPr lang="en-US" dirty="0">
-                <a:effectLst/>
-              </a:rPr>
-              <a:t>prop="{{value</a:t>
-            </a:r>
-            <a:r>
-              <a:rPr lang="en-US" dirty="0" smtClean="0">
-                <a:effectLst/>
-              </a:rPr>
-              <a:t>}}”</a:t>
-            </a:r>
-          </a:p>
-          <a:p>
-            <a:r>
-              <a:rPr lang="en-US" dirty="0">
-                <a:effectLst/>
-              </a:rPr>
-              <a:t>(event)="</a:t>
-            </a:r>
-            <a:r>
-              <a:rPr lang="en-US" dirty="0" smtClean="0">
-                <a:effectLst/>
-              </a:rPr>
-              <a:t>expr”</a:t>
-            </a:r>
-          </a:p>
-          <a:p>
-            <a:r>
-              <a:rPr lang="en-US" dirty="0">
-                <a:effectLst/>
-              </a:rPr>
-              <a:t>#</a:t>
-            </a:r>
-            <a:r>
-              <a:rPr lang="en-US" dirty="0" err="1" smtClean="0">
-                <a:effectLst/>
-              </a:rPr>
-              <a:t>var</a:t>
-            </a:r>
-            <a:endParaRPr lang="en-US" dirty="0" smtClean="0">
-              <a:effectLst/>
-            </a:endParaRPr>
-          </a:p>
-          <a:p>
-            <a:r>
-              <a:rPr lang="en-US" dirty="0"/>
-              <a:t>bind-</a:t>
-            </a:r>
-            <a:r>
-              <a:rPr lang="en-US" dirty="0">
-                <a:effectLst/>
-              </a:rPr>
-              <a:t> for </a:t>
-            </a:r>
-            <a:r>
-              <a:rPr lang="en-US" dirty="0"/>
-              <a:t>[]</a:t>
-            </a:r>
-            <a:r>
-              <a:rPr lang="en-US" dirty="0">
-                <a:effectLst/>
-              </a:rPr>
-              <a:t> and </a:t>
-            </a:r>
-            <a:r>
-              <a:rPr lang="en-US" dirty="0"/>
-              <a:t>on-</a:t>
-            </a:r>
-            <a:r>
-              <a:rPr lang="en-US" dirty="0">
-                <a:effectLst/>
-              </a:rPr>
-              <a:t> for </a:t>
-            </a:r>
-            <a:r>
-              <a:rPr lang="en-US" dirty="0"/>
-              <a:t>()</a:t>
-            </a:r>
-            <a:r>
-              <a:rPr lang="en-US" dirty="0">
-                <a:effectLst/>
-              </a:rPr>
-              <a:t> or </a:t>
-            </a:r>
-            <a:r>
-              <a:rPr lang="en-US" dirty="0"/>
-              <a:t>&lt;template [</a:t>
-            </a:r>
-            <a:r>
-              <a:rPr lang="en-US" dirty="0" err="1"/>
-              <a:t>ngFor</a:t>
-            </a:r>
-            <a:r>
-              <a:rPr lang="en-US" dirty="0"/>
-              <a:t>]&gt;</a:t>
-            </a:r>
-            <a:r>
-              <a:rPr lang="en-US" dirty="0">
-                <a:effectLst/>
-              </a:rPr>
-              <a:t> for </a:t>
-            </a:r>
-            <a:r>
-              <a:rPr lang="en-US" dirty="0"/>
-              <a:t>*</a:t>
-            </a:r>
-            <a:r>
-              <a:rPr lang="en-US" dirty="0" err="1"/>
-              <a:t>ngFor</a:t>
+              <a:t>支持多个变量</a:t>
+            </a:r>
+            <a:endParaRPr lang="en-US" altLang="zh-CN" dirty="0" smtClean="0"/>
+          </a:p>
+          <a:p>
+            <a:r>
+              <a:rPr lang="en-US" altLang="zh-CN" dirty="0" smtClean="0"/>
+              <a:t>2.</a:t>
+            </a:r>
+            <a:r>
+              <a:rPr lang="zh-CN" altLang="en-US" dirty="0" smtClean="0"/>
+              <a:t> </a:t>
+            </a:r>
+            <a:r>
+              <a:rPr lang="en-US" altLang="zh-CN" dirty="0" smtClean="0"/>
+              <a:t>cancel</a:t>
+            </a:r>
+            <a:r>
+              <a:rPr lang="zh-CN" altLang="en-US" dirty="0" smtClean="0"/>
+              <a:t>掉一个</a:t>
+            </a:r>
+            <a:r>
+              <a:rPr lang="en-US" altLang="zh-CN" dirty="0" smtClean="0"/>
+              <a:t>observable</a:t>
+            </a:r>
+          </a:p>
+          <a:p>
+            <a:r>
+              <a:rPr lang="en-US" altLang="zh-CN" dirty="0" smtClean="0"/>
+              <a:t>3.</a:t>
+            </a:r>
+            <a:r>
+              <a:rPr lang="zh-CN" altLang="en-US" dirty="0" smtClean="0"/>
+              <a:t> </a:t>
+            </a:r>
+            <a:r>
+              <a:rPr lang="en-US" altLang="zh-CN" dirty="0" smtClean="0"/>
+              <a:t>promise-&gt; then</a:t>
+            </a:r>
+            <a:r>
+              <a:rPr lang="zh-CN" altLang="en-US" dirty="0" smtClean="0"/>
+              <a:t> </a:t>
+            </a:r>
+            <a:r>
+              <a:rPr lang="en-US" altLang="zh-CN" dirty="0" smtClean="0"/>
+              <a:t>  observable -&gt; subscribe</a:t>
+            </a:r>
+            <a:r>
+              <a:rPr lang="en-US" dirty="0" smtClean="0"/>
+              <a:t> </a:t>
             </a:r>
             <a:endParaRPr lang="en-US" dirty="0"/>
           </a:p>
@@ -15706,7 +15553,7 @@
     </p:spTree>
     <p:extLst>
       <p:ext uri="{BB962C8B-B14F-4D97-AF65-F5344CB8AC3E}">
-        <p14:creationId xmlns:p14="http://schemas.microsoft.com/office/powerpoint/2010/main" val="547912599"/>
+        <p14:creationId xmlns:p14="http://schemas.microsoft.com/office/powerpoint/2010/main" val="1029556927"/>
       </p:ext>
     </p:extLst>
   </p:cSld>
@@ -15756,12 +15603,12 @@
           <a:lstStyle/>
           <a:p>
             <a:r>
-              <a:rPr lang="en-US" dirty="0" smtClean="0"/>
-              <a:t>Angular </a:t>
+              <a:rPr lang="en-US" altLang="zh-CN" dirty="0" smtClean="0"/>
+              <a:t>Angular</a:t>
             </a:r>
             <a:r>
               <a:rPr lang="zh-CN" altLang="en-US" dirty="0" smtClean="0"/>
-              <a:t>环境搭建</a:t>
+              <a:t> 指令</a:t>
             </a:r>
             <a:endParaRPr lang="en-US" dirty="0"/>
           </a:p>
@@ -15783,24 +15630,176 @@
           <a:lstStyle/>
           <a:p>
             <a:r>
-              <a:rPr lang="en-US" dirty="0"/>
-              <a:t>https://</a:t>
-            </a:r>
-            <a:r>
-              <a:rPr lang="en-US" dirty="0" err="1"/>
-              <a:t>github.com</a:t>
-            </a:r>
-            <a:r>
-              <a:rPr lang="en-US" dirty="0"/>
-              <a:t>/angular/angular-cli</a:t>
-            </a:r>
+              <a:rPr lang="zh-CN" altLang="en-US" dirty="0">
+                <a:effectLst/>
+              </a:rPr>
+              <a:t>组件 </a:t>
+            </a:r>
+            <a:r>
+              <a:rPr lang="en-US" altLang="zh-CN" dirty="0">
+                <a:effectLst/>
+              </a:rPr>
+              <a:t>- </a:t>
+            </a:r>
+            <a:r>
+              <a:rPr lang="zh-CN" altLang="en-US" dirty="0">
+                <a:effectLst/>
+              </a:rPr>
+              <a:t>带有模板的指令</a:t>
+            </a:r>
+            <a:r>
+              <a:rPr lang="en-US" altLang="zh-CN" dirty="0">
+                <a:effectLst/>
+              </a:rPr>
+              <a:t>(</a:t>
+            </a:r>
+            <a:r>
+              <a:rPr lang="zh-CN" altLang="en-US" dirty="0">
+                <a:effectLst/>
+              </a:rPr>
+              <a:t>组件皆指令</a:t>
+            </a:r>
+            <a:r>
+              <a:rPr lang="en-US" altLang="zh-CN" dirty="0">
+                <a:effectLst/>
+              </a:rPr>
+              <a:t>)</a:t>
+            </a:r>
+          </a:p>
+          <a:p>
+            <a:r>
+              <a:rPr lang="zh-CN" altLang="en-US" dirty="0">
+                <a:effectLst/>
+              </a:rPr>
+              <a:t>结构型指令 </a:t>
+            </a:r>
+            <a:r>
+              <a:rPr lang="en-US" altLang="zh-CN" dirty="0">
+                <a:effectLst/>
+              </a:rPr>
+              <a:t>- </a:t>
+            </a:r>
+            <a:r>
+              <a:rPr lang="zh-CN" altLang="en-US" dirty="0">
+                <a:effectLst/>
+              </a:rPr>
+              <a:t>作用于</a:t>
+            </a:r>
+            <a:r>
+              <a:rPr lang="en-US" altLang="zh-CN" dirty="0">
+                <a:effectLst/>
+              </a:rPr>
+              <a:t>DOM</a:t>
+            </a:r>
+            <a:r>
+              <a:rPr lang="zh-CN" altLang="en-US" dirty="0">
+                <a:effectLst/>
+              </a:rPr>
+              <a:t>元素修改视图结构的指令</a:t>
+            </a:r>
+            <a:r>
+              <a:rPr lang="en-US" altLang="zh-CN" dirty="0">
+                <a:effectLst/>
+              </a:rPr>
+              <a:t>(</a:t>
+            </a:r>
+            <a:r>
+              <a:rPr lang="en-US" altLang="zh-CN" dirty="0" err="1">
+                <a:effectLst/>
+              </a:rPr>
+              <a:t>NgIf</a:t>
+            </a:r>
+            <a:r>
+              <a:rPr lang="zh-CN" altLang="en-US" dirty="0">
+                <a:effectLst/>
+              </a:rPr>
+              <a:t>、</a:t>
+            </a:r>
+            <a:r>
+              <a:rPr lang="en-US" altLang="zh-CN" dirty="0" err="1">
+                <a:effectLst/>
+              </a:rPr>
+              <a:t>NgFor</a:t>
+            </a:r>
+            <a:r>
+              <a:rPr lang="zh-CN" altLang="en-US" dirty="0">
+                <a:effectLst/>
+              </a:rPr>
+              <a:t>等</a:t>
+            </a:r>
+            <a:r>
+              <a:rPr lang="en-US" altLang="zh-CN" dirty="0">
+                <a:effectLst/>
+              </a:rPr>
+              <a:t>)</a:t>
+            </a:r>
+          </a:p>
+          <a:p>
+            <a:r>
+              <a:rPr lang="zh-CN" altLang="en-US" dirty="0">
+                <a:effectLst/>
+              </a:rPr>
+              <a:t>属性型指令 </a:t>
+            </a:r>
+            <a:r>
+              <a:rPr lang="en-US" altLang="zh-CN" dirty="0">
+                <a:effectLst/>
+              </a:rPr>
+              <a:t>- </a:t>
+            </a:r>
+            <a:r>
+              <a:rPr lang="zh-CN" altLang="en-US" dirty="0">
+                <a:effectLst/>
+              </a:rPr>
+              <a:t>作用于</a:t>
+            </a:r>
+            <a:r>
+              <a:rPr lang="en-US" altLang="zh-CN" dirty="0">
+                <a:effectLst/>
+              </a:rPr>
+              <a:t>DOM</a:t>
+            </a:r>
+            <a:r>
+              <a:rPr lang="zh-CN" altLang="en-US" dirty="0">
+                <a:effectLst/>
+              </a:rPr>
+              <a:t>元素的外观和行为的指令</a:t>
+            </a:r>
+            <a:r>
+              <a:rPr lang="en-US" altLang="zh-CN" dirty="0">
+                <a:effectLst/>
+              </a:rPr>
+              <a:t>(</a:t>
+            </a:r>
+            <a:r>
+              <a:rPr lang="en-US" altLang="zh-CN" dirty="0" err="1"/>
+              <a:t>NgStyle</a:t>
+            </a:r>
+            <a:r>
+              <a:rPr lang="zh-CN" altLang="en-US" dirty="0">
+                <a:effectLst/>
+              </a:rPr>
+              <a:t>等</a:t>
+            </a:r>
+            <a:r>
+              <a:rPr lang="en-US" altLang="zh-CN" dirty="0">
+                <a:effectLst/>
+              </a:rPr>
+              <a:t>)</a:t>
+            </a:r>
+            <a:endParaRPr lang="zh-CN" altLang="en-US" dirty="0">
+              <a:effectLst/>
+            </a:endParaRPr>
+          </a:p>
+          <a:p>
+            <a:endParaRPr lang="en-US" dirty="0"/>
           </a:p>
         </p:txBody>
       </p:sp>
     </p:spTree>
     <p:extLst>
       <p:ext uri="{BB962C8B-B14F-4D97-AF65-F5344CB8AC3E}">
-        <p14:creationId xmlns:p14="http://schemas.microsoft.com/office/powerpoint/2010/main" val="304993857"/>
+        <p14:creationId xmlns:p14="http://schemas.microsoft.com/office/powerpoint/2010/main" val="366916453"/>
       </p:ext>
     </p:extLst>
   </p:cSld>
@@ -15850,59 +15849,160 @@
           <a:lstStyle/>
           <a:p>
             <a:r>
-              <a:rPr lang="en-US" altLang="zh-CN" dirty="0" smtClean="0"/>
-              <a:t>Angular</a:t>
+              <a:rPr lang="en-US" dirty="0" smtClean="0"/>
+              <a:t>Angular 2+ HTML </a:t>
             </a:r>
             <a:r>
               <a:rPr lang="zh-CN" altLang="en-US" dirty="0" smtClean="0"/>
-              <a:t>项目实战</a:t>
-            </a:r>
-            <a:r>
-              <a:rPr lang="en-US" altLang="zh-CN" dirty="0" smtClean="0"/>
-              <a:t>	</a:t>
-            </a:r>
-            <a:endParaRPr lang="en-US" dirty="0"/>
-          </a:p>
-        </p:txBody>
-      </p:sp>
-      <p:sp>
-        <p:nvSpPr>
-          <p:cNvPr id="3" name="Text Placeholder 2"/>
-          <p:cNvSpPr>
-            <a:spLocks noGrp="1"/>
-          </p:cNvSpPr>
-          <p:nvPr>
-            <p:ph type="body" sz="half" idx="2"/>
-          </p:nvPr>
-        </p:nvSpPr>
-        <p:spPr/>
-        <p:txBody>
-          <a:bodyPr>
-            <a:normAutofit/>
-          </a:bodyPr>
-          <a:lstStyle/>
-          <a:p>
-            <a:r>
-              <a:rPr lang="zh-CN" altLang="en-US" dirty="0" smtClean="0"/>
-              <a:t>官方英雄编辑器教程</a:t>
-            </a:r>
-            <a:endParaRPr lang="en-US" altLang="zh-CN" dirty="0" smtClean="0"/>
+              <a:t>模版语法</a:t>
+            </a:r>
+            <a:endParaRPr lang="en-US" dirty="0"/>
+          </a:p>
+        </p:txBody>
+      </p:sp>
+      <p:sp>
+        <p:nvSpPr>
+          <p:cNvPr id="3" name="Content Placeholder 2"/>
+          <p:cNvSpPr>
+            <a:spLocks noGrp="1"/>
+          </p:cNvSpPr>
+          <p:nvPr>
+            <p:ph idx="1"/>
+          </p:nvPr>
+        </p:nvSpPr>
+        <p:spPr/>
+        <p:txBody>
+          <a:bodyPr/>
+          <a:lstStyle/>
+          <a:p>
+            <a:r>
+              <a:rPr lang="en-US" dirty="0">
+                <a:effectLst/>
+              </a:rPr>
+              <a:t>[prop]="</a:t>
+            </a:r>
+            <a:r>
+              <a:rPr lang="en-US" dirty="0" smtClean="0">
+                <a:effectLst/>
+              </a:rPr>
+              <a:t>value”</a:t>
+            </a:r>
+            <a:endParaRPr lang="en-US" dirty="0">
+              <a:effectLst/>
+            </a:endParaRPr>
+          </a:p>
+          <a:p>
+            <a:r>
+              <a:rPr lang="en-US" dirty="0">
+                <a:effectLst/>
+              </a:rPr>
+              <a:t>prop="{{value</a:t>
+            </a:r>
+            <a:r>
+              <a:rPr lang="en-US" dirty="0" smtClean="0">
+                <a:effectLst/>
+              </a:rPr>
+              <a:t>}}”</a:t>
+            </a:r>
+          </a:p>
+          <a:p>
+            <a:r>
+              <a:rPr lang="en-US" dirty="0">
+                <a:effectLst/>
+              </a:rPr>
+              <a:t>(event)="</a:t>
+            </a:r>
+            <a:r>
+              <a:rPr lang="en-US" dirty="0" smtClean="0">
+                <a:effectLst/>
+              </a:rPr>
+              <a:t>expr”</a:t>
+            </a:r>
+          </a:p>
+          <a:p>
+            <a:r>
+              <a:rPr lang="en-US" dirty="0">
+                <a:effectLst/>
+              </a:rPr>
+              <a:t>#</a:t>
+            </a:r>
+            <a:r>
+              <a:rPr lang="en-US" dirty="0" err="1" smtClean="0">
+                <a:effectLst/>
+              </a:rPr>
+              <a:t>var</a:t>
+            </a:r>
+            <a:endParaRPr lang="en-US" dirty="0" smtClean="0">
+              <a:effectLst/>
+            </a:endParaRPr>
           </a:p>
           <a:p>
             <a:r>
               <a:rPr lang="en-US" dirty="0"/>
-              <a:t>https://</a:t>
+              <a:t>bind-</a:t>
+            </a:r>
+            <a:r>
+              <a:rPr lang="en-US" dirty="0">
+                <a:effectLst/>
+              </a:rPr>
+              <a:t> for </a:t>
+            </a:r>
+            <a:r>
+              <a:rPr lang="en-US" dirty="0"/>
+              <a:t>[]</a:t>
+            </a:r>
+            <a:r>
+              <a:rPr lang="en-US" dirty="0">
+                <a:effectLst/>
+              </a:rPr>
+              <a:t> and </a:t>
+            </a:r>
+            <a:r>
+              <a:rPr lang="en-US" dirty="0"/>
+              <a:t>on-</a:t>
+            </a:r>
+            <a:r>
+              <a:rPr lang="en-US" dirty="0">
+                <a:effectLst/>
+              </a:rPr>
+              <a:t> for </a:t>
+            </a:r>
+            <a:r>
+              <a:rPr lang="en-US" dirty="0"/>
+              <a:t>()</a:t>
+            </a:r>
+            <a:r>
+              <a:rPr lang="en-US" dirty="0">
+                <a:effectLst/>
+              </a:rPr>
+              <a:t> or </a:t>
+            </a:r>
+            <a:r>
+              <a:rPr lang="en-US" dirty="0"/>
+              <a:t>&lt;template [</a:t>
             </a:r>
             <a:r>
               <a:rPr lang="en-US" dirty="0" err="1"/>
-              <a:t>angular.cn</a:t>
+              <a:t>ngFor</a:t>
             </a:r>
             <a:r>
               <a:rPr lang="en-US" dirty="0"/>
-              <a:t>/tutorial</a:t>
-            </a:r>
-          </a:p>
-          <a:p>
+              <a:t>]&gt;</a:t>
+            </a:r>
+            <a:r>
+              <a:rPr lang="en-US" dirty="0">
+                <a:effectLst/>
+              </a:rPr>
+              <a:t> for </a:t>
+            </a:r>
+            <a:r>
+              <a:rPr lang="en-US" dirty="0"/>
+              <a:t>*</a:t>
+            </a:r>
+            <a:r>
+              <a:rPr lang="en-US" dirty="0" err="1"/>
+              <a:t>ngFor</a:t>
+            </a:r>
             <a:endParaRPr lang="en-US" dirty="0"/>
           </a:p>
         </p:txBody>
@@ -15910,13 +16010,20 @@
     </p:spTree>
     <p:extLst>
       <p:ext uri="{BB962C8B-B14F-4D97-AF65-F5344CB8AC3E}">
-        <p14:creationId xmlns:p14="http://schemas.microsoft.com/office/powerpoint/2010/main" val="1516572992"/>
+        <p14:creationId xmlns:p14="http://schemas.microsoft.com/office/powerpoint/2010/main" val="547912599"/>
       </p:ext>
     </p:extLst>
   </p:cSld>
   <p:clrMapOvr>
     <a:masterClrMapping/>
   </p:clrMapOvr>
+  <p:timing>
+    <p:tnLst>
+      <p:par>
+        <p:cTn id="1" dur="indefinite" restart="never" nodeType="tmRoot"/>
+      </p:par>
+    </p:tnLst>
+  </p:timing>
 </p:sld>
 </file>
 
@@ -15953,8 +16060,12 @@
           <a:lstStyle/>
           <a:p>
             <a:r>
+              <a:rPr lang="en-US" dirty="0" smtClean="0"/>
+              <a:t>Angular </a:t>
+            </a:r>
+            <a:r>
               <a:rPr lang="zh-CN" altLang="en-US" dirty="0" smtClean="0"/>
-              <a:t>大作业</a:t>
+              <a:t>环境搭建</a:t>
             </a:r>
             <a:endParaRPr lang="en-US" dirty="0"/>
           </a:p>
@@ -15976,115 +16087,24 @@
           <a:lstStyle/>
           <a:p>
             <a:r>
-              <a:rPr lang="zh-CN" altLang="en-US" dirty="0" smtClean="0"/>
-              <a:t>使用</a:t>
-            </a:r>
-            <a:r>
-              <a:rPr lang="en-US" altLang="zh-CN" dirty="0" smtClean="0"/>
-              <a:t>React </a:t>
-            </a:r>
-            <a:r>
-              <a:rPr lang="zh-CN" altLang="en-US" dirty="0" smtClean="0"/>
-              <a:t>或者 </a:t>
-            </a:r>
-            <a:r>
-              <a:rPr lang="en-US" altLang="zh-CN" dirty="0" smtClean="0"/>
-              <a:t>Angular </a:t>
-            </a:r>
-            <a:r>
-              <a:rPr lang="zh-CN" altLang="en-US" dirty="0" smtClean="0"/>
-              <a:t>做一个 </a:t>
-            </a:r>
-            <a:r>
-              <a:rPr lang="en-US" altLang="zh-CN" dirty="0" err="1" smtClean="0"/>
-              <a:t>todo</a:t>
-            </a:r>
-            <a:r>
-              <a:rPr lang="zh-CN" altLang="en-US" dirty="0" smtClean="0"/>
-              <a:t> </a:t>
-            </a:r>
-            <a:r>
-              <a:rPr lang="en-US" altLang="zh-CN" dirty="0" smtClean="0"/>
-              <a:t>list</a:t>
-            </a:r>
-          </a:p>
-          <a:p>
-            <a:r>
-              <a:rPr lang="zh-CN" altLang="en-US" dirty="0" smtClean="0"/>
-              <a:t>实现 添加， 删除功能</a:t>
-            </a:r>
-            <a:endParaRPr lang="en-US" altLang="zh-CN" dirty="0" smtClean="0"/>
-          </a:p>
-          <a:p>
-            <a:r>
-              <a:rPr lang="zh-CN" altLang="en-US" dirty="0" smtClean="0"/>
-              <a:t>将代码</a:t>
-            </a:r>
-            <a:r>
-              <a:rPr lang="en-US" altLang="zh-CN" dirty="0" smtClean="0"/>
-              <a:t>commit</a:t>
-            </a:r>
-            <a:r>
-              <a:rPr lang="zh-CN" altLang="en-US" dirty="0" smtClean="0"/>
-              <a:t>到自己的</a:t>
-            </a:r>
-            <a:r>
-              <a:rPr lang="en-US" altLang="zh-CN" dirty="0" err="1" smtClean="0"/>
-              <a:t>github</a:t>
-            </a:r>
-            <a:r>
-              <a:rPr lang="zh-CN" altLang="en-US" dirty="0" smtClean="0"/>
-              <a:t>上</a:t>
-            </a:r>
-            <a:endParaRPr lang="en-US" altLang="zh-CN" dirty="0" smtClean="0"/>
-          </a:p>
-          <a:p>
-            <a:r>
-              <a:rPr lang="zh-CN" altLang="en-US" dirty="0" smtClean="0"/>
-              <a:t>下节课准备一段</a:t>
-            </a:r>
-            <a:r>
-              <a:rPr lang="zh-CN" altLang="en-US" smtClean="0"/>
-              <a:t>简短的介绍</a:t>
-            </a:r>
-            <a:endParaRPr lang="en-US" altLang="zh-CN" dirty="0" smtClean="0"/>
-          </a:p>
-          <a:p>
-            <a:r>
-              <a:rPr lang="zh-CN" altLang="en-US" dirty="0" smtClean="0"/>
-              <a:t>不要</a:t>
-            </a:r>
-            <a:r>
-              <a:rPr lang="en-US" altLang="zh-CN" dirty="0" smtClean="0"/>
-              <a:t>commit</a:t>
-            </a:r>
-            <a:r>
-              <a:rPr lang="zh-CN" altLang="en-US" dirty="0" smtClean="0"/>
-              <a:t> </a:t>
-            </a:r>
-            <a:r>
-              <a:rPr lang="en-US" altLang="zh-CN" dirty="0" err="1" smtClean="0"/>
-              <a:t>Node_modules</a:t>
-            </a:r>
-            <a:r>
-              <a:rPr lang="en-US" altLang="zh-CN" dirty="0" smtClean="0"/>
-              <a:t> </a:t>
-            </a:r>
-            <a:r>
-              <a:rPr lang="zh-CN" altLang="en-US" dirty="0" smtClean="0"/>
-              <a:t>文件夹！</a:t>
-            </a:r>
-            <a:endParaRPr lang="en-US" altLang="zh-CN" dirty="0" smtClean="0"/>
-          </a:p>
-          <a:p>
-            <a:endParaRPr lang="en-US" dirty="0"/>
+              <a:rPr lang="en-US" dirty="0"/>
+              <a:t>https://</a:t>
+            </a:r>
+            <a:r>
+              <a:rPr lang="en-US" dirty="0" err="1"/>
+              <a:t>github.com</a:t>
+            </a:r>
+            <a:r>
+              <a:rPr lang="en-US" dirty="0"/>
+              <a:t>/angular/angular-cli</a:t>
+            </a:r>
           </a:p>
         </p:txBody>
       </p:sp>
     </p:spTree>
     <p:extLst>
       <p:ext uri="{BB962C8B-B14F-4D97-AF65-F5344CB8AC3E}">
-        <p14:creationId xmlns:p14="http://schemas.microsoft.com/office/powerpoint/2010/main" val="1759915627"/>
+        <p14:creationId xmlns:p14="http://schemas.microsoft.com/office/powerpoint/2010/main" val="304993857"/>
       </p:ext>
     </p:extLst>
   </p:cSld>
@@ -16134,58 +16154,59 @@
           <a:lstStyle/>
           <a:p>
             <a:r>
+              <a:rPr lang="en-US" altLang="zh-CN" dirty="0" smtClean="0"/>
+              <a:t>Angular</a:t>
+            </a:r>
+            <a:r>
               <a:rPr lang="zh-CN" altLang="en-US" dirty="0" smtClean="0"/>
-              <a:t>作业讨论</a:t>
-            </a:r>
-            <a:endParaRPr lang="en-US" dirty="0"/>
-          </a:p>
-        </p:txBody>
-      </p:sp>
-      <p:sp>
-        <p:nvSpPr>
-          <p:cNvPr id="3" name="Content Placeholder 2"/>
-          <p:cNvSpPr>
-            <a:spLocks noGrp="1"/>
-          </p:cNvSpPr>
-          <p:nvPr>
-            <p:ph idx="1"/>
-          </p:nvPr>
-        </p:nvSpPr>
-        <p:spPr/>
-        <p:txBody>
-          <a:bodyPr/>
-          <a:lstStyle/>
-          <a:p>
+              <a:t>项目实战</a:t>
+            </a:r>
             <a:r>
               <a:rPr lang="en-US" altLang="zh-CN" dirty="0" smtClean="0"/>
-              <a:t>1</a:t>
-            </a:r>
+              <a:t>	</a:t>
+            </a:r>
+            <a:endParaRPr lang="en-US" dirty="0"/>
+          </a:p>
+        </p:txBody>
+      </p:sp>
+      <p:sp>
+        <p:nvSpPr>
+          <p:cNvPr id="3" name="Text Placeholder 2"/>
+          <p:cNvSpPr>
+            <a:spLocks noGrp="1"/>
+          </p:cNvSpPr>
+          <p:nvPr>
+            <p:ph type="body" sz="half" idx="2"/>
+          </p:nvPr>
+        </p:nvSpPr>
+        <p:spPr/>
+        <p:txBody>
+          <a:bodyPr>
+            <a:normAutofit/>
+          </a:bodyPr>
+          <a:lstStyle/>
+          <a:p>
             <a:r>
               <a:rPr lang="zh-CN" altLang="en-US" dirty="0" smtClean="0"/>
-              <a:t>， 代码组织结构</a:t>
+              <a:t>官方英雄编辑器教程</a:t>
             </a:r>
             <a:endParaRPr lang="en-US" altLang="zh-CN" dirty="0" smtClean="0"/>
           </a:p>
           <a:p>
             <a:r>
-              <a:rPr lang="en-US" altLang="zh-CN" dirty="0" smtClean="0"/>
-              <a:t>2</a:t>
-            </a:r>
-            <a:r>
-              <a:rPr lang="zh-CN" altLang="en-US" dirty="0" smtClean="0"/>
-              <a:t>， 命名规则</a:t>
-            </a:r>
-            <a:endParaRPr lang="en-US" altLang="zh-CN" dirty="0" smtClean="0"/>
-          </a:p>
-          <a:p>
-            <a:r>
-              <a:rPr lang="en-US" altLang="zh-CN" dirty="0" smtClean="0"/>
-              <a:t>3</a:t>
-            </a:r>
-            <a:r>
-              <a:rPr lang="zh-CN" altLang="en-US" dirty="0" smtClean="0"/>
-              <a:t>， 代码质量</a:t>
-            </a:r>
+              <a:rPr lang="en-US" dirty="0"/>
+              <a:t>https://</a:t>
+            </a:r>
+            <a:r>
+              <a:rPr lang="en-US" dirty="0" err="1"/>
+              <a:t>angular.cn</a:t>
+            </a:r>
+            <a:r>
+              <a:rPr lang="en-US" dirty="0"/>
+              <a:t>/tutorial</a:t>
+            </a:r>
+          </a:p>
+          <a:p>
             <a:endParaRPr lang="en-US" dirty="0"/>
           </a:p>
         </p:txBody>
@@ -16193,20 +16214,13 @@
     </p:spTree>
     <p:extLst>
       <p:ext uri="{BB962C8B-B14F-4D97-AF65-F5344CB8AC3E}">
-        <p14:creationId xmlns:p14="http://schemas.microsoft.com/office/powerpoint/2010/main" val="1801247794"/>
+        <p14:creationId xmlns:p14="http://schemas.microsoft.com/office/powerpoint/2010/main" val="1516572992"/>
       </p:ext>
     </p:extLst>
   </p:cSld>
   <p:clrMapOvr>
     <a:masterClrMapping/>
   </p:clrMapOvr>
-  <p:timing>
-    <p:tnLst>
-      <p:par>
-        <p:cTn id="1" dur="indefinite" restart="never" nodeType="tmRoot"/>
-      </p:par>
-    </p:tnLst>
-  </p:timing>
 </p:sld>
 </file>
 
@@ -16243,8 +16257,51 @@
           <a:lstStyle/>
           <a:p>
             <a:r>
+              <a:rPr lang="zh-CN" altLang="en-US" dirty="0" smtClean="0"/>
+              <a:t>大作业</a:t>
+            </a:r>
+            <a:endParaRPr lang="en-US" dirty="0"/>
+          </a:p>
+        </p:txBody>
+      </p:sp>
+      <p:sp>
+        <p:nvSpPr>
+          <p:cNvPr id="3" name="Content Placeholder 2"/>
+          <p:cNvSpPr>
+            <a:spLocks noGrp="1"/>
+          </p:cNvSpPr>
+          <p:nvPr>
+            <p:ph idx="1"/>
+          </p:nvPr>
+        </p:nvSpPr>
+        <p:spPr/>
+        <p:txBody>
+          <a:bodyPr/>
+          <a:lstStyle/>
+          <a:p>
+            <a:r>
+              <a:rPr lang="zh-CN" altLang="en-US" dirty="0" smtClean="0"/>
+              <a:t>使用</a:t>
+            </a:r>
+            <a:r>
               <a:rPr lang="en-US" altLang="zh-CN" dirty="0" smtClean="0"/>
-              <a:t>Ant</a:t>
+              <a:t>React </a:t>
+            </a:r>
+            <a:r>
+              <a:rPr lang="zh-CN" altLang="en-US" dirty="0" smtClean="0"/>
+              <a:t>或者 </a:t>
+            </a:r>
+            <a:r>
+              <a:rPr lang="en-US" altLang="zh-CN" dirty="0" smtClean="0"/>
+              <a:t>Angular </a:t>
+            </a:r>
+            <a:r>
+              <a:rPr lang="zh-CN" altLang="en-US" dirty="0" smtClean="0"/>
+              <a:t>做一个 </a:t>
+            </a:r>
+            <a:r>
+              <a:rPr lang="en-US" altLang="zh-CN" dirty="0" err="1" smtClean="0"/>
+              <a:t>todo</a:t>
             </a:r>
             <a:r>
               <a:rPr lang="zh-CN" altLang="en-US" dirty="0" smtClean="0"/>
@@ -16252,68 +16309,78 @@
             </a:r>
             <a:r>
               <a:rPr lang="en-US" altLang="zh-CN" dirty="0" smtClean="0"/>
-              <a:t>design Pro</a:t>
-            </a:r>
-            <a:endParaRPr lang="en-US" dirty="0"/>
-          </a:p>
-        </p:txBody>
-      </p:sp>
-      <p:sp>
-        <p:nvSpPr>
-          <p:cNvPr id="3" name="Content Placeholder 2"/>
-          <p:cNvSpPr>
-            <a:spLocks noGrp="1"/>
-          </p:cNvSpPr>
-          <p:nvPr>
-            <p:ph idx="1"/>
-          </p:nvPr>
-        </p:nvSpPr>
-        <p:spPr/>
-        <p:txBody>
-          <a:bodyPr/>
-          <a:lstStyle/>
-          <a:p>
-            <a:r>
-              <a:rPr lang="en-US" dirty="0">
-                <a:hlinkClick r:id="rId3"/>
-              </a:rPr>
-              <a:t>https://pro.ant.design</a:t>
-            </a:r>
-            <a:r>
-              <a:rPr lang="en-US" dirty="0" smtClean="0">
-                <a:hlinkClick r:id="rId3"/>
-              </a:rPr>
-              <a:t>/</a:t>
-            </a:r>
-            <a:endParaRPr lang="en-US" dirty="0" smtClean="0"/>
+              <a:t>list</a:t>
+            </a:r>
           </a:p>
           <a:p>
             <a:r>
               <a:rPr lang="zh-CN" altLang="en-US" dirty="0" smtClean="0"/>
-              <a:t>开箱即用的</a:t>
+              <a:t>实现 添加， 删除功能</a:t>
+            </a:r>
+            <a:endParaRPr lang="en-US" altLang="zh-CN" dirty="0" smtClean="0"/>
+          </a:p>
+          <a:p>
+            <a:r>
+              <a:rPr lang="zh-CN" altLang="en-US" dirty="0" smtClean="0"/>
+              <a:t>将代码</a:t>
             </a:r>
             <a:r>
               <a:rPr lang="en-US" altLang="zh-CN" dirty="0" smtClean="0"/>
-              <a:t>React</a:t>
+              <a:t>commit</a:t>
             </a:r>
             <a:r>
               <a:rPr lang="zh-CN" altLang="en-US" dirty="0" smtClean="0"/>
-              <a:t>中后台系统</a:t>
+              <a:t>到自己的</a:t>
+            </a:r>
+            <a:r>
+              <a:rPr lang="en-US" altLang="zh-CN" dirty="0" err="1" smtClean="0"/>
+              <a:t>github</a:t>
+            </a:r>
+            <a:r>
+              <a:rPr lang="zh-CN" altLang="en-US" dirty="0" smtClean="0"/>
+              <a:t>上</a:t>
             </a:r>
             <a:endParaRPr lang="en-US" altLang="zh-CN" dirty="0" smtClean="0"/>
           </a:p>
           <a:p>
             <a:r>
               <a:rPr lang="zh-CN" altLang="en-US" dirty="0" smtClean="0"/>
-              <a:t>配套整套的开发环境和最佳实践</a:t>
+              <a:t>下节课准备一段</a:t>
+            </a:r>
+            <a:r>
+              <a:rPr lang="zh-CN" altLang="en-US" smtClean="0"/>
+              <a:t>简短的介绍</a:t>
             </a:r>
             <a:endParaRPr lang="en-US" altLang="zh-CN" dirty="0" smtClean="0"/>
           </a:p>
           <a:p>
             <a:r>
               <a:rPr lang="zh-CN" altLang="en-US" dirty="0" smtClean="0"/>
-              <a:t>阿里开发</a:t>
-            </a:r>
+              <a:t>不要</a:t>
+            </a:r>
+            <a:r>
+              <a:rPr lang="en-US" altLang="zh-CN" dirty="0" smtClean="0"/>
+              <a:t>commit</a:t>
+            </a:r>
+            <a:r>
+              <a:rPr lang="zh-CN" altLang="en-US" dirty="0" smtClean="0"/>
+              <a:t> </a:t>
+            </a:r>
+            <a:r>
+              <a:rPr lang="en-US" altLang="zh-CN" dirty="0" err="1" smtClean="0"/>
+              <a:t>Node_modules</a:t>
+            </a:r>
+            <a:r>
+              <a:rPr lang="en-US" altLang="zh-CN" dirty="0" smtClean="0"/>
+              <a:t> </a:t>
+            </a:r>
+            <a:r>
+              <a:rPr lang="zh-CN" altLang="en-US" dirty="0" smtClean="0"/>
+              <a:t>文件夹！</a:t>
+            </a:r>
+            <a:endParaRPr lang="en-US" altLang="zh-CN" dirty="0" smtClean="0"/>
+          </a:p>
+          <a:p>
             <a:endParaRPr lang="en-US" dirty="0"/>
           </a:p>
         </p:txBody>
@@ -16321,7 +16388,7 @@
     </p:spTree>
     <p:extLst>
       <p:ext uri="{BB962C8B-B14F-4D97-AF65-F5344CB8AC3E}">
-        <p14:creationId xmlns:p14="http://schemas.microsoft.com/office/powerpoint/2010/main" val="141927553"/>
+        <p14:creationId xmlns:p14="http://schemas.microsoft.com/office/powerpoint/2010/main" val="1759915627"/>
       </p:ext>
     </p:extLst>
   </p:cSld>
@@ -16372,7 +16439,7 @@
           <a:p>
             <a:r>
               <a:rPr lang="zh-CN" altLang="en-US" dirty="0" smtClean="0"/>
-              <a:t>求职辅导</a:t>
+              <a:t>作业讨论</a:t>
             </a:r>
             <a:endParaRPr lang="en-US" dirty="0"/>
           </a:p>
@@ -16393,71 +16460,44 @@
           <a:bodyPr/>
           <a:lstStyle/>
           <a:p>
-            <a:pPr lvl="0"/>
-            <a:r>
-              <a:rPr lang="zh-CN" altLang="en-US" dirty="0">
-                <a:effectLst/>
-              </a:rPr>
-              <a:t>电话面试辅导</a:t>
-            </a:r>
-            <a:endParaRPr lang="en-US" dirty="0">
-              <a:effectLst/>
-            </a:endParaRPr>
-          </a:p>
-          <a:p>
-            <a:pPr lvl="0"/>
-            <a:r>
-              <a:rPr lang="zh-CN" altLang="en-US" dirty="0">
-                <a:effectLst/>
-              </a:rPr>
-              <a:t>技术面试辅导</a:t>
-            </a:r>
-            <a:endParaRPr lang="en-US" dirty="0">
-              <a:effectLst/>
-            </a:endParaRPr>
-          </a:p>
-          <a:p>
-            <a:pPr lvl="0"/>
-            <a:r>
-              <a:rPr lang="en-US" dirty="0">
-                <a:effectLst/>
-              </a:rPr>
-              <a:t>Coding test</a:t>
-            </a:r>
-            <a:r>
-              <a:rPr lang="zh-CN" altLang="en-US" dirty="0">
-                <a:effectLst/>
-              </a:rPr>
-              <a:t>辅导</a:t>
-            </a:r>
-            <a:endParaRPr lang="en-US" dirty="0">
-              <a:effectLst/>
-            </a:endParaRPr>
-          </a:p>
-          <a:p>
-            <a:pPr lvl="0"/>
-            <a:r>
-              <a:rPr lang="zh-CN" altLang="en-US" dirty="0">
-                <a:effectLst/>
-              </a:rPr>
-              <a:t>简历</a:t>
-            </a:r>
-            <a:r>
-              <a:rPr lang="zh-CN" altLang="en-US" dirty="0" smtClean="0">
-                <a:effectLst/>
-              </a:rPr>
-              <a:t>修改</a:t>
-            </a:r>
-            <a:endParaRPr lang="en-US" dirty="0">
-              <a:effectLst/>
-            </a:endParaRPr>
+            <a:r>
+              <a:rPr lang="en-US" altLang="zh-CN" dirty="0" smtClean="0"/>
+              <a:t>1</a:t>
+            </a:r>
+            <a:r>
+              <a:rPr lang="zh-CN" altLang="en-US" dirty="0" smtClean="0"/>
+              <a:t>， 代码组织结构</a:t>
+            </a:r>
+            <a:endParaRPr lang="en-US" altLang="zh-CN" dirty="0" smtClean="0"/>
+          </a:p>
+          <a:p>
+            <a:r>
+              <a:rPr lang="en-US" altLang="zh-CN" dirty="0" smtClean="0"/>
+              <a:t>2</a:t>
+            </a:r>
+            <a:r>
+              <a:rPr lang="zh-CN" altLang="en-US" dirty="0" smtClean="0"/>
+              <a:t>， 命名规则</a:t>
+            </a:r>
+            <a:endParaRPr lang="en-US" altLang="zh-CN" dirty="0" smtClean="0"/>
+          </a:p>
+          <a:p>
+            <a:r>
+              <a:rPr lang="en-US" altLang="zh-CN" dirty="0" smtClean="0"/>
+              <a:t>3</a:t>
+            </a:r>
+            <a:r>
+              <a:rPr lang="zh-CN" altLang="en-US" dirty="0" smtClean="0"/>
+              <a:t>， 代码质量</a:t>
+            </a:r>
+            <a:endParaRPr lang="en-US" dirty="0"/>
           </a:p>
         </p:txBody>
       </p:sp>
     </p:spTree>
     <p:extLst>
       <p:ext uri="{BB962C8B-B14F-4D97-AF65-F5344CB8AC3E}">
-        <p14:creationId xmlns:p14="http://schemas.microsoft.com/office/powerpoint/2010/main" val="361378919"/>
+        <p14:creationId xmlns:p14="http://schemas.microsoft.com/office/powerpoint/2010/main" val="1801247794"/>
       </p:ext>
     </p:extLst>
   </p:cSld>
@@ -16507,8 +16547,16 @@
           <a:lstStyle/>
           <a:p>
             <a:r>
+              <a:rPr lang="en-US" altLang="zh-CN" dirty="0" smtClean="0"/>
+              <a:t>Ant</a:t>
+            </a:r>
+            <a:r>
               <a:rPr lang="zh-CN" altLang="en-US" dirty="0" smtClean="0"/>
-              <a:t>电话面试</a:t>
+              <a:t> </a:t>
+            </a:r>
+            <a:r>
+              <a:rPr lang="en-US" altLang="zh-CN" dirty="0" smtClean="0"/>
+              <a:t>design Pro</a:t>
             </a:r>
             <a:endParaRPr lang="en-US" dirty="0"/>
           </a:p>
@@ -16530,30 +16578,45 @@
           <a:lstStyle/>
           <a:p>
             <a:r>
+              <a:rPr lang="en-US" dirty="0">
+                <a:hlinkClick r:id="rId3"/>
+              </a:rPr>
+              <a:t>https://pro.ant.design</a:t>
+            </a:r>
+            <a:r>
+              <a:rPr lang="en-US" dirty="0" smtClean="0">
+                <a:hlinkClick r:id="rId3"/>
+              </a:rPr>
+              <a:t>/</a:t>
+            </a:r>
+            <a:endParaRPr lang="en-US" dirty="0" smtClean="0"/>
+          </a:p>
+          <a:p>
+            <a:r>
+              <a:rPr lang="zh-CN" altLang="en-US" dirty="0" smtClean="0"/>
+              <a:t>开箱即用的</a:t>
+            </a:r>
+            <a:r>
               <a:rPr lang="en-US" altLang="zh-CN" dirty="0" smtClean="0"/>
-              <a:t>HR</a:t>
+              <a:t>React</a:t>
             </a:r>
             <a:r>
               <a:rPr lang="zh-CN" altLang="en-US" dirty="0" smtClean="0"/>
-              <a:t>筛选简历的环节</a:t>
+              <a:t>中后台系统</a:t>
             </a:r>
             <a:endParaRPr lang="en-US" altLang="zh-CN" dirty="0" smtClean="0"/>
           </a:p>
           <a:p>
             <a:r>
-              <a:rPr lang="en-US" altLang="zh-CN" dirty="0" err="1" smtClean="0"/>
-              <a:t>Hr</a:t>
-            </a:r>
-            <a:r>
               <a:rPr lang="zh-CN" altLang="en-US" dirty="0" smtClean="0"/>
-              <a:t>基本什么也不懂</a:t>
+              <a:t>配套整套的开发环境和最佳实践</a:t>
             </a:r>
             <a:endParaRPr lang="en-US" altLang="zh-CN" dirty="0" smtClean="0"/>
           </a:p>
           <a:p>
             <a:r>
               <a:rPr lang="zh-CN" altLang="en-US" dirty="0" smtClean="0"/>
-              <a:t>适当夸大</a:t>
+              <a:t>阿里开发</a:t>
             </a:r>
             <a:endParaRPr lang="en-US" dirty="0"/>
           </a:p>
@@ -16562,7 +16625,7 @@
     </p:spTree>
     <p:extLst>
       <p:ext uri="{BB962C8B-B14F-4D97-AF65-F5344CB8AC3E}">
-        <p14:creationId xmlns:p14="http://schemas.microsoft.com/office/powerpoint/2010/main" val="545071430"/>
+        <p14:creationId xmlns:p14="http://schemas.microsoft.com/office/powerpoint/2010/main" val="141927553"/>
       </p:ext>
     </p:extLst>
   </p:cSld>
@@ -16613,7 +16676,7 @@
           <a:p>
             <a:r>
               <a:rPr lang="zh-CN" altLang="en-US" dirty="0" smtClean="0"/>
-              <a:t>技术面试</a:t>
+              <a:t>求职辅导</a:t>
             </a:r>
             <a:endParaRPr lang="en-US" dirty="0"/>
           </a:p>
@@ -16634,59 +16697,71 @@
           <a:bodyPr/>
           <a:lstStyle/>
           <a:p>
-            <a:r>
-              <a:rPr lang="en-US" altLang="zh-CN" dirty="0" smtClean="0"/>
-              <a:t>1</a:t>
-            </a:r>
-            <a:r>
-              <a:rPr lang="zh-CN" altLang="en-US" dirty="0" smtClean="0"/>
-              <a:t>， 反应要迅速</a:t>
-            </a:r>
-            <a:endParaRPr lang="en-US" altLang="zh-CN" dirty="0" smtClean="0"/>
-          </a:p>
-          <a:p>
-            <a:r>
-              <a:rPr lang="en-US" altLang="zh-CN" dirty="0" smtClean="0"/>
-              <a:t>2</a:t>
-            </a:r>
-            <a:r>
-              <a:rPr lang="zh-CN" altLang="en-US" dirty="0" smtClean="0"/>
-              <a:t>， 不会的问题要大胆承认，但是可以根据自己的见解说一下</a:t>
-            </a:r>
-            <a:endParaRPr lang="en-US" altLang="zh-CN" dirty="0" smtClean="0"/>
-          </a:p>
-          <a:p>
-            <a:r>
-              <a:rPr lang="en-US" altLang="zh-CN" dirty="0" smtClean="0"/>
-              <a:t>3</a:t>
-            </a:r>
-            <a:r>
-              <a:rPr lang="zh-CN" altLang="en-US" dirty="0" smtClean="0"/>
-              <a:t>， 基础知识最重要</a:t>
-            </a:r>
-            <a:endParaRPr lang="en-US" altLang="zh-CN" dirty="0" smtClean="0"/>
-          </a:p>
-          <a:p>
-            <a:r>
-              <a:rPr lang="en-US" altLang="zh-CN" dirty="0" smtClean="0"/>
-              <a:t>4</a:t>
-            </a:r>
-            <a:r>
-              <a:rPr lang="zh-CN" altLang="en-US" dirty="0" smtClean="0"/>
-              <a:t>， 刷</a:t>
-            </a:r>
-            <a:r>
-              <a:rPr lang="en-US" altLang="zh-CN" dirty="0" err="1" smtClean="0"/>
-              <a:t>Leetcode</a:t>
-            </a:r>
-            <a:endParaRPr lang="en-US" dirty="0"/>
+            <a:pPr lvl="0"/>
+            <a:r>
+              <a:rPr lang="zh-CN" altLang="en-US" dirty="0">
+                <a:effectLst/>
+              </a:rPr>
+              <a:t>电话面试辅导</a:t>
+            </a:r>
+            <a:endParaRPr lang="en-US" dirty="0">
+              <a:effectLst/>
+            </a:endParaRPr>
+          </a:p>
+          <a:p>
+            <a:pPr lvl="0"/>
+            <a:r>
+              <a:rPr lang="zh-CN" altLang="en-US" dirty="0">
+                <a:effectLst/>
+              </a:rPr>
+              <a:t>技术面试辅导</a:t>
+            </a:r>
+            <a:endParaRPr lang="en-US" dirty="0">
+              <a:effectLst/>
+            </a:endParaRPr>
+          </a:p>
+          <a:p>
+            <a:pPr lvl="0"/>
+            <a:r>
+              <a:rPr lang="en-US" dirty="0">
+                <a:effectLst/>
+              </a:rPr>
+              <a:t>Coding test</a:t>
+            </a:r>
+            <a:r>
+              <a:rPr lang="zh-CN" altLang="en-US" dirty="0">
+                <a:effectLst/>
+              </a:rPr>
+              <a:t>辅导</a:t>
+            </a:r>
+            <a:endParaRPr lang="en-US" dirty="0">
+              <a:effectLst/>
+            </a:endParaRPr>
+          </a:p>
+          <a:p>
+            <a:pPr lvl="0"/>
+            <a:r>
+              <a:rPr lang="zh-CN" altLang="en-US" dirty="0">
+                <a:effectLst/>
+              </a:rPr>
+              <a:t>简历</a:t>
+            </a:r>
+            <a:r>
+              <a:rPr lang="zh-CN" altLang="en-US" dirty="0" smtClean="0">
+                <a:effectLst/>
+              </a:rPr>
+              <a:t>修改</a:t>
+            </a:r>
+            <a:endParaRPr lang="en-US" dirty="0">
+              <a:effectLst/>
+            </a:endParaRPr>
           </a:p>
         </p:txBody>
       </p:sp>
     </p:spTree>
     <p:extLst>
       <p:ext uri="{BB962C8B-B14F-4D97-AF65-F5344CB8AC3E}">
-        <p14:creationId xmlns:p14="http://schemas.microsoft.com/office/powerpoint/2010/main" val="1408298898"/>
+        <p14:creationId xmlns:p14="http://schemas.microsoft.com/office/powerpoint/2010/main" val="361378919"/>
       </p:ext>
     </p:extLst>
   </p:cSld>
@@ -16736,105 +16811,62 @@
           <a:lstStyle/>
           <a:p>
             <a:r>
+              <a:rPr lang="zh-CN" altLang="en-US" dirty="0" smtClean="0"/>
+              <a:t>电话面试</a:t>
+            </a:r>
+            <a:endParaRPr lang="en-US" dirty="0"/>
+          </a:p>
+        </p:txBody>
+      </p:sp>
+      <p:sp>
+        <p:nvSpPr>
+          <p:cNvPr id="3" name="Content Placeholder 2"/>
+          <p:cNvSpPr>
+            <a:spLocks noGrp="1"/>
+          </p:cNvSpPr>
+          <p:nvPr>
+            <p:ph idx="1"/>
+          </p:nvPr>
+        </p:nvSpPr>
+        <p:spPr/>
+        <p:txBody>
+          <a:bodyPr/>
+          <a:lstStyle/>
+          <a:p>
+            <a:r>
               <a:rPr lang="en-US" altLang="zh-CN" dirty="0" smtClean="0"/>
-              <a:t>Coding</a:t>
+              <a:t>HR</a:t>
             </a:r>
             <a:r>
               <a:rPr lang="zh-CN" altLang="en-US" dirty="0" smtClean="0"/>
-              <a:t> </a:t>
-            </a:r>
-            <a:r>
-              <a:rPr lang="en-US" altLang="zh-CN" dirty="0" smtClean="0"/>
-              <a:t>test</a:t>
-            </a:r>
-            <a:endParaRPr lang="en-US" dirty="0"/>
-          </a:p>
-        </p:txBody>
-      </p:sp>
-      <p:sp>
-        <p:nvSpPr>
-          <p:cNvPr id="3" name="Content Placeholder 2"/>
-          <p:cNvSpPr>
-            <a:spLocks noGrp="1"/>
-          </p:cNvSpPr>
-          <p:nvPr>
-            <p:ph idx="1"/>
-          </p:nvPr>
-        </p:nvSpPr>
-        <p:spPr/>
-        <p:txBody>
-          <a:bodyPr/>
-          <a:lstStyle/>
-          <a:p>
-            <a:r>
-              <a:rPr lang="en-US" dirty="0" smtClean="0"/>
-              <a:t>1</a:t>
+              <a:t>筛选简历的环节</a:t>
+            </a:r>
+            <a:endParaRPr lang="en-US" altLang="zh-CN" dirty="0" smtClean="0"/>
+          </a:p>
+          <a:p>
+            <a:r>
+              <a:rPr lang="en-US" altLang="zh-CN" dirty="0" err="1" smtClean="0"/>
+              <a:t>Hr</a:t>
             </a:r>
             <a:r>
               <a:rPr lang="zh-CN" altLang="en-US" dirty="0" smtClean="0"/>
-              <a:t>，认真读题</a:t>
+              <a:t>基本什么也不懂</a:t>
             </a:r>
             <a:endParaRPr lang="en-US" altLang="zh-CN" dirty="0" smtClean="0"/>
           </a:p>
           <a:p>
             <a:r>
-              <a:rPr lang="en-US" altLang="zh-CN" dirty="0" smtClean="0"/>
-              <a:t>2</a:t>
-            </a:r>
-            <a:r>
-              <a:rPr lang="zh-CN" altLang="en-US" dirty="0"/>
-              <a:t>，</a:t>
-            </a:r>
-            <a:r>
               <a:rPr lang="zh-CN" altLang="en-US" dirty="0" smtClean="0"/>
-              <a:t>认清</a:t>
-            </a:r>
-            <a:r>
-              <a:rPr lang="en-US" altLang="zh-CN" dirty="0" smtClean="0"/>
-              <a:t>Coding</a:t>
-            </a:r>
-            <a:r>
-              <a:rPr lang="zh-CN" altLang="en-US" dirty="0" smtClean="0"/>
-              <a:t> </a:t>
-            </a:r>
-            <a:r>
-              <a:rPr lang="en-US" altLang="zh-CN" dirty="0" smtClean="0"/>
-              <a:t>test</a:t>
-            </a:r>
-            <a:r>
-              <a:rPr lang="zh-CN" altLang="en-US" dirty="0" smtClean="0"/>
-              <a:t>的目的</a:t>
-            </a:r>
-            <a:endParaRPr lang="en-US" altLang="zh-CN" dirty="0" smtClean="0"/>
-          </a:p>
-          <a:p>
-            <a:r>
-              <a:rPr lang="en-US" altLang="zh-CN" dirty="0" smtClean="0"/>
-              <a:t>3</a:t>
-            </a:r>
-            <a:r>
-              <a:rPr lang="zh-CN" altLang="en-US" dirty="0" smtClean="0"/>
-              <a:t>，作业讨论中的三点</a:t>
-            </a:r>
-            <a:endParaRPr lang="en-US" altLang="zh-CN" dirty="0" smtClean="0"/>
-          </a:p>
-          <a:p>
-            <a:r>
-              <a:rPr lang="en-US" altLang="zh-CN" dirty="0" smtClean="0"/>
-              <a:t>4</a:t>
-            </a:r>
-            <a:r>
-              <a:rPr lang="zh-CN" altLang="en-US" dirty="0" smtClean="0"/>
-              <a:t>， 写不完没事</a:t>
-            </a:r>
-            <a:endParaRPr lang="en-US" altLang="zh-CN" dirty="0" smtClean="0"/>
+              <a:t>适当夸大</a:t>
+            </a:r>
+            <a:endParaRPr lang="en-US" dirty="0"/>
           </a:p>
         </p:txBody>
       </p:sp>
     </p:spTree>
     <p:extLst>
       <p:ext uri="{BB962C8B-B14F-4D97-AF65-F5344CB8AC3E}">
-        <p14:creationId xmlns:p14="http://schemas.microsoft.com/office/powerpoint/2010/main" val="106475286"/>
+        <p14:creationId xmlns:p14="http://schemas.microsoft.com/office/powerpoint/2010/main" val="545071430"/>
       </p:ext>
     </p:extLst>
   </p:cSld>
@@ -17010,6 +17042,278 @@
 </file>
 
 <file path=ppt/slides/slide60.xml><?xml version="1.0" encoding="utf-8"?>
+<p:sld xmlns:a="http://schemas.openxmlformats.org/drawingml/2006/main" xmlns:r="http://schemas.openxmlformats.org/officeDocument/2006/relationships" xmlns:p="http://schemas.openxmlformats.org/presentationml/2006/main">
+  <p:cSld>
+    <p:spTree>
+      <p:nvGrpSpPr>
+        <p:cNvPr id="1" name=""/>
+        <p:cNvGrpSpPr/>
+        <p:nvPr/>
+      </p:nvGrpSpPr>
+      <p:grpSpPr>
+        <a:xfrm>
+          <a:off x="0" y="0"/>
+          <a:ext cx="0" cy="0"/>
+          <a:chOff x="0" y="0"/>
+          <a:chExt cx="0" cy="0"/>
+        </a:xfrm>
+      </p:grpSpPr>
+      <p:sp>
+        <p:nvSpPr>
+          <p:cNvPr id="2" name="Title 1"/>
+          <p:cNvSpPr>
+            <a:spLocks noGrp="1"/>
+          </p:cNvSpPr>
+          <p:nvPr>
+            <p:ph type="title"/>
+          </p:nvPr>
+        </p:nvSpPr>
+        <p:spPr/>
+        <p:txBody>
+          <a:bodyPr/>
+          <a:lstStyle/>
+          <a:p>
+            <a:r>
+              <a:rPr lang="zh-CN" altLang="en-US" dirty="0" smtClean="0"/>
+              <a:t>技术面试</a:t>
+            </a:r>
+            <a:endParaRPr lang="en-US" dirty="0"/>
+          </a:p>
+        </p:txBody>
+      </p:sp>
+      <p:sp>
+        <p:nvSpPr>
+          <p:cNvPr id="3" name="Content Placeholder 2"/>
+          <p:cNvSpPr>
+            <a:spLocks noGrp="1"/>
+          </p:cNvSpPr>
+          <p:nvPr>
+            <p:ph idx="1"/>
+          </p:nvPr>
+        </p:nvSpPr>
+        <p:spPr/>
+        <p:txBody>
+          <a:bodyPr/>
+          <a:lstStyle/>
+          <a:p>
+            <a:r>
+              <a:rPr lang="en-US" altLang="zh-CN" dirty="0" smtClean="0"/>
+              <a:t>1</a:t>
+            </a:r>
+            <a:r>
+              <a:rPr lang="zh-CN" altLang="en-US" dirty="0" smtClean="0"/>
+              <a:t>， 反应要迅速</a:t>
+            </a:r>
+            <a:endParaRPr lang="en-US" altLang="zh-CN" dirty="0" smtClean="0"/>
+          </a:p>
+          <a:p>
+            <a:r>
+              <a:rPr lang="en-US" altLang="zh-CN" dirty="0" smtClean="0"/>
+              <a:t>2</a:t>
+            </a:r>
+            <a:r>
+              <a:rPr lang="zh-CN" altLang="en-US" dirty="0" smtClean="0"/>
+              <a:t>， 不会的问题要大胆承认，但是可以根据自己的见解说一下</a:t>
+            </a:r>
+            <a:endParaRPr lang="en-US" altLang="zh-CN" dirty="0" smtClean="0"/>
+          </a:p>
+          <a:p>
+            <a:r>
+              <a:rPr lang="en-US" altLang="zh-CN" dirty="0" smtClean="0"/>
+              <a:t>3</a:t>
+            </a:r>
+            <a:r>
+              <a:rPr lang="zh-CN" altLang="en-US" dirty="0" smtClean="0"/>
+              <a:t>， 基础知识最重要</a:t>
+            </a:r>
+            <a:endParaRPr lang="en-US" altLang="zh-CN" dirty="0" smtClean="0"/>
+          </a:p>
+          <a:p>
+            <a:r>
+              <a:rPr lang="en-US" altLang="zh-CN" dirty="0" smtClean="0"/>
+              <a:t>4</a:t>
+            </a:r>
+            <a:r>
+              <a:rPr lang="zh-CN" altLang="en-US" dirty="0" smtClean="0"/>
+              <a:t>， 刷</a:t>
+            </a:r>
+            <a:r>
+              <a:rPr lang="en-US" altLang="zh-CN" dirty="0" err="1" smtClean="0"/>
+              <a:t>Leetcode</a:t>
+            </a:r>
+            <a:endParaRPr lang="en-US" dirty="0"/>
+          </a:p>
+        </p:txBody>
+      </p:sp>
+    </p:spTree>
+    <p:extLst>
+      <p:ext uri="{BB962C8B-B14F-4D97-AF65-F5344CB8AC3E}">
+        <p14:creationId xmlns:p14="http://schemas.microsoft.com/office/powerpoint/2010/main" val="1408298898"/>
+      </p:ext>
+    </p:extLst>
+  </p:cSld>
+  <p:clrMapOvr>
+    <a:masterClrMapping/>
+  </p:clrMapOvr>
+  <p:timing>
+    <p:tnLst>
+      <p:par>
+        <p:cTn id="1" dur="indefinite" restart="never" nodeType="tmRoot"/>
+      </p:par>
+    </p:tnLst>
+  </p:timing>
+</p:sld>
+</file>
+
+<file path=ppt/slides/slide61.xml><?xml version="1.0" encoding="utf-8"?>
+<p:sld xmlns:a="http://schemas.openxmlformats.org/drawingml/2006/main" xmlns:r="http://schemas.openxmlformats.org/officeDocument/2006/relationships" xmlns:p="http://schemas.openxmlformats.org/presentationml/2006/main">
+  <p:cSld>
+    <p:spTree>
+      <p:nvGrpSpPr>
+        <p:cNvPr id="1" name=""/>
+        <p:cNvGrpSpPr/>
+        <p:nvPr/>
+      </p:nvGrpSpPr>
+      <p:grpSpPr>
+        <a:xfrm>
+          <a:off x="0" y="0"/>
+          <a:ext cx="0" cy="0"/>
+          <a:chOff x="0" y="0"/>
+          <a:chExt cx="0" cy="0"/>
+        </a:xfrm>
+      </p:grpSpPr>
+      <p:sp>
+        <p:nvSpPr>
+          <p:cNvPr id="2" name="Title 1"/>
+          <p:cNvSpPr>
+            <a:spLocks noGrp="1"/>
+          </p:cNvSpPr>
+          <p:nvPr>
+            <p:ph type="title"/>
+          </p:nvPr>
+        </p:nvSpPr>
+        <p:spPr/>
+        <p:txBody>
+          <a:bodyPr/>
+          <a:lstStyle/>
+          <a:p>
+            <a:r>
+              <a:rPr lang="en-US" altLang="zh-CN" dirty="0" smtClean="0"/>
+              <a:t>Coding</a:t>
+            </a:r>
+            <a:r>
+              <a:rPr lang="zh-CN" altLang="en-US" dirty="0" smtClean="0"/>
+              <a:t> </a:t>
+            </a:r>
+            <a:r>
+              <a:rPr lang="en-US" altLang="zh-CN" dirty="0" smtClean="0"/>
+              <a:t>test</a:t>
+            </a:r>
+            <a:endParaRPr lang="en-US" dirty="0"/>
+          </a:p>
+        </p:txBody>
+      </p:sp>
+      <p:sp>
+        <p:nvSpPr>
+          <p:cNvPr id="3" name="Content Placeholder 2"/>
+          <p:cNvSpPr>
+            <a:spLocks noGrp="1"/>
+          </p:cNvSpPr>
+          <p:nvPr>
+            <p:ph idx="1"/>
+          </p:nvPr>
+        </p:nvSpPr>
+        <p:spPr/>
+        <p:txBody>
+          <a:bodyPr/>
+          <a:lstStyle/>
+          <a:p>
+            <a:r>
+              <a:rPr lang="en-US" dirty="0" smtClean="0"/>
+              <a:t>1</a:t>
+            </a:r>
+            <a:r>
+              <a:rPr lang="zh-CN" altLang="en-US" dirty="0" smtClean="0"/>
+              <a:t>，认真读题</a:t>
+            </a:r>
+            <a:endParaRPr lang="en-US" altLang="zh-CN" dirty="0" smtClean="0"/>
+          </a:p>
+          <a:p>
+            <a:r>
+              <a:rPr lang="en-US" altLang="zh-CN" dirty="0" smtClean="0"/>
+              <a:t>2</a:t>
+            </a:r>
+            <a:r>
+              <a:rPr lang="zh-CN" altLang="en-US" dirty="0"/>
+              <a:t>，</a:t>
+            </a:r>
+            <a:r>
+              <a:rPr lang="zh-CN" altLang="en-US" dirty="0" smtClean="0"/>
+              <a:t>认清</a:t>
+            </a:r>
+            <a:r>
+              <a:rPr lang="en-US" altLang="zh-CN" dirty="0" smtClean="0"/>
+              <a:t>Coding</a:t>
+            </a:r>
+            <a:r>
+              <a:rPr lang="zh-CN" altLang="en-US" dirty="0" smtClean="0"/>
+              <a:t> </a:t>
+            </a:r>
+            <a:r>
+              <a:rPr lang="en-US" altLang="zh-CN" dirty="0" smtClean="0"/>
+              <a:t>test</a:t>
+            </a:r>
+            <a:r>
+              <a:rPr lang="zh-CN" altLang="en-US" dirty="0" smtClean="0"/>
+              <a:t>的目的</a:t>
+            </a:r>
+            <a:endParaRPr lang="en-US" altLang="zh-CN" dirty="0" smtClean="0"/>
+          </a:p>
+          <a:p>
+            <a:r>
+              <a:rPr lang="en-US" altLang="zh-CN" dirty="0" smtClean="0"/>
+              <a:t>3</a:t>
+            </a:r>
+            <a:r>
+              <a:rPr lang="zh-CN" altLang="en-US" dirty="0" smtClean="0"/>
+              <a:t>，作业讨论中的三点</a:t>
+            </a:r>
+            <a:endParaRPr lang="en-US" altLang="zh-CN" dirty="0" smtClean="0"/>
+          </a:p>
+          <a:p>
+            <a:r>
+              <a:rPr lang="en-US" altLang="zh-CN" dirty="0" smtClean="0"/>
+              <a:t>4</a:t>
+            </a:r>
+            <a:r>
+              <a:rPr lang="zh-CN" altLang="en-US" dirty="0" smtClean="0"/>
+              <a:t>， 写不完没事</a:t>
+            </a:r>
+            <a:endParaRPr lang="en-US" altLang="zh-CN" dirty="0" smtClean="0"/>
+          </a:p>
+        </p:txBody>
+      </p:sp>
+    </p:spTree>
+    <p:extLst>
+      <p:ext uri="{BB962C8B-B14F-4D97-AF65-F5344CB8AC3E}">
+        <p14:creationId xmlns:p14="http://schemas.microsoft.com/office/powerpoint/2010/main" val="106475286"/>
+      </p:ext>
+    </p:extLst>
+  </p:cSld>
+  <p:clrMapOvr>
+    <a:masterClrMapping/>
+  </p:clrMapOvr>
+  <p:timing>
+    <p:tnLst>
+      <p:par>
+        <p:cTn id="1" dur="indefinite" restart="never" nodeType="tmRoot"/>
+      </p:par>
+    </p:tnLst>
+  </p:timing>
+</p:sld>
+</file>
+
+<file path=ppt/slides/slide62.xml><?xml version="1.0" encoding="utf-8"?>
 <p:sld xmlns:a="http://schemas.openxmlformats.org/drawingml/2006/main" xmlns:r="http://schemas.openxmlformats.org/officeDocument/2006/relationships" xmlns:p="http://schemas.openxmlformats.org/presentationml/2006/main">
   <p:cSld>
     <p:spTree>

</xml_diff>

<commit_message>
update for seesion 5
</commit_message>
<xml_diff>
--- a/前端课程.pptx
+++ b/前端课程.pptx
@@ -335,7 +335,7 @@
           <a:p>
             <a:fld id="{A75DC609-2A5E-994A-AEB9-E13728C46CDD}" type="datetimeFigureOut">
               <a:rPr lang="en-US" smtClean="0"/>
-              <a:t>7/22/18</a:t>
+              <a:t>7/27/18</a:t>
             </a:fld>
             <a:endParaRPr lang="en-US"/>
           </a:p>
@@ -3246,7 +3246,25 @@
           <a:p>
             <a:r>
               <a:rPr lang="en-US" dirty="0" smtClean="0"/>
-              <a:t>http://</a:t>
+              <a:t>https://</a:t>
+            </a:r>
+            <a:r>
+              <a:rPr lang="en-US" dirty="0" err="1" smtClean="0"/>
+              <a:t>zhongsp.gitbooks.io</a:t>
+            </a:r>
+            <a:r>
+              <a:rPr lang="en-US" dirty="0" smtClean="0"/>
+              <a:t>/typescript-handbook/</a:t>
+            </a:r>
+          </a:p>
+          <a:p>
+            <a:r>
+              <a:rPr lang="en-US" dirty="0" smtClean="0"/>
+              <a:t>http</a:t>
+            </a:r>
+            <a:r>
+              <a:rPr lang="en-US" dirty="0" smtClean="0"/>
+              <a:t>://</a:t>
             </a:r>
             <a:r>
               <a:rPr lang="en-US" dirty="0" err="1" smtClean="0"/>
@@ -3599,7 +3617,7 @@
           <a:p>
             <a:fld id="{3A8071CD-55D8-0E40-9E87-5F5ADA6DF007}" type="slidenum">
               <a:rPr lang="en-US" smtClean="0"/>
-              <a:t>56</a:t>
+              <a:t>55</a:t>
             </a:fld>
             <a:endParaRPr lang="en-US"/>
           </a:p>
@@ -3608,7 +3626,7 @@
     </p:spTree>
     <p:extLst>
       <p:ext uri="{BB962C8B-B14F-4D97-AF65-F5344CB8AC3E}">
-        <p14:creationId xmlns:p14="http://schemas.microsoft.com/office/powerpoint/2010/main" val="1547042826"/>
+        <p14:creationId xmlns:p14="http://schemas.microsoft.com/office/powerpoint/2010/main" val="222204639"/>
       </p:ext>
     </p:extLst>
   </p:cSld>
@@ -3683,7 +3701,7 @@
           <a:p>
             <a:fld id="{3A8071CD-55D8-0E40-9E87-5F5ADA6DF007}" type="slidenum">
               <a:rPr lang="en-US" smtClean="0"/>
-              <a:t>57</a:t>
+              <a:t>56</a:t>
             </a:fld>
             <a:endParaRPr lang="en-US"/>
           </a:p>
@@ -3692,7 +3710,7 @@
     </p:spTree>
     <p:extLst>
       <p:ext uri="{BB962C8B-B14F-4D97-AF65-F5344CB8AC3E}">
-        <p14:creationId xmlns:p14="http://schemas.microsoft.com/office/powerpoint/2010/main" val="800191084"/>
+        <p14:creationId xmlns:p14="http://schemas.microsoft.com/office/powerpoint/2010/main" val="1547042826"/>
       </p:ext>
     </p:extLst>
   </p:cSld>
@@ -3746,6 +3764,90 @@
           <a:bodyPr/>
           <a:lstStyle/>
           <a:p>
+            <a:endParaRPr lang="en-US" dirty="0"/>
+          </a:p>
+        </p:txBody>
+      </p:sp>
+      <p:sp>
+        <p:nvSpPr>
+          <p:cNvPr id="4" name="Slide Number Placeholder 3"/>
+          <p:cNvSpPr>
+            <a:spLocks noGrp="1"/>
+          </p:cNvSpPr>
+          <p:nvPr>
+            <p:ph type="sldNum" sz="quarter" idx="10"/>
+          </p:nvPr>
+        </p:nvSpPr>
+        <p:spPr/>
+        <p:txBody>
+          <a:bodyPr/>
+          <a:lstStyle/>
+          <a:p>
+            <a:fld id="{3A8071CD-55D8-0E40-9E87-5F5ADA6DF007}" type="slidenum">
+              <a:rPr lang="en-US" smtClean="0"/>
+              <a:t>57</a:t>
+            </a:fld>
+            <a:endParaRPr lang="en-US"/>
+          </a:p>
+        </p:txBody>
+      </p:sp>
+    </p:spTree>
+    <p:extLst>
+      <p:ext uri="{BB962C8B-B14F-4D97-AF65-F5344CB8AC3E}">
+        <p14:creationId xmlns:p14="http://schemas.microsoft.com/office/powerpoint/2010/main" val="800191084"/>
+      </p:ext>
+    </p:extLst>
+  </p:cSld>
+  <p:clrMapOvr>
+    <a:masterClrMapping/>
+  </p:clrMapOvr>
+</p:notes>
+</file>
+
+<file path=ppt/notesSlides/notesSlide36.xml><?xml version="1.0" encoding="utf-8"?>
+<p:notes xmlns:a="http://schemas.openxmlformats.org/drawingml/2006/main" xmlns:r="http://schemas.openxmlformats.org/officeDocument/2006/relationships" xmlns:p="http://schemas.openxmlformats.org/presentationml/2006/main">
+  <p:cSld>
+    <p:spTree>
+      <p:nvGrpSpPr>
+        <p:cNvPr id="1" name=""/>
+        <p:cNvGrpSpPr/>
+        <p:nvPr/>
+      </p:nvGrpSpPr>
+      <p:grpSpPr>
+        <a:xfrm>
+          <a:off x="0" y="0"/>
+          <a:ext cx="0" cy="0"/>
+          <a:chOff x="0" y="0"/>
+          <a:chExt cx="0" cy="0"/>
+        </a:xfrm>
+      </p:grpSpPr>
+      <p:sp>
+        <p:nvSpPr>
+          <p:cNvPr id="2" name="Slide Image Placeholder 1"/>
+          <p:cNvSpPr>
+            <a:spLocks noGrp="1" noRot="1" noChangeAspect="1"/>
+          </p:cNvSpPr>
+          <p:nvPr>
+            <p:ph type="sldImg"/>
+          </p:nvPr>
+        </p:nvSpPr>
+        <p:spPr/>
+      </p:sp>
+      <p:sp>
+        <p:nvSpPr>
+          <p:cNvPr id="3" name="Notes Placeholder 2"/>
+          <p:cNvSpPr>
+            <a:spLocks noGrp="1"/>
+          </p:cNvSpPr>
+          <p:nvPr>
+            <p:ph type="body" idx="1"/>
+          </p:nvPr>
+        </p:nvSpPr>
+        <p:spPr/>
+        <p:txBody>
+          <a:bodyPr/>
+          <a:lstStyle/>
+          <a:p>
             <a:r>
               <a:rPr lang="en-US" dirty="0" smtClean="0"/>
               <a:t>https://</a:t>
@@ -3817,7 +3919,7 @@
 </p:notes>
 </file>
 
-<file path=ppt/notesSlides/notesSlide36.xml><?xml version="1.0" encoding="utf-8"?>
+<file path=ppt/notesSlides/notesSlide37.xml><?xml version="1.0" encoding="utf-8"?>
 <p:notes xmlns:a="http://schemas.openxmlformats.org/drawingml/2006/main" xmlns:r="http://schemas.openxmlformats.org/officeDocument/2006/relationships" xmlns:p="http://schemas.openxmlformats.org/presentationml/2006/main">
   <p:cSld>
     <p:spTree>
@@ -4729,7 +4831,7 @@
             <a:fld id="{B61BEF0D-F0BB-DE4B-95CE-6DB70DBA9567}" type="datetimeFigureOut">
               <a:rPr lang="en-US" smtClean="0"/>
               <a:pPr/>
-              <a:t>7/22/18</a:t>
+              <a:t>7/27/18</a:t>
             </a:fld>
             <a:endParaRPr lang="en-US" dirty="0"/>
           </a:p>
@@ -5003,7 +5105,7 @@
             <a:fld id="{B61BEF0D-F0BB-DE4B-95CE-6DB70DBA9567}" type="datetimeFigureOut">
               <a:rPr lang="en-US" smtClean="0"/>
               <a:pPr/>
-              <a:t>7/22/18</a:t>
+              <a:t>7/27/18</a:t>
             </a:fld>
             <a:endParaRPr lang="en-US" dirty="0"/>
           </a:p>
@@ -5236,7 +5338,7 @@
             <a:fld id="{B61BEF0D-F0BB-DE4B-95CE-6DB70DBA9567}" type="datetimeFigureOut">
               <a:rPr lang="en-US" smtClean="0"/>
               <a:pPr/>
-              <a:t>7/22/18</a:t>
+              <a:t>7/27/18</a:t>
             </a:fld>
             <a:endParaRPr lang="en-US" dirty="0"/>
           </a:p>
@@ -5548,7 +5650,7 @@
             <a:fld id="{B61BEF0D-F0BB-DE4B-95CE-6DB70DBA9567}" type="datetimeFigureOut">
               <a:rPr lang="en-US" smtClean="0"/>
               <a:pPr/>
-              <a:t>7/22/18</a:t>
+              <a:t>7/27/18</a:t>
             </a:fld>
             <a:endParaRPr lang="en-US" dirty="0"/>
           </a:p>
@@ -6023,7 +6125,7 @@
             <a:fld id="{B61BEF0D-F0BB-DE4B-95CE-6DB70DBA9567}" type="datetimeFigureOut">
               <a:rPr lang="en-US" smtClean="0"/>
               <a:pPr/>
-              <a:t>7/22/18</a:t>
+              <a:t>7/27/18</a:t>
             </a:fld>
             <a:endParaRPr lang="en-US" dirty="0"/>
           </a:p>
@@ -6572,7 +6674,7 @@
             <a:fld id="{B61BEF0D-F0BB-DE4B-95CE-6DB70DBA9567}" type="datetimeFigureOut">
               <a:rPr lang="en-US" smtClean="0"/>
               <a:pPr/>
-              <a:t>7/22/18</a:t>
+              <a:t>7/27/18</a:t>
             </a:fld>
             <a:endParaRPr lang="en-US" dirty="0"/>
           </a:p>
@@ -7348,7 +7450,7 @@
             <a:fld id="{B61BEF0D-F0BB-DE4B-95CE-6DB70DBA9567}" type="datetimeFigureOut">
               <a:rPr lang="en-US" smtClean="0"/>
               <a:pPr/>
-              <a:t>7/22/18</a:t>
+              <a:t>7/27/18</a:t>
             </a:fld>
             <a:endParaRPr lang="en-US" dirty="0"/>
           </a:p>
@@ -7525,7 +7627,7 @@
             <a:fld id="{B61BEF0D-F0BB-DE4B-95CE-6DB70DBA9567}" type="datetimeFigureOut">
               <a:rPr lang="en-US" smtClean="0"/>
               <a:pPr/>
-              <a:t>7/22/18</a:t>
+              <a:t>7/27/18</a:t>
             </a:fld>
             <a:endParaRPr lang="en-US" dirty="0"/>
           </a:p>
@@ -7750,7 +7852,7 @@
             <a:fld id="{B61BEF0D-F0BB-DE4B-95CE-6DB70DBA9567}" type="datetimeFigureOut">
               <a:rPr lang="en-US" smtClean="0"/>
               <a:pPr/>
-              <a:t>7/22/18</a:t>
+              <a:t>7/27/18</a:t>
             </a:fld>
             <a:endParaRPr lang="en-US" dirty="0"/>
           </a:p>
@@ -7937,7 +8039,7 @@
             <a:fld id="{B61BEF0D-F0BB-DE4B-95CE-6DB70DBA9567}" type="datetimeFigureOut">
               <a:rPr lang="en-US" smtClean="0"/>
               <a:pPr/>
-              <a:t>7/22/18</a:t>
+              <a:t>7/27/18</a:t>
             </a:fld>
             <a:endParaRPr lang="en-US" dirty="0"/>
           </a:p>
@@ -8228,7 +8330,7 @@
             <a:fld id="{B61BEF0D-F0BB-DE4B-95CE-6DB70DBA9567}" type="datetimeFigureOut">
               <a:rPr lang="en-US" smtClean="0"/>
               <a:pPr/>
-              <a:t>7/22/18</a:t>
+              <a:t>7/27/18</a:t>
             </a:fld>
             <a:endParaRPr lang="en-US" dirty="0"/>
           </a:p>
@@ -8477,7 +8579,7 @@
             <a:fld id="{B61BEF0D-F0BB-DE4B-95CE-6DB70DBA9567}" type="datetimeFigureOut">
               <a:rPr lang="en-US" smtClean="0"/>
               <a:pPr/>
-              <a:t>7/22/18</a:t>
+              <a:t>7/27/18</a:t>
             </a:fld>
             <a:endParaRPr lang="en-US" dirty="0"/>
           </a:p>
@@ -8863,7 +8965,7 @@
             <a:fld id="{B61BEF0D-F0BB-DE4B-95CE-6DB70DBA9567}" type="datetimeFigureOut">
               <a:rPr lang="en-US" smtClean="0"/>
               <a:pPr/>
-              <a:t>7/22/18</a:t>
+              <a:t>7/27/18</a:t>
             </a:fld>
             <a:endParaRPr lang="en-US" dirty="0"/>
           </a:p>
@@ -8988,7 +9090,7 @@
             <a:fld id="{B61BEF0D-F0BB-DE4B-95CE-6DB70DBA9567}" type="datetimeFigureOut">
               <a:rPr lang="en-US" smtClean="0"/>
               <a:pPr/>
-              <a:t>7/22/18</a:t>
+              <a:t>7/27/18</a:t>
             </a:fld>
             <a:endParaRPr lang="en-US" dirty="0"/>
           </a:p>
@@ -9085,7 +9187,7 @@
             <a:fld id="{B61BEF0D-F0BB-DE4B-95CE-6DB70DBA9567}" type="datetimeFigureOut">
               <a:rPr lang="en-US" smtClean="0"/>
               <a:pPr/>
-              <a:t>7/22/18</a:t>
+              <a:t>7/27/18</a:t>
             </a:fld>
             <a:endParaRPr lang="en-US" dirty="0"/>
           </a:p>
@@ -9341,7 +9443,7 @@
             <a:fld id="{B61BEF0D-F0BB-DE4B-95CE-6DB70DBA9567}" type="datetimeFigureOut">
               <a:rPr lang="en-US" smtClean="0"/>
               <a:pPr/>
-              <a:t>7/22/18</a:t>
+              <a:t>7/27/18</a:t>
             </a:fld>
             <a:endParaRPr lang="en-US" dirty="0"/>
           </a:p>
@@ -9605,7 +9707,7 @@
             <a:fld id="{B61BEF0D-F0BB-DE4B-95CE-6DB70DBA9567}" type="datetimeFigureOut">
               <a:rPr lang="en-US" smtClean="0"/>
               <a:pPr/>
-              <a:t>7/22/18</a:t>
+              <a:t>7/27/18</a:t>
             </a:fld>
             <a:endParaRPr lang="en-US" dirty="0"/>
           </a:p>
@@ -9850,7 +9952,7 @@
             <a:fld id="{B61BEF0D-F0BB-DE4B-95CE-6DB70DBA9567}" type="datetimeFigureOut">
               <a:rPr lang="en-US" smtClean="0"/>
               <a:pPr/>
-              <a:t>7/22/18</a:t>
+              <a:t>7/27/18</a:t>
             </a:fld>
             <a:endParaRPr lang="en-US" dirty="0"/>
           </a:p>
@@ -15867,7 +15969,11 @@
             </a:r>
             <a:r>
               <a:rPr lang="zh-CN" altLang="en-US" dirty="0" smtClean="0"/>
-              <a:t>支持多个变量</a:t>
+              <a:t>支持实时监控多</a:t>
+            </a:r>
+            <a:r>
+              <a:rPr lang="zh-CN" altLang="en-US" dirty="0" smtClean="0"/>
+              <a:t>个变量</a:t>
             </a:r>
             <a:endParaRPr lang="en-US" altLang="zh-CN" dirty="0" smtClean="0"/>
           </a:p>
@@ -15918,6 +16024,15 @@
               <a:rPr lang="en-US" dirty="0" smtClean="0"/>
               <a:t> </a:t>
             </a:r>
+            <a:endParaRPr lang="en-US" dirty="0" smtClean="0"/>
+          </a:p>
+          <a:p>
+            <a:r>
+              <a:rPr lang="en-US" dirty="0" smtClean="0"/>
+              <a:t>4. promise-&gt; resolve observable -&gt; next</a:t>
+            </a:r>
+          </a:p>
+          <a:p>
             <a:endParaRPr lang="en-US" dirty="0"/>
           </a:p>
         </p:txBody>
@@ -16459,17 +16574,37 @@
           <a:lstStyle/>
           <a:p>
             <a:r>
+              <a:rPr lang="en-US" dirty="0">
+                <a:hlinkClick r:id="rId3"/>
+              </a:rPr>
+              <a:t>https://</a:t>
+            </a:r>
+            <a:r>
+              <a:rPr lang="en-US" dirty="0" smtClean="0">
+                <a:hlinkClick r:id="rId3"/>
+              </a:rPr>
+              <a:t>github.com/angular/angular-cli</a:t>
+            </a:r>
+            <a:endParaRPr lang="en-US" dirty="0" smtClean="0"/>
+          </a:p>
+          <a:p>
+            <a:r>
               <a:rPr lang="en-US" dirty="0"/>
               <a:t>https://</a:t>
             </a:r>
             <a:r>
               <a:rPr lang="en-US" dirty="0" err="1"/>
-              <a:t>github.com</a:t>
+              <a:t>angular.io</a:t>
             </a:r>
             <a:r>
               <a:rPr lang="en-US" dirty="0"/>
-              <a:t>/angular/angular-cli</a:t>
-            </a:r>
+              <a:t>/guide/</a:t>
+            </a:r>
+            <a:r>
+              <a:rPr lang="en-US" dirty="0" err="1"/>
+              <a:t>quickstart</a:t>
+            </a:r>
+            <a:endParaRPr lang="en-US" dirty="0"/>
           </a:p>
         </p:txBody>
       </p:sp>

</xml_diff>